<commit_message>
Frank suggestions (1/3): * figure animation fix * formula 8 / factor on x1 fix * delete Figure 5b * jupyter / google colab open in new tab in playground
</commit_message>
<xml_diff>
--- a/assets/images/lqr_control/Elimination.pptx
+++ b/assets/images/lqr_control/Elimination.pptx
@@ -268,7 +268,7 @@
           <a:p>
             <a:fld id="{CCDCEAF4-DC6A-ED4A-9D76-9EB0158D3920}" type="datetimeFigureOut">
               <a:rPr lang="en-US" smtClean="0"/>
-              <a:t>1/9/20</a:t>
+              <a:t>1/17/20</a:t>
             </a:fld>
             <a:endParaRPr lang="en-US"/>
           </a:p>
@@ -466,7 +466,7 @@
           <a:p>
             <a:fld id="{CCDCEAF4-DC6A-ED4A-9D76-9EB0158D3920}" type="datetimeFigureOut">
               <a:rPr lang="en-US" smtClean="0"/>
-              <a:t>1/9/20</a:t>
+              <a:t>1/17/20</a:t>
             </a:fld>
             <a:endParaRPr lang="en-US"/>
           </a:p>
@@ -674,7 +674,7 @@
           <a:p>
             <a:fld id="{CCDCEAF4-DC6A-ED4A-9D76-9EB0158D3920}" type="datetimeFigureOut">
               <a:rPr lang="en-US" smtClean="0"/>
-              <a:t>1/9/20</a:t>
+              <a:t>1/17/20</a:t>
             </a:fld>
             <a:endParaRPr lang="en-US"/>
           </a:p>
@@ -872,7 +872,7 @@
           <a:p>
             <a:fld id="{CCDCEAF4-DC6A-ED4A-9D76-9EB0158D3920}" type="datetimeFigureOut">
               <a:rPr lang="en-US" smtClean="0"/>
-              <a:t>1/9/20</a:t>
+              <a:t>1/17/20</a:t>
             </a:fld>
             <a:endParaRPr lang="en-US"/>
           </a:p>
@@ -1147,7 +1147,7 @@
           <a:p>
             <a:fld id="{CCDCEAF4-DC6A-ED4A-9D76-9EB0158D3920}" type="datetimeFigureOut">
               <a:rPr lang="en-US" smtClean="0"/>
-              <a:t>1/9/20</a:t>
+              <a:t>1/17/20</a:t>
             </a:fld>
             <a:endParaRPr lang="en-US"/>
           </a:p>
@@ -1412,7 +1412,7 @@
           <a:p>
             <a:fld id="{CCDCEAF4-DC6A-ED4A-9D76-9EB0158D3920}" type="datetimeFigureOut">
               <a:rPr lang="en-US" smtClean="0"/>
-              <a:t>1/9/20</a:t>
+              <a:t>1/17/20</a:t>
             </a:fld>
             <a:endParaRPr lang="en-US"/>
           </a:p>
@@ -1824,7 +1824,7 @@
           <a:p>
             <a:fld id="{CCDCEAF4-DC6A-ED4A-9D76-9EB0158D3920}" type="datetimeFigureOut">
               <a:rPr lang="en-US" smtClean="0"/>
-              <a:t>1/9/20</a:t>
+              <a:t>1/17/20</a:t>
             </a:fld>
             <a:endParaRPr lang="en-US"/>
           </a:p>
@@ -1965,7 +1965,7 @@
           <a:p>
             <a:fld id="{CCDCEAF4-DC6A-ED4A-9D76-9EB0158D3920}" type="datetimeFigureOut">
               <a:rPr lang="en-US" smtClean="0"/>
-              <a:t>1/9/20</a:t>
+              <a:t>1/17/20</a:t>
             </a:fld>
             <a:endParaRPr lang="en-US"/>
           </a:p>
@@ -2078,7 +2078,7 @@
           <a:p>
             <a:fld id="{CCDCEAF4-DC6A-ED4A-9D76-9EB0158D3920}" type="datetimeFigureOut">
               <a:rPr lang="en-US" smtClean="0"/>
-              <a:t>1/9/20</a:t>
+              <a:t>1/17/20</a:t>
             </a:fld>
             <a:endParaRPr lang="en-US"/>
           </a:p>
@@ -2389,7 +2389,7 @@
           <a:p>
             <a:fld id="{CCDCEAF4-DC6A-ED4A-9D76-9EB0158D3920}" type="datetimeFigureOut">
               <a:rPr lang="en-US" smtClean="0"/>
-              <a:t>1/9/20</a:t>
+              <a:t>1/17/20</a:t>
             </a:fld>
             <a:endParaRPr lang="en-US"/>
           </a:p>
@@ -2677,7 +2677,7 @@
           <a:p>
             <a:fld id="{CCDCEAF4-DC6A-ED4A-9D76-9EB0158D3920}" type="datetimeFigureOut">
               <a:rPr lang="en-US" smtClean="0"/>
-              <a:t>1/9/20</a:t>
+              <a:t>1/17/20</a:t>
             </a:fld>
             <a:endParaRPr lang="en-US"/>
           </a:p>
@@ -2918,7 +2918,7 @@
           <a:p>
             <a:fld id="{CCDCEAF4-DC6A-ED4A-9D76-9EB0158D3920}" type="datetimeFigureOut">
               <a:rPr lang="en-US" smtClean="0"/>
-              <a:t>1/9/20</a:t>
+              <a:t>1/17/20</a:t>
             </a:fld>
             <a:endParaRPr lang="en-US"/>
           </a:p>
@@ -8628,8 +8628,8 @@
           </a:fontRef>
         </p:style>
       </p:cxnSp>
-      <mc:AlternateContent xmlns:mc="http://schemas.openxmlformats.org/markup-compatibility/2006">
-        <mc:Choice xmlns:a14="http://schemas.microsoft.com/office/drawing/2010/main" Requires="a14">
+      <mc:AlternateContent xmlns:mc="http://schemas.openxmlformats.org/markup-compatibility/2006" xmlns:a14="http://schemas.microsoft.com/office/drawing/2010/main">
+        <mc:Choice Requires="a14">
           <p:sp>
             <p:nvSpPr>
               <p:cNvPr id="24" name="Rounded Rectangular Callout 23">
@@ -8813,7 +8813,7 @@
             </p:txBody>
           </p:sp>
         </mc:Choice>
-        <mc:Fallback>
+        <mc:Fallback xmlns="">
           <p:sp>
             <p:nvSpPr>
               <p:cNvPr id="24" name="Rounded Rectangular Callout 23">
@@ -17474,8 +17474,8 @@
           </p:sp>
         </mc:Fallback>
       </mc:AlternateContent>
-      <mc:AlternateContent xmlns:mc="http://schemas.openxmlformats.org/markup-compatibility/2006" xmlns:a14="http://schemas.microsoft.com/office/drawing/2010/main">
-        <mc:Choice Requires="a14">
+      <mc:AlternateContent xmlns:mc="http://schemas.openxmlformats.org/markup-compatibility/2006">
+        <mc:Choice xmlns:a14="http://schemas.microsoft.com/office/drawing/2010/main" Requires="a14">
           <p:sp>
             <p:nvSpPr>
               <p:cNvPr id="44" name="Rounded Rectangular Callout 43"/>
@@ -17637,7 +17637,7 @@
                       <m:sSup>
                         <m:sSupPr>
                           <m:ctrlPr>
-                            <a:rPr lang="en-US" sz="1000" b="0" i="1" smtClean="0">
+                            <a:rPr lang="en-US" sz="1000" i="1">
                               <a:solidFill>
                                 <a:schemeClr val="tx1"/>
                               </a:solidFill>
@@ -17646,71 +17646,96 @@
                           </m:ctrlPr>
                         </m:sSupPr>
                         <m:e>
-                          <m:r>
-                            <a:rPr lang="en-US" sz="1000" b="0" i="1" smtClean="0">
-                              <a:solidFill>
-                                <a:schemeClr val="tx1"/>
-                              </a:solidFill>
-                              <a:latin typeface="Cambria Math" charset="0"/>
-                            </a:rPr>
-                            <m:t>𝐴</m:t>
-                          </m:r>
+                          <m:sSub>
+                            <m:sSubPr>
+                              <m:ctrlPr>
+                                <a:rPr lang="en-US" sz="1000" i="1">
+                                  <a:solidFill>
+                                    <a:schemeClr val="tx1"/>
+                                  </a:solidFill>
+                                  <a:latin typeface="Cambria Math" panose="02040503050406030204" pitchFamily="18" charset="0"/>
+                                </a:rPr>
+                              </m:ctrlPr>
+                            </m:sSubPr>
+                            <m:e>
+                              <m:r>
+                                <a:rPr lang="en-US" sz="1000" i="1">
+                                  <a:solidFill>
+                                    <a:schemeClr val="tx1"/>
+                                  </a:solidFill>
+                                  <a:latin typeface="Cambria Math" charset="0"/>
+                                </a:rPr>
+                                <m:t>𝐾</m:t>
+                              </m:r>
+                            </m:e>
+                            <m:sub>
+                              <m:r>
+                                <a:rPr lang="en-US" sz="1000" i="1">
+                                  <a:solidFill>
+                                    <a:schemeClr val="tx1"/>
+                                  </a:solidFill>
+                                  <a:latin typeface="Cambria Math" charset="0"/>
+                                </a:rPr>
+                                <m:t>1</m:t>
+                              </m:r>
+                            </m:sub>
+                          </m:sSub>
                         </m:e>
                         <m:sup>
                           <m:r>
-                            <a:rPr lang="en-US" sz="1000" b="0" i="1" smtClean="0">
-                              <a:solidFill>
-                                <a:schemeClr val="tx1"/>
-                              </a:solidFill>
-                              <a:latin typeface="Cambria Math" charset="0"/>
+                            <a:rPr lang="en-US" sz="1000" i="1">
+                              <a:solidFill>
+                                <a:schemeClr val="tx1"/>
+                              </a:solidFill>
+                              <a:latin typeface="Cambria Math" panose="02040503050406030204" pitchFamily="18" charset="0"/>
+                            </a:rPr>
+                            <m:t>𝑇</m:t>
+                          </m:r>
+                        </m:sup>
+                      </m:sSup>
+                      <m:sSup>
+                        <m:sSupPr>
+                          <m:ctrlPr>
+                            <a:rPr lang="en-US" sz="1000" i="1">
+                              <a:solidFill>
+                                <a:schemeClr val="tx1"/>
+                              </a:solidFill>
+                              <a:latin typeface="Cambria Math" panose="02040503050406030204" pitchFamily="18" charset="0"/>
+                            </a:rPr>
+                          </m:ctrlPr>
+                        </m:sSupPr>
+                        <m:e>
+                          <m:r>
+                            <a:rPr lang="en-US" sz="1000" i="1">
+                              <a:solidFill>
+                                <a:schemeClr val="tx1"/>
+                              </a:solidFill>
+                              <a:latin typeface="Cambria Math" panose="02040503050406030204" pitchFamily="18" charset="0"/>
+                            </a:rPr>
+                            <m:t>𝐵</m:t>
+                          </m:r>
+                        </m:e>
+                        <m:sup>
+                          <m:r>
+                            <a:rPr lang="en-US" sz="1000" i="1">
+                              <a:solidFill>
+                                <a:schemeClr val="tx1"/>
+                              </a:solidFill>
+                              <a:latin typeface="Cambria Math" panose="02040503050406030204" pitchFamily="18" charset="0"/>
                             </a:rPr>
                             <m:t>𝑇</m:t>
                           </m:r>
                         </m:sup>
                       </m:sSup>
                       <m:r>
-                        <a:rPr lang="en-US" sz="1000" b="0" i="1" smtClean="0">
+                        <a:rPr lang="en-US" sz="1000" i="1">
                           <a:solidFill>
                             <a:schemeClr val="tx1"/>
                           </a:solidFill>
-                          <a:latin typeface="Cambria Math" charset="0"/>
+                          <a:latin typeface="Cambria Math" panose="02040503050406030204" pitchFamily="18" charset="0"/>
                         </a:rPr>
-                        <m:t>𝑄𝐵</m:t>
+                        <m:t>𝑄𝐴</m:t>
                       </m:r>
-                      <m:sSub>
-                        <m:sSubPr>
-                          <m:ctrlPr>
-                            <a:rPr lang="en-US" sz="1000" b="0" i="1" smtClean="0">
-                              <a:solidFill>
-                                <a:schemeClr val="tx1"/>
-                              </a:solidFill>
-                              <a:latin typeface="Cambria Math" panose="02040503050406030204" pitchFamily="18" charset="0"/>
-                            </a:rPr>
-                          </m:ctrlPr>
-                        </m:sSubPr>
-                        <m:e>
-                          <m:r>
-                            <a:rPr lang="en-US" sz="1000" b="0" i="1" smtClean="0">
-                              <a:solidFill>
-                                <a:schemeClr val="tx1"/>
-                              </a:solidFill>
-                              <a:latin typeface="Cambria Math" charset="0"/>
-                            </a:rPr>
-                            <m:t>𝐾</m:t>
-                          </m:r>
-                        </m:e>
-                        <m:sub>
-                          <m:r>
-                            <a:rPr lang="en-US" sz="1000" b="0" i="1" smtClean="0">
-                              <a:solidFill>
-                                <a:schemeClr val="tx1"/>
-                              </a:solidFill>
-                              <a:latin typeface="Cambria Math" charset="0"/>
-                            </a:rPr>
-                            <m:t>1</m:t>
-                          </m:r>
-                        </m:sub>
-                      </m:sSub>
                       <m:r>
                         <a:rPr lang="en-US" sz="1000" b="0" i="1" smtClean="0">
                           <a:solidFill>
@@ -17766,7 +17791,7 @@
             </p:txBody>
           </p:sp>
         </mc:Choice>
-        <mc:Fallback xmlns="">
+        <mc:Fallback>
           <p:sp>
             <p:nvSpPr>
               <p:cNvPr id="44" name="Rounded Rectangular Callout 43"/>
@@ -20826,8 +20851,8 @@
           </p:sp>
         </mc:Fallback>
       </mc:AlternateContent>
-      <mc:AlternateContent xmlns:mc="http://schemas.openxmlformats.org/markup-compatibility/2006">
-        <mc:Choice xmlns:a14="http://schemas.microsoft.com/office/drawing/2010/main" Requires="a14">
+      <mc:AlternateContent xmlns:mc="http://schemas.openxmlformats.org/markup-compatibility/2006" xmlns:a14="http://schemas.microsoft.com/office/drawing/2010/main">
+        <mc:Choice Requires="a14">
           <p:sp>
             <p:nvSpPr>
               <p:cNvPr id="29" name="Rounded Rectangular Callout 28">
@@ -21011,7 +21036,7 @@
             </p:txBody>
           </p:sp>
         </mc:Choice>
-        <mc:Fallback>
+        <mc:Fallback xmlns="">
           <p:sp>
             <p:nvSpPr>
               <p:cNvPr id="29" name="Rounded Rectangular Callout 28">
@@ -23776,8 +23801,8 @@
           </p:sp>
         </mc:Fallback>
       </mc:AlternateContent>
-      <mc:AlternateContent xmlns:mc="http://schemas.openxmlformats.org/markup-compatibility/2006">
-        <mc:Choice xmlns:a14="http://schemas.microsoft.com/office/drawing/2010/main" Requires="a14">
+      <mc:AlternateContent xmlns:mc="http://schemas.openxmlformats.org/markup-compatibility/2006" xmlns:a14="http://schemas.microsoft.com/office/drawing/2010/main">
+        <mc:Choice Requires="a14">
           <p:sp>
             <p:nvSpPr>
               <p:cNvPr id="33" name="Rounded Rectangular Callout 32">
@@ -23961,7 +23986,7 @@
             </p:txBody>
           </p:sp>
         </mc:Choice>
-        <mc:Fallback>
+        <mc:Fallback xmlns="">
           <p:sp>
             <p:nvSpPr>
               <p:cNvPr id="33" name="Rounded Rectangular Callout 32">
@@ -26145,8 +26170,8 @@
           </a:fontRef>
         </p:style>
       </p:cxnSp>
-      <mc:AlternateContent xmlns:mc="http://schemas.openxmlformats.org/markup-compatibility/2006">
-        <mc:Choice xmlns:a14="http://schemas.microsoft.com/office/drawing/2010/main" Requires="a14">
+      <mc:AlternateContent xmlns:mc="http://schemas.openxmlformats.org/markup-compatibility/2006" xmlns:a14="http://schemas.microsoft.com/office/drawing/2010/main">
+        <mc:Choice Requires="a14">
           <p:sp>
             <p:nvSpPr>
               <p:cNvPr id="50" name="Rounded Rectangular Callout 49">
@@ -26498,7 +26523,7 @@
             </p:txBody>
           </p:sp>
         </mc:Choice>
-        <mc:Fallback>
+        <mc:Fallback xmlns="">
           <p:sp>
             <p:nvSpPr>
               <p:cNvPr id="50" name="Rounded Rectangular Callout 49">
@@ -28944,8 +28969,8 @@
           </a:fontRef>
         </p:style>
       </p:cxnSp>
-      <mc:AlternateContent xmlns:mc="http://schemas.openxmlformats.org/markup-compatibility/2006">
-        <mc:Choice xmlns:a14="http://schemas.microsoft.com/office/drawing/2010/main" Requires="a14">
+      <mc:AlternateContent xmlns:mc="http://schemas.openxmlformats.org/markup-compatibility/2006" xmlns:a14="http://schemas.microsoft.com/office/drawing/2010/main">
+        <mc:Choice Requires="a14">
           <p:sp>
             <p:nvSpPr>
               <p:cNvPr id="50" name="Rounded Rectangular Callout 49">
@@ -29297,7 +29322,7 @@
             </p:txBody>
           </p:sp>
         </mc:Choice>
-        <mc:Fallback>
+        <mc:Fallback xmlns="">
           <p:sp>
             <p:nvSpPr>
               <p:cNvPr id="50" name="Rounded Rectangular Callout 49">
@@ -32037,221 +32062,242 @@
                           </m:r>
                         </m:sup>
                       </m:sSubSup>
-                      <m:r>
-                        <a:rPr lang="en-US" sz="1000" b="0" i="1" smtClean="0">
-                          <a:solidFill>
-                            <a:schemeClr val="tx1"/>
-                          </a:solidFill>
-                          <a:latin typeface="Cambria Math" charset="0"/>
-                        </a:rPr>
-                        <m:t>(</m:t>
-                      </m:r>
-                      <m:sSup>
-                        <m:sSupPr>
+                      <m:d>
+                        <m:dPr>
                           <m:ctrlPr>
                             <a:rPr lang="en-US" sz="1000" b="0" i="1" smtClean="0">
                               <a:solidFill>
                                 <a:schemeClr val="tx1"/>
                               </a:solidFill>
+                              <a:latin typeface="Cambria Math" charset="0"/>
+                            </a:rPr>
+                          </m:ctrlPr>
+                        </m:dPr>
+                        <m:e>
+                          <m:sSup>
+                            <m:sSupPr>
+                              <m:ctrlPr>
+                                <a:rPr lang="en-US" sz="1000" b="0" i="1" smtClean="0">
+                                  <a:solidFill>
+                                    <a:schemeClr val="tx1"/>
+                                  </a:solidFill>
+                                  <a:latin typeface="Cambria Math" panose="02040503050406030204" pitchFamily="18" charset="0"/>
+                                </a:rPr>
+                              </m:ctrlPr>
+                            </m:sSupPr>
+                            <m:e>
+                              <m:r>
+                                <a:rPr lang="en-US" sz="1000" b="0" i="1" smtClean="0">
+                                  <a:solidFill>
+                                    <a:schemeClr val="tx1"/>
+                                  </a:solidFill>
+                                  <a:latin typeface="Cambria Math" charset="0"/>
+                                </a:rPr>
+                                <m:t>𝐴</m:t>
+                              </m:r>
+                            </m:e>
+                            <m:sup>
+                              <m:r>
+                                <a:rPr lang="en-US" sz="1000" b="0" i="1" smtClean="0">
+                                  <a:solidFill>
+                                    <a:schemeClr val="tx1"/>
+                                  </a:solidFill>
+                                  <a:latin typeface="Cambria Math" charset="0"/>
+                                </a:rPr>
+                                <m:t>𝑇</m:t>
+                              </m:r>
+                            </m:sup>
+                          </m:sSup>
+                          <m:sSub>
+                            <m:sSubPr>
+                              <m:ctrlPr>
+                                <a:rPr lang="en-US" sz="1000" b="0" i="1" smtClean="0">
+                                  <a:solidFill>
+                                    <a:schemeClr val="tx1"/>
+                                  </a:solidFill>
+                                  <a:latin typeface="Cambria Math" panose="02040503050406030204" pitchFamily="18" charset="0"/>
+                                </a:rPr>
+                              </m:ctrlPr>
+                            </m:sSubPr>
+                            <m:e>
+                              <m:r>
+                                <a:rPr lang="en-US" sz="1000" b="0" i="1" smtClean="0">
+                                  <a:solidFill>
+                                    <a:schemeClr val="tx1"/>
+                                  </a:solidFill>
+                                  <a:latin typeface="Cambria Math" panose="02040503050406030204" pitchFamily="18" charset="0"/>
+                                </a:rPr>
+                                <m:t>𝑃</m:t>
+                              </m:r>
+                            </m:e>
+                            <m:sub>
+                              <m:r>
+                                <a:rPr lang="en-US" sz="1000" b="0" i="1" smtClean="0">
+                                  <a:solidFill>
+                                    <a:schemeClr val="tx1"/>
+                                  </a:solidFill>
+                                  <a:latin typeface="Cambria Math" panose="02040503050406030204" pitchFamily="18" charset="0"/>
+                                </a:rPr>
+                                <m:t>1</m:t>
+                              </m:r>
+                            </m:sub>
+                          </m:sSub>
+                          <m:r>
+                            <a:rPr lang="en-US" sz="1000" b="0" i="1" smtClean="0">
+                              <a:solidFill>
+                                <a:schemeClr val="tx1"/>
+                              </a:solidFill>
+                              <a:latin typeface="Cambria Math" charset="0"/>
+                            </a:rPr>
+                            <m:t>𝐴</m:t>
+                          </m:r>
+                          <m:r>
+                            <a:rPr lang="en-US" sz="1000" b="0" i="1" smtClean="0">
+                              <a:solidFill>
+                                <a:schemeClr val="tx1"/>
+                              </a:solidFill>
+                              <a:latin typeface="Cambria Math" charset="0"/>
+                            </a:rPr>
+                            <m:t>−</m:t>
+                          </m:r>
+                          <m:sSup>
+                            <m:sSupPr>
+                              <m:ctrlPr>
+                                <a:rPr lang="en-US" sz="1000" i="1">
+                                  <a:solidFill>
+                                    <a:schemeClr val="tx1"/>
+                                  </a:solidFill>
+                                  <a:latin typeface="Cambria Math" panose="02040503050406030204" pitchFamily="18" charset="0"/>
+                                </a:rPr>
+                              </m:ctrlPr>
+                            </m:sSupPr>
+                            <m:e>
+                              <m:sSub>
+                                <m:sSubPr>
+                                  <m:ctrlPr>
+                                    <a:rPr lang="en-US" sz="1000" i="1">
+                                      <a:solidFill>
+                                        <a:schemeClr val="tx1"/>
+                                      </a:solidFill>
+                                      <a:latin typeface="Cambria Math" panose="02040503050406030204" pitchFamily="18" charset="0"/>
+                                    </a:rPr>
+                                  </m:ctrlPr>
+                                </m:sSubPr>
+                                <m:e>
+                                  <m:r>
+                                    <a:rPr lang="en-US" sz="1000" i="1">
+                                      <a:solidFill>
+                                        <a:schemeClr val="tx1"/>
+                                      </a:solidFill>
+                                      <a:latin typeface="Cambria Math" charset="0"/>
+                                    </a:rPr>
+                                    <m:t>𝐾</m:t>
+                                  </m:r>
+                                </m:e>
+                                <m:sub>
+                                  <m:r>
+                                    <a:rPr lang="en-US" sz="1000" i="1">
+                                      <a:solidFill>
+                                        <a:schemeClr val="tx1"/>
+                                      </a:solidFill>
+                                      <a:latin typeface="Cambria Math" charset="0"/>
+                                    </a:rPr>
+                                    <m:t>1</m:t>
+                                  </m:r>
+                                </m:sub>
+                              </m:sSub>
+                            </m:e>
+                            <m:sup>
+                              <m:r>
+                                <a:rPr lang="en-US" sz="1000" i="1">
+                                  <a:solidFill>
+                                    <a:schemeClr val="tx1"/>
+                                  </a:solidFill>
+                                  <a:latin typeface="Cambria Math" panose="02040503050406030204" pitchFamily="18" charset="0"/>
+                                </a:rPr>
+                                <m:t>𝑇</m:t>
+                              </m:r>
+                            </m:sup>
+                          </m:sSup>
+                          <m:sSup>
+                            <m:sSupPr>
+                              <m:ctrlPr>
+                                <a:rPr lang="en-US" sz="1000" i="1">
+                                  <a:solidFill>
+                                    <a:schemeClr val="tx1"/>
+                                  </a:solidFill>
+                                  <a:latin typeface="Cambria Math" panose="02040503050406030204" pitchFamily="18" charset="0"/>
+                                </a:rPr>
+                              </m:ctrlPr>
+                            </m:sSupPr>
+                            <m:e>
+                              <m:r>
+                                <a:rPr lang="en-US" sz="1000" i="1">
+                                  <a:solidFill>
+                                    <a:schemeClr val="tx1"/>
+                                  </a:solidFill>
+                                  <a:latin typeface="Cambria Math" panose="02040503050406030204" pitchFamily="18" charset="0"/>
+                                </a:rPr>
+                                <m:t>𝐵</m:t>
+                              </m:r>
+                            </m:e>
+                            <m:sup>
+                              <m:r>
+                                <a:rPr lang="en-US" sz="1000" i="1">
+                                  <a:solidFill>
+                                    <a:schemeClr val="tx1"/>
+                                  </a:solidFill>
+                                  <a:latin typeface="Cambria Math" panose="02040503050406030204" pitchFamily="18" charset="0"/>
+                                </a:rPr>
+                                <m:t>𝑇</m:t>
+                              </m:r>
+                            </m:sup>
+                          </m:sSup>
+                          <m:sSub>
+                            <m:sSubPr>
+                              <m:ctrlPr>
+                                <a:rPr lang="en-US" sz="1000" b="0" i="1" smtClean="0">
+                                  <a:solidFill>
+                                    <a:schemeClr val="tx1"/>
+                                  </a:solidFill>
+                                  <a:latin typeface="Cambria Math" panose="02040503050406030204" pitchFamily="18" charset="0"/>
+                                </a:rPr>
+                              </m:ctrlPr>
+                            </m:sSubPr>
+                            <m:e>
+                              <m:r>
+                                <a:rPr lang="en-US" sz="1000" b="0" i="1" smtClean="0">
+                                  <a:solidFill>
+                                    <a:schemeClr val="tx1"/>
+                                  </a:solidFill>
+                                  <a:latin typeface="Cambria Math" panose="02040503050406030204" pitchFamily="18" charset="0"/>
+                                </a:rPr>
+                                <m:t>𝑃</m:t>
+                              </m:r>
+                            </m:e>
+                            <m:sub>
+                              <m:r>
+                                <a:rPr lang="en-US" sz="1000" b="0" i="1" smtClean="0">
+                                  <a:solidFill>
+                                    <a:schemeClr val="tx1"/>
+                                  </a:solidFill>
+                                  <a:latin typeface="Cambria Math" panose="02040503050406030204" pitchFamily="18" charset="0"/>
+                                </a:rPr>
+                                <m:t>1</m:t>
+                              </m:r>
+                            </m:sub>
+                          </m:sSub>
+                          <m:r>
+                            <a:rPr lang="en-US" sz="1000" b="0" i="1" smtClean="0">
+                              <a:solidFill>
+                                <a:schemeClr val="tx1"/>
+                              </a:solidFill>
                               <a:latin typeface="Cambria Math" panose="02040503050406030204" pitchFamily="18" charset="0"/>
                             </a:rPr>
-                          </m:ctrlPr>
-                        </m:sSupPr>
-                        <m:e>
-                          <m:r>
-                            <a:rPr lang="en-US" sz="1000" b="0" i="1" smtClean="0">
-                              <a:solidFill>
-                                <a:schemeClr val="tx1"/>
-                              </a:solidFill>
-                              <a:latin typeface="Cambria Math" charset="0"/>
-                            </a:rPr>
                             <m:t>𝐴</m:t>
                           </m:r>
                         </m:e>
-                        <m:sup>
-                          <m:r>
-                            <a:rPr lang="en-US" sz="1000" b="0" i="1" smtClean="0">
-                              <a:solidFill>
-                                <a:schemeClr val="tx1"/>
-                              </a:solidFill>
-                              <a:latin typeface="Cambria Math" charset="0"/>
-                            </a:rPr>
-                            <m:t>𝑇</m:t>
-                          </m:r>
-                        </m:sup>
-                      </m:sSup>
-                      <m:sSub>
-                        <m:sSubPr>
-                          <m:ctrlPr>
-                            <a:rPr lang="en-US" sz="1000" b="0" i="1" smtClean="0">
-                              <a:solidFill>
-                                <a:schemeClr val="tx1"/>
-                              </a:solidFill>
-                              <a:latin typeface="Cambria Math" panose="02040503050406030204" pitchFamily="18" charset="0"/>
-                            </a:rPr>
-                          </m:ctrlPr>
-                        </m:sSubPr>
-                        <m:e>
-                          <m:r>
-                            <a:rPr lang="en-US" sz="1000" b="0" i="1" smtClean="0">
-                              <a:solidFill>
-                                <a:schemeClr val="tx1"/>
-                              </a:solidFill>
-                              <a:latin typeface="Cambria Math" panose="02040503050406030204" pitchFamily="18" charset="0"/>
-                            </a:rPr>
-                            <m:t>𝑃</m:t>
-                          </m:r>
-                        </m:e>
-                        <m:sub>
-                          <m:r>
-                            <a:rPr lang="en-US" sz="1000" b="0" i="1" smtClean="0">
-                              <a:solidFill>
-                                <a:schemeClr val="tx1"/>
-                              </a:solidFill>
-                              <a:latin typeface="Cambria Math" panose="02040503050406030204" pitchFamily="18" charset="0"/>
-                            </a:rPr>
-                            <m:t>1</m:t>
-                          </m:r>
-                        </m:sub>
-                      </m:sSub>
-                      <m:r>
-                        <a:rPr lang="en-US" sz="1000" b="0" i="1" smtClean="0">
-                          <a:solidFill>
-                            <a:schemeClr val="tx1"/>
-                          </a:solidFill>
-                          <a:latin typeface="Cambria Math" charset="0"/>
-                        </a:rPr>
-                        <m:t>𝐴</m:t>
-                      </m:r>
-                      <m:r>
-                        <a:rPr lang="en-US" sz="1000" b="0" i="1" smtClean="0">
-                          <a:solidFill>
-                            <a:schemeClr val="tx1"/>
-                          </a:solidFill>
-                          <a:latin typeface="Cambria Math" charset="0"/>
-                        </a:rPr>
-                        <m:t>−</m:t>
-                      </m:r>
-                      <m:sSup>
-                        <m:sSupPr>
-                          <m:ctrlPr>
-                            <a:rPr lang="en-US" sz="1000" b="0" i="1" smtClean="0">
-                              <a:solidFill>
-                                <a:schemeClr val="tx1"/>
-                              </a:solidFill>
-                              <a:latin typeface="Cambria Math" panose="02040503050406030204" pitchFamily="18" charset="0"/>
-                            </a:rPr>
-                          </m:ctrlPr>
-                        </m:sSupPr>
-                        <m:e>
-                          <m:r>
-                            <a:rPr lang="en-US" sz="1000" b="0" i="1" smtClean="0">
-                              <a:solidFill>
-                                <a:schemeClr val="tx1"/>
-                              </a:solidFill>
-                              <a:latin typeface="Cambria Math" charset="0"/>
-                            </a:rPr>
-                            <m:t>𝐴</m:t>
-                          </m:r>
-                        </m:e>
-                        <m:sup>
-                          <m:r>
-                            <a:rPr lang="en-US" sz="1000" b="0" i="1" smtClean="0">
-                              <a:solidFill>
-                                <a:schemeClr val="tx1"/>
-                              </a:solidFill>
-                              <a:latin typeface="Cambria Math" charset="0"/>
-                            </a:rPr>
-                            <m:t>𝑇</m:t>
-                          </m:r>
-                        </m:sup>
-                      </m:sSup>
-                      <m:sSub>
-                        <m:sSubPr>
-                          <m:ctrlPr>
-                            <a:rPr lang="en-US" sz="1000" b="0" i="1" smtClean="0">
-                              <a:solidFill>
-                                <a:schemeClr val="tx1"/>
-                              </a:solidFill>
-                              <a:latin typeface="Cambria Math" panose="02040503050406030204" pitchFamily="18" charset="0"/>
-                            </a:rPr>
-                          </m:ctrlPr>
-                        </m:sSubPr>
-                        <m:e>
-                          <m:r>
-                            <a:rPr lang="en-US" sz="1000" b="0" i="1" smtClean="0">
-                              <a:solidFill>
-                                <a:schemeClr val="tx1"/>
-                              </a:solidFill>
-                              <a:latin typeface="Cambria Math" panose="02040503050406030204" pitchFamily="18" charset="0"/>
-                            </a:rPr>
-                            <m:t>𝑃</m:t>
-                          </m:r>
-                        </m:e>
-                        <m:sub>
-                          <m:r>
-                            <a:rPr lang="en-US" sz="1000" b="0" i="1" smtClean="0">
-                              <a:solidFill>
-                                <a:schemeClr val="tx1"/>
-                              </a:solidFill>
-                              <a:latin typeface="Cambria Math" panose="02040503050406030204" pitchFamily="18" charset="0"/>
-                            </a:rPr>
-                            <m:t>1</m:t>
-                          </m:r>
-                        </m:sub>
-                      </m:sSub>
-                      <m:r>
-                        <a:rPr lang="en-US" sz="1000" b="0" i="1" smtClean="0">
-                          <a:solidFill>
-                            <a:schemeClr val="tx1"/>
-                          </a:solidFill>
-                          <a:latin typeface="Cambria Math" charset="0"/>
-                        </a:rPr>
-                        <m:t>𝐵</m:t>
-                      </m:r>
-                      <m:sSub>
-                        <m:sSubPr>
-                          <m:ctrlPr>
-                            <a:rPr lang="en-US" sz="1000" b="0" i="1" smtClean="0">
-                              <a:solidFill>
-                                <a:schemeClr val="tx1"/>
-                              </a:solidFill>
-                              <a:latin typeface="Cambria Math" panose="02040503050406030204" pitchFamily="18" charset="0"/>
-                            </a:rPr>
-                          </m:ctrlPr>
-                        </m:sSubPr>
-                        <m:e>
-                          <m:r>
-                            <a:rPr lang="en-US" sz="1000" b="0" i="1" smtClean="0">
-                              <a:solidFill>
-                                <a:schemeClr val="tx1"/>
-                              </a:solidFill>
-                              <a:latin typeface="Cambria Math" charset="0"/>
-                            </a:rPr>
-                            <m:t>𝐾</m:t>
-                          </m:r>
-                        </m:e>
-                        <m:sub>
-                          <m:r>
-                            <a:rPr lang="en-US" sz="1000" b="0" i="1" smtClean="0">
-                              <a:solidFill>
-                                <a:schemeClr val="tx1"/>
-                              </a:solidFill>
-                              <a:latin typeface="Cambria Math" panose="02040503050406030204" pitchFamily="18" charset="0"/>
-                            </a:rPr>
-                            <m:t>2</m:t>
-                          </m:r>
-                        </m:sub>
-                      </m:sSub>
-                      <m:r>
-                        <a:rPr lang="en-US" sz="1000" b="0" i="1" smtClean="0">
-                          <a:solidFill>
-                            <a:schemeClr val="tx1"/>
-                          </a:solidFill>
-                          <a:latin typeface="Cambria Math" charset="0"/>
-                        </a:rPr>
-                        <m:t>)</m:t>
-                      </m:r>
+                      </m:d>
                       <m:sSub>
                         <m:sSubPr>
                           <m:ctrlPr>

</xml_diff>

<commit_message>
frank Suggestions (2/3): Appendix * removed Cholesky stuff * removed "completing the square" stuff * updated matrices for correct elimination algorithm
</commit_message>
<xml_diff>
--- a/assets/images/lqr_control/Elimination.pptx
+++ b/assets/images/lqr_control/Elimination.pptx
@@ -15,6 +15,7 @@
     <p:sldId id="281" r:id="rId9"/>
     <p:sldId id="283" r:id="rId10"/>
     <p:sldId id="285" r:id="rId11"/>
+    <p:sldId id="286" r:id="rId12"/>
   </p:sldIdLst>
   <p:sldSz cx="12192000" cy="6858000"/>
   <p:notesSz cx="6858000" cy="9144000"/>
@@ -268,7 +269,7 @@
           <a:p>
             <a:fld id="{CCDCEAF4-DC6A-ED4A-9D76-9EB0158D3920}" type="datetimeFigureOut">
               <a:rPr lang="en-US" smtClean="0"/>
-              <a:t>1/17/20</a:t>
+              <a:t>1/22/20</a:t>
             </a:fld>
             <a:endParaRPr lang="en-US"/>
           </a:p>
@@ -466,7 +467,7 @@
           <a:p>
             <a:fld id="{CCDCEAF4-DC6A-ED4A-9D76-9EB0158D3920}" type="datetimeFigureOut">
               <a:rPr lang="en-US" smtClean="0"/>
-              <a:t>1/17/20</a:t>
+              <a:t>1/22/20</a:t>
             </a:fld>
             <a:endParaRPr lang="en-US"/>
           </a:p>
@@ -674,7 +675,7 @@
           <a:p>
             <a:fld id="{CCDCEAF4-DC6A-ED4A-9D76-9EB0158D3920}" type="datetimeFigureOut">
               <a:rPr lang="en-US" smtClean="0"/>
-              <a:t>1/17/20</a:t>
+              <a:t>1/22/20</a:t>
             </a:fld>
             <a:endParaRPr lang="en-US"/>
           </a:p>
@@ -872,7 +873,7 @@
           <a:p>
             <a:fld id="{CCDCEAF4-DC6A-ED4A-9D76-9EB0158D3920}" type="datetimeFigureOut">
               <a:rPr lang="en-US" smtClean="0"/>
-              <a:t>1/17/20</a:t>
+              <a:t>1/22/20</a:t>
             </a:fld>
             <a:endParaRPr lang="en-US"/>
           </a:p>
@@ -1147,7 +1148,7 @@
           <a:p>
             <a:fld id="{CCDCEAF4-DC6A-ED4A-9D76-9EB0158D3920}" type="datetimeFigureOut">
               <a:rPr lang="en-US" smtClean="0"/>
-              <a:t>1/17/20</a:t>
+              <a:t>1/22/20</a:t>
             </a:fld>
             <a:endParaRPr lang="en-US"/>
           </a:p>
@@ -1412,7 +1413,7 @@
           <a:p>
             <a:fld id="{CCDCEAF4-DC6A-ED4A-9D76-9EB0158D3920}" type="datetimeFigureOut">
               <a:rPr lang="en-US" smtClean="0"/>
-              <a:t>1/17/20</a:t>
+              <a:t>1/22/20</a:t>
             </a:fld>
             <a:endParaRPr lang="en-US"/>
           </a:p>
@@ -1824,7 +1825,7 @@
           <a:p>
             <a:fld id="{CCDCEAF4-DC6A-ED4A-9D76-9EB0158D3920}" type="datetimeFigureOut">
               <a:rPr lang="en-US" smtClean="0"/>
-              <a:t>1/17/20</a:t>
+              <a:t>1/22/20</a:t>
             </a:fld>
             <a:endParaRPr lang="en-US"/>
           </a:p>
@@ -1965,7 +1966,7 @@
           <a:p>
             <a:fld id="{CCDCEAF4-DC6A-ED4A-9D76-9EB0158D3920}" type="datetimeFigureOut">
               <a:rPr lang="en-US" smtClean="0"/>
-              <a:t>1/17/20</a:t>
+              <a:t>1/22/20</a:t>
             </a:fld>
             <a:endParaRPr lang="en-US"/>
           </a:p>
@@ -2078,7 +2079,7 @@
           <a:p>
             <a:fld id="{CCDCEAF4-DC6A-ED4A-9D76-9EB0158D3920}" type="datetimeFigureOut">
               <a:rPr lang="en-US" smtClean="0"/>
-              <a:t>1/17/20</a:t>
+              <a:t>1/22/20</a:t>
             </a:fld>
             <a:endParaRPr lang="en-US"/>
           </a:p>
@@ -2389,7 +2390,7 @@
           <a:p>
             <a:fld id="{CCDCEAF4-DC6A-ED4A-9D76-9EB0158D3920}" type="datetimeFigureOut">
               <a:rPr lang="en-US" smtClean="0"/>
-              <a:t>1/17/20</a:t>
+              <a:t>1/22/20</a:t>
             </a:fld>
             <a:endParaRPr lang="en-US"/>
           </a:p>
@@ -2677,7 +2678,7 @@
           <a:p>
             <a:fld id="{CCDCEAF4-DC6A-ED4A-9D76-9EB0158D3920}" type="datetimeFigureOut">
               <a:rPr lang="en-US" smtClean="0"/>
-              <a:t>1/17/20</a:t>
+              <a:t>1/22/20</a:t>
             </a:fld>
             <a:endParaRPr lang="en-US"/>
           </a:p>
@@ -2918,7 +2919,7 @@
           <a:p>
             <a:fld id="{CCDCEAF4-DC6A-ED4A-9D76-9EB0158D3920}" type="datetimeFigureOut">
               <a:rPr lang="en-US" smtClean="0"/>
-              <a:t>1/17/20</a:t>
+              <a:t>1/22/20</a:t>
             </a:fld>
             <a:endParaRPr lang="en-US"/>
           </a:p>
@@ -8878,6 +8879,2983 @@
 </p:sld>
 </file>
 
+<file path=ppt/slides/slide11.xml><?xml version="1.0" encoding="utf-8"?>
+<p:sld xmlns:a="http://schemas.openxmlformats.org/drawingml/2006/main" xmlns:r="http://schemas.openxmlformats.org/officeDocument/2006/relationships" xmlns:p="http://schemas.openxmlformats.org/presentationml/2006/main">
+  <p:cSld>
+    <p:spTree>
+      <p:nvGrpSpPr>
+        <p:cNvPr id="1" name=""/>
+        <p:cNvGrpSpPr/>
+        <p:nvPr/>
+      </p:nvGrpSpPr>
+      <p:grpSpPr>
+        <a:xfrm>
+          <a:off x="0" y="0"/>
+          <a:ext cx="0" cy="0"/>
+          <a:chOff x="0" y="0"/>
+          <a:chExt cx="0" cy="0"/>
+        </a:xfrm>
+      </p:grpSpPr>
+      <mc:AlternateContent xmlns:mc="http://schemas.openxmlformats.org/markup-compatibility/2006" xmlns:a14="http://schemas.microsoft.com/office/drawing/2010/main">
+        <mc:Choice Requires="a14">
+          <p:sp>
+            <p:nvSpPr>
+              <p:cNvPr id="4" name="Oval 3"/>
+              <p:cNvSpPr/>
+              <p:nvPr/>
+            </p:nvSpPr>
+            <p:spPr>
+              <a:xfrm>
+                <a:off x="3321439" y="2964275"/>
+                <a:ext cx="457200" cy="457200"/>
+              </a:xfrm>
+              <a:prstGeom prst="ellipse">
+                <a:avLst/>
+              </a:prstGeom>
+              <a:noFill/>
+              <a:ln>
+                <a:solidFill>
+                  <a:schemeClr val="tx1"/>
+                </a:solidFill>
+              </a:ln>
+            </p:spPr>
+            <p:style>
+              <a:lnRef idx="2">
+                <a:schemeClr val="accent1">
+                  <a:shade val="50000"/>
+                </a:schemeClr>
+              </a:lnRef>
+              <a:fillRef idx="1">
+                <a:schemeClr val="accent1"/>
+              </a:fillRef>
+              <a:effectRef idx="0">
+                <a:schemeClr val="accent1"/>
+              </a:effectRef>
+              <a:fontRef idx="minor">
+                <a:schemeClr val="lt1"/>
+              </a:fontRef>
+            </p:style>
+            <p:txBody>
+              <a:bodyPr rtlCol="0" anchor="ctr"/>
+              <a:lstStyle/>
+              <a:p>
+                <a:pPr algn="ctr"/>
+                <a14:m>
+                  <m:oMathPara xmlns:m="http://schemas.openxmlformats.org/officeDocument/2006/math">
+                    <m:oMathParaPr>
+                      <m:jc m:val="centerGroup"/>
+                    </m:oMathParaPr>
+                    <m:oMath xmlns:m="http://schemas.openxmlformats.org/officeDocument/2006/math">
+                      <m:sSub>
+                        <m:sSubPr>
+                          <m:ctrlPr>
+                            <a:rPr lang="en-US" b="0" i="1" smtClean="0">
+                              <a:solidFill>
+                                <a:schemeClr val="tx1"/>
+                              </a:solidFill>
+                              <a:latin typeface="Cambria Math" panose="02040503050406030204" pitchFamily="18" charset="0"/>
+                            </a:rPr>
+                          </m:ctrlPr>
+                        </m:sSubPr>
+                        <m:e>
+                          <m:r>
+                            <a:rPr lang="en-US" b="0" i="1" smtClean="0">
+                              <a:solidFill>
+                                <a:schemeClr val="tx1"/>
+                              </a:solidFill>
+                              <a:latin typeface="Cambria Math" charset="0"/>
+                            </a:rPr>
+                            <m:t>𝑥</m:t>
+                          </m:r>
+                        </m:e>
+                        <m:sub>
+                          <m:r>
+                            <a:rPr lang="en-US" b="0" i="1" smtClean="0">
+                              <a:solidFill>
+                                <a:schemeClr val="tx1"/>
+                              </a:solidFill>
+                              <a:latin typeface="Cambria Math" charset="0"/>
+                            </a:rPr>
+                            <m:t>0</m:t>
+                          </m:r>
+                        </m:sub>
+                      </m:sSub>
+                    </m:oMath>
+                  </m:oMathPara>
+                </a14:m>
+                <a:endParaRPr lang="en-US" dirty="0">
+                  <a:solidFill>
+                    <a:schemeClr val="tx1"/>
+                  </a:solidFill>
+                </a:endParaRPr>
+              </a:p>
+            </p:txBody>
+          </p:sp>
+        </mc:Choice>
+        <mc:Fallback xmlns="">
+          <p:sp>
+            <p:nvSpPr>
+              <p:cNvPr id="4" name="Oval 3"/>
+              <p:cNvSpPr>
+                <a:spLocks noRot="1" noChangeAspect="1" noMove="1" noResize="1" noEditPoints="1" noAdjustHandles="1" noChangeArrowheads="1" noChangeShapeType="1" noTextEdit="1"/>
+              </p:cNvSpPr>
+              <p:nvPr/>
+            </p:nvSpPr>
+            <p:spPr>
+              <a:xfrm>
+                <a:off x="3321439" y="2964275"/>
+                <a:ext cx="457200" cy="457200"/>
+              </a:xfrm>
+              <a:prstGeom prst="ellipse">
+                <a:avLst/>
+              </a:prstGeom>
+              <a:blipFill rotWithShape="0">
+                <a:blip r:embed="rId2"/>
+                <a:stretch>
+                  <a:fillRect/>
+                </a:stretch>
+              </a:blipFill>
+              <a:ln>
+                <a:solidFill>
+                  <a:schemeClr val="tx1"/>
+                </a:solidFill>
+              </a:ln>
+            </p:spPr>
+            <p:txBody>
+              <a:bodyPr/>
+              <a:lstStyle/>
+              <a:p>
+                <a:r>
+                  <a:rPr lang="en-US">
+                    <a:noFill/>
+                  </a:rPr>
+                  <a:t> </a:t>
+                </a:r>
+              </a:p>
+            </p:txBody>
+          </p:sp>
+        </mc:Fallback>
+      </mc:AlternateContent>
+      <mc:AlternateContent xmlns:mc="http://schemas.openxmlformats.org/markup-compatibility/2006" xmlns:a14="http://schemas.microsoft.com/office/drawing/2010/main">
+        <mc:Choice Requires="a14">
+          <p:sp>
+            <p:nvSpPr>
+              <p:cNvPr id="5" name="Oval 4"/>
+              <p:cNvSpPr/>
+              <p:nvPr/>
+            </p:nvSpPr>
+            <p:spPr>
+              <a:xfrm>
+                <a:off x="4045001" y="4019858"/>
+                <a:ext cx="457200" cy="457200"/>
+              </a:xfrm>
+              <a:prstGeom prst="ellipse">
+                <a:avLst/>
+              </a:prstGeom>
+              <a:noFill/>
+              <a:ln>
+                <a:solidFill>
+                  <a:schemeClr val="tx1"/>
+                </a:solidFill>
+              </a:ln>
+            </p:spPr>
+            <p:style>
+              <a:lnRef idx="2">
+                <a:schemeClr val="accent1">
+                  <a:shade val="50000"/>
+                </a:schemeClr>
+              </a:lnRef>
+              <a:fillRef idx="1">
+                <a:schemeClr val="accent1"/>
+              </a:fillRef>
+              <a:effectRef idx="0">
+                <a:schemeClr val="accent1"/>
+              </a:effectRef>
+              <a:fontRef idx="minor">
+                <a:schemeClr val="lt1"/>
+              </a:fontRef>
+            </p:style>
+            <p:txBody>
+              <a:bodyPr rtlCol="0" anchor="ctr"/>
+              <a:lstStyle/>
+              <a:p>
+                <a:pPr algn="ctr"/>
+                <a14:m>
+                  <m:oMathPara xmlns:m="http://schemas.openxmlformats.org/officeDocument/2006/math">
+                    <m:oMathParaPr>
+                      <m:jc m:val="centerGroup"/>
+                    </m:oMathParaPr>
+                    <m:oMath xmlns:m="http://schemas.openxmlformats.org/officeDocument/2006/math">
+                      <m:sSub>
+                        <m:sSubPr>
+                          <m:ctrlPr>
+                            <a:rPr lang="en-US" b="0" i="1" smtClean="0">
+                              <a:solidFill>
+                                <a:schemeClr val="tx1"/>
+                              </a:solidFill>
+                              <a:latin typeface="Cambria Math" panose="02040503050406030204" pitchFamily="18" charset="0"/>
+                            </a:rPr>
+                          </m:ctrlPr>
+                        </m:sSubPr>
+                        <m:e>
+                          <m:r>
+                            <a:rPr lang="en-US" b="0" i="1" smtClean="0">
+                              <a:solidFill>
+                                <a:schemeClr val="tx1"/>
+                              </a:solidFill>
+                              <a:latin typeface="Cambria Math" charset="0"/>
+                            </a:rPr>
+                            <m:t>𝑢</m:t>
+                          </m:r>
+                        </m:e>
+                        <m:sub>
+                          <m:r>
+                            <a:rPr lang="en-US" b="0" i="1" smtClean="0">
+                              <a:solidFill>
+                                <a:schemeClr val="tx1"/>
+                              </a:solidFill>
+                              <a:latin typeface="Cambria Math" charset="0"/>
+                            </a:rPr>
+                            <m:t>0</m:t>
+                          </m:r>
+                        </m:sub>
+                      </m:sSub>
+                    </m:oMath>
+                  </m:oMathPara>
+                </a14:m>
+                <a:endParaRPr lang="en-US" dirty="0">
+                  <a:solidFill>
+                    <a:schemeClr val="tx1"/>
+                  </a:solidFill>
+                </a:endParaRPr>
+              </a:p>
+            </p:txBody>
+          </p:sp>
+        </mc:Choice>
+        <mc:Fallback xmlns="">
+          <p:sp>
+            <p:nvSpPr>
+              <p:cNvPr id="5" name="Oval 4"/>
+              <p:cNvSpPr>
+                <a:spLocks noRot="1" noChangeAspect="1" noMove="1" noResize="1" noEditPoints="1" noAdjustHandles="1" noChangeArrowheads="1" noChangeShapeType="1" noTextEdit="1"/>
+              </p:cNvSpPr>
+              <p:nvPr/>
+            </p:nvSpPr>
+            <p:spPr>
+              <a:xfrm>
+                <a:off x="4045001" y="4019858"/>
+                <a:ext cx="457200" cy="457200"/>
+              </a:xfrm>
+              <a:prstGeom prst="ellipse">
+                <a:avLst/>
+              </a:prstGeom>
+              <a:blipFill rotWithShape="0">
+                <a:blip r:embed="rId3"/>
+                <a:stretch>
+                  <a:fillRect/>
+                </a:stretch>
+              </a:blipFill>
+              <a:ln>
+                <a:solidFill>
+                  <a:schemeClr val="tx1"/>
+                </a:solidFill>
+              </a:ln>
+            </p:spPr>
+            <p:txBody>
+              <a:bodyPr/>
+              <a:lstStyle/>
+              <a:p>
+                <a:r>
+                  <a:rPr lang="en-US">
+                    <a:noFill/>
+                  </a:rPr>
+                  <a:t> </a:t>
+                </a:r>
+              </a:p>
+            </p:txBody>
+          </p:sp>
+        </mc:Fallback>
+      </mc:AlternateContent>
+      <mc:AlternateContent xmlns:mc="http://schemas.openxmlformats.org/markup-compatibility/2006" xmlns:a14="http://schemas.microsoft.com/office/drawing/2010/main">
+        <mc:Choice Requires="a14">
+          <p:sp>
+            <p:nvSpPr>
+              <p:cNvPr id="6" name="Oval 5"/>
+              <p:cNvSpPr/>
+              <p:nvPr/>
+            </p:nvSpPr>
+            <p:spPr>
+              <a:xfrm>
+                <a:off x="5088326" y="2964275"/>
+                <a:ext cx="457200" cy="457200"/>
+              </a:xfrm>
+              <a:prstGeom prst="ellipse">
+                <a:avLst/>
+              </a:prstGeom>
+              <a:noFill/>
+              <a:ln>
+                <a:solidFill>
+                  <a:schemeClr val="tx1"/>
+                </a:solidFill>
+              </a:ln>
+            </p:spPr>
+            <p:style>
+              <a:lnRef idx="2">
+                <a:schemeClr val="accent1">
+                  <a:shade val="50000"/>
+                </a:schemeClr>
+              </a:lnRef>
+              <a:fillRef idx="1">
+                <a:schemeClr val="accent1"/>
+              </a:fillRef>
+              <a:effectRef idx="0">
+                <a:schemeClr val="accent1"/>
+              </a:effectRef>
+              <a:fontRef idx="minor">
+                <a:schemeClr val="lt1"/>
+              </a:fontRef>
+            </p:style>
+            <p:txBody>
+              <a:bodyPr rtlCol="0" anchor="ctr"/>
+              <a:lstStyle/>
+              <a:p>
+                <a:pPr algn="ctr"/>
+                <a14:m>
+                  <m:oMathPara xmlns:m="http://schemas.openxmlformats.org/officeDocument/2006/math">
+                    <m:oMathParaPr>
+                      <m:jc m:val="centerGroup"/>
+                    </m:oMathParaPr>
+                    <m:oMath xmlns:m="http://schemas.openxmlformats.org/officeDocument/2006/math">
+                      <m:sSub>
+                        <m:sSubPr>
+                          <m:ctrlPr>
+                            <a:rPr lang="en-US" b="0" i="1" smtClean="0">
+                              <a:solidFill>
+                                <a:schemeClr val="tx1"/>
+                              </a:solidFill>
+                              <a:latin typeface="Cambria Math" panose="02040503050406030204" pitchFamily="18" charset="0"/>
+                            </a:rPr>
+                          </m:ctrlPr>
+                        </m:sSubPr>
+                        <m:e>
+                          <m:r>
+                            <a:rPr lang="en-US" b="0" i="1" smtClean="0">
+                              <a:solidFill>
+                                <a:schemeClr val="tx1"/>
+                              </a:solidFill>
+                              <a:latin typeface="Cambria Math" charset="0"/>
+                            </a:rPr>
+                            <m:t>𝑥</m:t>
+                          </m:r>
+                        </m:e>
+                        <m:sub>
+                          <m:r>
+                            <a:rPr lang="en-US" b="0" i="1" smtClean="0">
+                              <a:solidFill>
+                                <a:schemeClr val="tx1"/>
+                              </a:solidFill>
+                              <a:latin typeface="Cambria Math" charset="0"/>
+                            </a:rPr>
+                            <m:t>1</m:t>
+                          </m:r>
+                        </m:sub>
+                      </m:sSub>
+                    </m:oMath>
+                  </m:oMathPara>
+                </a14:m>
+                <a:endParaRPr lang="en-US" dirty="0">
+                  <a:solidFill>
+                    <a:schemeClr val="tx1"/>
+                  </a:solidFill>
+                </a:endParaRPr>
+              </a:p>
+            </p:txBody>
+          </p:sp>
+        </mc:Choice>
+        <mc:Fallback xmlns="">
+          <p:sp>
+            <p:nvSpPr>
+              <p:cNvPr id="6" name="Oval 5"/>
+              <p:cNvSpPr>
+                <a:spLocks noRot="1" noChangeAspect="1" noMove="1" noResize="1" noEditPoints="1" noAdjustHandles="1" noChangeArrowheads="1" noChangeShapeType="1" noTextEdit="1"/>
+              </p:cNvSpPr>
+              <p:nvPr/>
+            </p:nvSpPr>
+            <p:spPr>
+              <a:xfrm>
+                <a:off x="5088326" y="2964275"/>
+                <a:ext cx="457200" cy="457200"/>
+              </a:xfrm>
+              <a:prstGeom prst="ellipse">
+                <a:avLst/>
+              </a:prstGeom>
+              <a:blipFill rotWithShape="0">
+                <a:blip r:embed="rId4"/>
+                <a:stretch>
+                  <a:fillRect/>
+                </a:stretch>
+              </a:blipFill>
+              <a:ln>
+                <a:solidFill>
+                  <a:schemeClr val="tx1"/>
+                </a:solidFill>
+              </a:ln>
+            </p:spPr>
+            <p:txBody>
+              <a:bodyPr/>
+              <a:lstStyle/>
+              <a:p>
+                <a:r>
+                  <a:rPr lang="en-US">
+                    <a:noFill/>
+                  </a:rPr>
+                  <a:t> </a:t>
+                </a:r>
+              </a:p>
+            </p:txBody>
+          </p:sp>
+        </mc:Fallback>
+      </mc:AlternateContent>
+      <mc:AlternateContent xmlns:mc="http://schemas.openxmlformats.org/markup-compatibility/2006" xmlns:a14="http://schemas.microsoft.com/office/drawing/2010/main">
+        <mc:Choice Requires="a14">
+          <p:sp>
+            <p:nvSpPr>
+              <p:cNvPr id="7" name="Oval 6"/>
+              <p:cNvSpPr/>
+              <p:nvPr/>
+            </p:nvSpPr>
+            <p:spPr>
+              <a:xfrm>
+                <a:off x="5815559" y="4019858"/>
+                <a:ext cx="457200" cy="457200"/>
+              </a:xfrm>
+              <a:prstGeom prst="ellipse">
+                <a:avLst/>
+              </a:prstGeom>
+              <a:noFill/>
+              <a:ln>
+                <a:solidFill>
+                  <a:schemeClr val="tx1"/>
+                </a:solidFill>
+              </a:ln>
+            </p:spPr>
+            <p:style>
+              <a:lnRef idx="2">
+                <a:schemeClr val="accent1">
+                  <a:shade val="50000"/>
+                </a:schemeClr>
+              </a:lnRef>
+              <a:fillRef idx="1">
+                <a:schemeClr val="accent1"/>
+              </a:fillRef>
+              <a:effectRef idx="0">
+                <a:schemeClr val="accent1"/>
+              </a:effectRef>
+              <a:fontRef idx="minor">
+                <a:schemeClr val="lt1"/>
+              </a:fontRef>
+            </p:style>
+            <p:txBody>
+              <a:bodyPr rtlCol="0" anchor="ctr"/>
+              <a:lstStyle/>
+              <a:p>
+                <a:pPr algn="ctr"/>
+                <a14:m>
+                  <m:oMathPara xmlns:m="http://schemas.openxmlformats.org/officeDocument/2006/math">
+                    <m:oMathParaPr>
+                      <m:jc m:val="centerGroup"/>
+                    </m:oMathParaPr>
+                    <m:oMath xmlns:m="http://schemas.openxmlformats.org/officeDocument/2006/math">
+                      <m:sSub>
+                        <m:sSubPr>
+                          <m:ctrlPr>
+                            <a:rPr lang="en-US" b="0" i="1" smtClean="0">
+                              <a:solidFill>
+                                <a:schemeClr val="tx1"/>
+                              </a:solidFill>
+                              <a:latin typeface="Cambria Math" panose="02040503050406030204" pitchFamily="18" charset="0"/>
+                            </a:rPr>
+                          </m:ctrlPr>
+                        </m:sSubPr>
+                        <m:e>
+                          <m:r>
+                            <a:rPr lang="en-US" b="0" i="1" smtClean="0">
+                              <a:solidFill>
+                                <a:schemeClr val="tx1"/>
+                              </a:solidFill>
+                              <a:latin typeface="Cambria Math" charset="0"/>
+                            </a:rPr>
+                            <m:t>𝑢</m:t>
+                          </m:r>
+                        </m:e>
+                        <m:sub>
+                          <m:r>
+                            <a:rPr lang="en-US" b="0" i="1" smtClean="0">
+                              <a:solidFill>
+                                <a:schemeClr val="tx1"/>
+                              </a:solidFill>
+                              <a:latin typeface="Cambria Math" charset="0"/>
+                            </a:rPr>
+                            <m:t>1</m:t>
+                          </m:r>
+                        </m:sub>
+                      </m:sSub>
+                    </m:oMath>
+                  </m:oMathPara>
+                </a14:m>
+                <a:endParaRPr lang="en-US" dirty="0">
+                  <a:solidFill>
+                    <a:schemeClr val="tx1"/>
+                  </a:solidFill>
+                </a:endParaRPr>
+              </a:p>
+            </p:txBody>
+          </p:sp>
+        </mc:Choice>
+        <mc:Fallback xmlns="">
+          <p:sp>
+            <p:nvSpPr>
+              <p:cNvPr id="7" name="Oval 6"/>
+              <p:cNvSpPr>
+                <a:spLocks noRot="1" noChangeAspect="1" noMove="1" noResize="1" noEditPoints="1" noAdjustHandles="1" noChangeArrowheads="1" noChangeShapeType="1" noTextEdit="1"/>
+              </p:cNvSpPr>
+              <p:nvPr/>
+            </p:nvSpPr>
+            <p:spPr>
+              <a:xfrm>
+                <a:off x="5815559" y="4019858"/>
+                <a:ext cx="457200" cy="457200"/>
+              </a:xfrm>
+              <a:prstGeom prst="ellipse">
+                <a:avLst/>
+              </a:prstGeom>
+              <a:blipFill rotWithShape="0">
+                <a:blip r:embed="rId5"/>
+                <a:stretch>
+                  <a:fillRect/>
+                </a:stretch>
+              </a:blipFill>
+              <a:ln>
+                <a:solidFill>
+                  <a:schemeClr val="tx1"/>
+                </a:solidFill>
+              </a:ln>
+            </p:spPr>
+            <p:txBody>
+              <a:bodyPr/>
+              <a:lstStyle/>
+              <a:p>
+                <a:r>
+                  <a:rPr lang="en-US">
+                    <a:noFill/>
+                  </a:rPr>
+                  <a:t> </a:t>
+                </a:r>
+              </a:p>
+            </p:txBody>
+          </p:sp>
+        </mc:Fallback>
+      </mc:AlternateContent>
+      <mc:AlternateContent xmlns:mc="http://schemas.openxmlformats.org/markup-compatibility/2006" xmlns:a14="http://schemas.microsoft.com/office/drawing/2010/main">
+        <mc:Choice Requires="a14">
+          <p:sp>
+            <p:nvSpPr>
+              <p:cNvPr id="9" name="Oval 8"/>
+              <p:cNvSpPr/>
+              <p:nvPr/>
+            </p:nvSpPr>
+            <p:spPr>
+              <a:xfrm>
+                <a:off x="6855213" y="2964275"/>
+                <a:ext cx="457200" cy="457200"/>
+              </a:xfrm>
+              <a:prstGeom prst="ellipse">
+                <a:avLst/>
+              </a:prstGeom>
+              <a:noFill/>
+              <a:ln>
+                <a:solidFill>
+                  <a:schemeClr val="tx1"/>
+                </a:solidFill>
+              </a:ln>
+            </p:spPr>
+            <p:style>
+              <a:lnRef idx="2">
+                <a:schemeClr val="accent1">
+                  <a:shade val="50000"/>
+                </a:schemeClr>
+              </a:lnRef>
+              <a:fillRef idx="1">
+                <a:schemeClr val="accent1"/>
+              </a:fillRef>
+              <a:effectRef idx="0">
+                <a:schemeClr val="accent1"/>
+              </a:effectRef>
+              <a:fontRef idx="minor">
+                <a:schemeClr val="lt1"/>
+              </a:fontRef>
+            </p:style>
+            <p:txBody>
+              <a:bodyPr rtlCol="0" anchor="ctr"/>
+              <a:lstStyle/>
+              <a:p>
+                <a:pPr algn="ctr"/>
+                <a14:m>
+                  <m:oMathPara xmlns:m="http://schemas.openxmlformats.org/officeDocument/2006/math">
+                    <m:oMathParaPr>
+                      <m:jc m:val="centerGroup"/>
+                    </m:oMathParaPr>
+                    <m:oMath xmlns:m="http://schemas.openxmlformats.org/officeDocument/2006/math">
+                      <m:sSub>
+                        <m:sSubPr>
+                          <m:ctrlPr>
+                            <a:rPr lang="en-US" b="0" i="1" smtClean="0">
+                              <a:solidFill>
+                                <a:schemeClr val="tx1"/>
+                              </a:solidFill>
+                              <a:latin typeface="Cambria Math" panose="02040503050406030204" pitchFamily="18" charset="0"/>
+                            </a:rPr>
+                          </m:ctrlPr>
+                        </m:sSubPr>
+                        <m:e>
+                          <m:r>
+                            <a:rPr lang="en-US" b="0" i="1" smtClean="0">
+                              <a:solidFill>
+                                <a:schemeClr val="tx1"/>
+                              </a:solidFill>
+                              <a:latin typeface="Cambria Math" charset="0"/>
+                            </a:rPr>
+                            <m:t>𝑥</m:t>
+                          </m:r>
+                        </m:e>
+                        <m:sub>
+                          <m:r>
+                            <a:rPr lang="en-US" b="0" i="1" smtClean="0">
+                              <a:solidFill>
+                                <a:schemeClr val="tx1"/>
+                              </a:solidFill>
+                              <a:latin typeface="Cambria Math" charset="0"/>
+                            </a:rPr>
+                            <m:t>2</m:t>
+                          </m:r>
+                        </m:sub>
+                      </m:sSub>
+                    </m:oMath>
+                  </m:oMathPara>
+                </a14:m>
+                <a:endParaRPr lang="en-US" dirty="0">
+                  <a:solidFill>
+                    <a:schemeClr val="tx1"/>
+                  </a:solidFill>
+                </a:endParaRPr>
+              </a:p>
+            </p:txBody>
+          </p:sp>
+        </mc:Choice>
+        <mc:Fallback xmlns="">
+          <p:sp>
+            <p:nvSpPr>
+              <p:cNvPr id="9" name="Oval 8"/>
+              <p:cNvSpPr>
+                <a:spLocks noRot="1" noChangeAspect="1" noMove="1" noResize="1" noEditPoints="1" noAdjustHandles="1" noChangeArrowheads="1" noChangeShapeType="1" noTextEdit="1"/>
+              </p:cNvSpPr>
+              <p:nvPr/>
+            </p:nvSpPr>
+            <p:spPr>
+              <a:xfrm>
+                <a:off x="6855213" y="2964275"/>
+                <a:ext cx="457200" cy="457200"/>
+              </a:xfrm>
+              <a:prstGeom prst="ellipse">
+                <a:avLst/>
+              </a:prstGeom>
+              <a:blipFill rotWithShape="0">
+                <a:blip r:embed="rId6"/>
+                <a:stretch>
+                  <a:fillRect/>
+                </a:stretch>
+              </a:blipFill>
+              <a:ln>
+                <a:solidFill>
+                  <a:schemeClr val="tx1"/>
+                </a:solidFill>
+              </a:ln>
+            </p:spPr>
+            <p:txBody>
+              <a:bodyPr/>
+              <a:lstStyle/>
+              <a:p>
+                <a:r>
+                  <a:rPr lang="en-US">
+                    <a:noFill/>
+                  </a:rPr>
+                  <a:t> </a:t>
+                </a:r>
+              </a:p>
+            </p:txBody>
+          </p:sp>
+        </mc:Fallback>
+      </mc:AlternateContent>
+      <p:sp>
+        <p:nvSpPr>
+          <p:cNvPr id="10" name="Oval 9"/>
+          <p:cNvSpPr/>
+          <p:nvPr/>
+        </p:nvSpPr>
+        <p:spPr>
+          <a:xfrm>
+            <a:off x="4227881" y="3421475"/>
+            <a:ext cx="91440" cy="91440"/>
+          </a:xfrm>
+          <a:prstGeom prst="ellipse">
+            <a:avLst/>
+          </a:prstGeom>
+          <a:solidFill>
+            <a:schemeClr val="tx1"/>
+          </a:solidFill>
+          <a:ln>
+            <a:solidFill>
+              <a:schemeClr val="tx1"/>
+            </a:solidFill>
+          </a:ln>
+        </p:spPr>
+        <p:style>
+          <a:lnRef idx="2">
+            <a:schemeClr val="accent1">
+              <a:shade val="50000"/>
+            </a:schemeClr>
+          </a:lnRef>
+          <a:fillRef idx="1">
+            <a:schemeClr val="accent1"/>
+          </a:fillRef>
+          <a:effectRef idx="0">
+            <a:schemeClr val="accent1"/>
+          </a:effectRef>
+          <a:fontRef idx="minor">
+            <a:schemeClr val="lt1"/>
+          </a:fontRef>
+        </p:style>
+        <p:txBody>
+          <a:bodyPr rtlCol="0" anchor="ctr"/>
+          <a:lstStyle/>
+          <a:p>
+            <a:pPr algn="ctr"/>
+            <a:endParaRPr lang="en-US"/>
+          </a:p>
+        </p:txBody>
+      </p:sp>
+      <p:cxnSp>
+        <p:nvCxnSpPr>
+          <p:cNvPr id="12" name="Straight Connector 11"/>
+          <p:cNvCxnSpPr>
+            <a:stCxn id="10" idx="2"/>
+            <a:endCxn id="4" idx="6"/>
+          </p:cNvCxnSpPr>
+          <p:nvPr/>
+        </p:nvCxnSpPr>
+        <p:spPr>
+          <a:xfrm flipH="1" flipV="1">
+            <a:off x="3778639" y="3192875"/>
+            <a:ext cx="449242" cy="274320"/>
+          </a:xfrm>
+          <a:prstGeom prst="line">
+            <a:avLst/>
+          </a:prstGeom>
+          <a:ln>
+            <a:solidFill>
+              <a:schemeClr val="tx1"/>
+            </a:solidFill>
+          </a:ln>
+        </p:spPr>
+        <p:style>
+          <a:lnRef idx="1">
+            <a:schemeClr val="accent1"/>
+          </a:lnRef>
+          <a:fillRef idx="0">
+            <a:schemeClr val="accent1"/>
+          </a:fillRef>
+          <a:effectRef idx="0">
+            <a:schemeClr val="accent1"/>
+          </a:effectRef>
+          <a:fontRef idx="minor">
+            <a:schemeClr val="tx1"/>
+          </a:fontRef>
+        </p:style>
+      </p:cxnSp>
+      <p:cxnSp>
+        <p:nvCxnSpPr>
+          <p:cNvPr id="13" name="Straight Connector 12"/>
+          <p:cNvCxnSpPr>
+            <a:stCxn id="10" idx="4"/>
+            <a:endCxn id="5" idx="0"/>
+          </p:cNvCxnSpPr>
+          <p:nvPr/>
+        </p:nvCxnSpPr>
+        <p:spPr>
+          <a:xfrm>
+            <a:off x="4273601" y="3512915"/>
+            <a:ext cx="0" cy="506943"/>
+          </a:xfrm>
+          <a:prstGeom prst="line">
+            <a:avLst/>
+          </a:prstGeom>
+          <a:ln>
+            <a:solidFill>
+              <a:schemeClr val="tx1"/>
+            </a:solidFill>
+          </a:ln>
+        </p:spPr>
+        <p:style>
+          <a:lnRef idx="1">
+            <a:schemeClr val="accent1"/>
+          </a:lnRef>
+          <a:fillRef idx="0">
+            <a:schemeClr val="accent1"/>
+          </a:fillRef>
+          <a:effectRef idx="0">
+            <a:schemeClr val="accent1"/>
+          </a:effectRef>
+          <a:fontRef idx="minor">
+            <a:schemeClr val="tx1"/>
+          </a:fontRef>
+        </p:style>
+      </p:cxnSp>
+      <p:cxnSp>
+        <p:nvCxnSpPr>
+          <p:cNvPr id="16" name="Straight Connector 15"/>
+          <p:cNvCxnSpPr>
+            <a:stCxn id="6" idx="2"/>
+            <a:endCxn id="10" idx="6"/>
+          </p:cNvCxnSpPr>
+          <p:nvPr/>
+        </p:nvCxnSpPr>
+        <p:spPr>
+          <a:xfrm flipH="1">
+            <a:off x="4319321" y="3192875"/>
+            <a:ext cx="769005" cy="274320"/>
+          </a:xfrm>
+          <a:prstGeom prst="line">
+            <a:avLst/>
+          </a:prstGeom>
+          <a:ln>
+            <a:solidFill>
+              <a:schemeClr val="tx1"/>
+            </a:solidFill>
+          </a:ln>
+        </p:spPr>
+        <p:style>
+          <a:lnRef idx="1">
+            <a:schemeClr val="accent1"/>
+          </a:lnRef>
+          <a:fillRef idx="0">
+            <a:schemeClr val="accent1"/>
+          </a:fillRef>
+          <a:effectRef idx="0">
+            <a:schemeClr val="accent1"/>
+          </a:effectRef>
+          <a:fontRef idx="minor">
+            <a:schemeClr val="tx1"/>
+          </a:fontRef>
+        </p:style>
+      </p:cxnSp>
+      <p:sp>
+        <p:nvSpPr>
+          <p:cNvPr id="24" name="Oval 23"/>
+          <p:cNvSpPr/>
+          <p:nvPr/>
+        </p:nvSpPr>
+        <p:spPr>
+          <a:xfrm>
+            <a:off x="5998439" y="3467195"/>
+            <a:ext cx="91440" cy="91440"/>
+          </a:xfrm>
+          <a:prstGeom prst="ellipse">
+            <a:avLst/>
+          </a:prstGeom>
+          <a:solidFill>
+            <a:schemeClr val="tx1"/>
+          </a:solidFill>
+          <a:ln>
+            <a:solidFill>
+              <a:schemeClr val="tx1"/>
+            </a:solidFill>
+          </a:ln>
+        </p:spPr>
+        <p:style>
+          <a:lnRef idx="2">
+            <a:schemeClr val="accent1">
+              <a:shade val="50000"/>
+            </a:schemeClr>
+          </a:lnRef>
+          <a:fillRef idx="1">
+            <a:schemeClr val="accent1"/>
+          </a:fillRef>
+          <a:effectRef idx="0">
+            <a:schemeClr val="accent1"/>
+          </a:effectRef>
+          <a:fontRef idx="minor">
+            <a:schemeClr val="lt1"/>
+          </a:fontRef>
+        </p:style>
+        <p:txBody>
+          <a:bodyPr rtlCol="0" anchor="ctr"/>
+          <a:lstStyle/>
+          <a:p>
+            <a:pPr algn="ctr"/>
+            <a:endParaRPr lang="en-US"/>
+          </a:p>
+        </p:txBody>
+      </p:sp>
+      <p:cxnSp>
+        <p:nvCxnSpPr>
+          <p:cNvPr id="25" name="Straight Connector 24"/>
+          <p:cNvCxnSpPr/>
+          <p:nvPr/>
+        </p:nvCxnSpPr>
+        <p:spPr>
+          <a:xfrm flipH="1" flipV="1">
+            <a:off x="5549197" y="3238595"/>
+            <a:ext cx="449242" cy="274320"/>
+          </a:xfrm>
+          <a:prstGeom prst="line">
+            <a:avLst/>
+          </a:prstGeom>
+          <a:ln>
+            <a:solidFill>
+              <a:schemeClr val="tx1"/>
+            </a:solidFill>
+          </a:ln>
+        </p:spPr>
+        <p:style>
+          <a:lnRef idx="1">
+            <a:schemeClr val="accent1"/>
+          </a:lnRef>
+          <a:fillRef idx="0">
+            <a:schemeClr val="accent1"/>
+          </a:fillRef>
+          <a:effectRef idx="0">
+            <a:schemeClr val="accent1"/>
+          </a:effectRef>
+          <a:fontRef idx="minor">
+            <a:schemeClr val="tx1"/>
+          </a:fontRef>
+        </p:style>
+      </p:cxnSp>
+      <p:cxnSp>
+        <p:nvCxnSpPr>
+          <p:cNvPr id="27" name="Straight Connector 26"/>
+          <p:cNvCxnSpPr/>
+          <p:nvPr/>
+        </p:nvCxnSpPr>
+        <p:spPr>
+          <a:xfrm flipH="1">
+            <a:off x="6089879" y="3238595"/>
+            <a:ext cx="769005" cy="274320"/>
+          </a:xfrm>
+          <a:prstGeom prst="line">
+            <a:avLst/>
+          </a:prstGeom>
+          <a:ln>
+            <a:solidFill>
+              <a:schemeClr val="tx1"/>
+            </a:solidFill>
+          </a:ln>
+        </p:spPr>
+        <p:style>
+          <a:lnRef idx="1">
+            <a:schemeClr val="accent1"/>
+          </a:lnRef>
+          <a:fillRef idx="0">
+            <a:schemeClr val="accent1"/>
+          </a:fillRef>
+          <a:effectRef idx="0">
+            <a:schemeClr val="accent1"/>
+          </a:effectRef>
+          <a:fontRef idx="minor">
+            <a:schemeClr val="tx1"/>
+          </a:fontRef>
+        </p:style>
+      </p:cxnSp>
+      <p:sp>
+        <p:nvSpPr>
+          <p:cNvPr id="599" name="Oval 598"/>
+          <p:cNvSpPr/>
+          <p:nvPr/>
+        </p:nvSpPr>
+        <p:spPr>
+          <a:xfrm>
+            <a:off x="3504319" y="2473438"/>
+            <a:ext cx="91440" cy="91440"/>
+          </a:xfrm>
+          <a:prstGeom prst="ellipse">
+            <a:avLst/>
+          </a:prstGeom>
+          <a:solidFill>
+            <a:schemeClr val="tx1"/>
+          </a:solidFill>
+          <a:ln>
+            <a:solidFill>
+              <a:schemeClr val="tx1"/>
+            </a:solidFill>
+          </a:ln>
+        </p:spPr>
+        <p:style>
+          <a:lnRef idx="2">
+            <a:schemeClr val="accent1">
+              <a:shade val="50000"/>
+            </a:schemeClr>
+          </a:lnRef>
+          <a:fillRef idx="1">
+            <a:schemeClr val="accent1"/>
+          </a:fillRef>
+          <a:effectRef idx="0">
+            <a:schemeClr val="accent1"/>
+          </a:effectRef>
+          <a:fontRef idx="minor">
+            <a:schemeClr val="lt1"/>
+          </a:fontRef>
+        </p:style>
+        <p:txBody>
+          <a:bodyPr rtlCol="0" anchor="ctr"/>
+          <a:lstStyle/>
+          <a:p>
+            <a:pPr algn="ctr"/>
+            <a:endParaRPr lang="en-US"/>
+          </a:p>
+        </p:txBody>
+      </p:sp>
+      <p:cxnSp>
+        <p:nvCxnSpPr>
+          <p:cNvPr id="600" name="Straight Connector 599"/>
+          <p:cNvCxnSpPr>
+            <a:stCxn id="4" idx="0"/>
+            <a:endCxn id="599" idx="4"/>
+          </p:cNvCxnSpPr>
+          <p:nvPr/>
+        </p:nvCxnSpPr>
+        <p:spPr>
+          <a:xfrm flipV="1">
+            <a:off x="3550039" y="2564878"/>
+            <a:ext cx="0" cy="399397"/>
+          </a:xfrm>
+          <a:prstGeom prst="line">
+            <a:avLst/>
+          </a:prstGeom>
+          <a:ln>
+            <a:solidFill>
+              <a:schemeClr val="tx1"/>
+            </a:solidFill>
+            <a:prstDash val="dash"/>
+          </a:ln>
+        </p:spPr>
+        <p:style>
+          <a:lnRef idx="1">
+            <a:schemeClr val="accent1"/>
+          </a:lnRef>
+          <a:fillRef idx="0">
+            <a:schemeClr val="accent1"/>
+          </a:fillRef>
+          <a:effectRef idx="0">
+            <a:schemeClr val="accent1"/>
+          </a:effectRef>
+          <a:fontRef idx="minor">
+            <a:schemeClr val="tx1"/>
+          </a:fontRef>
+        </p:style>
+      </p:cxnSp>
+      <p:sp>
+        <p:nvSpPr>
+          <p:cNvPr id="609" name="Oval 608"/>
+          <p:cNvSpPr/>
+          <p:nvPr/>
+        </p:nvSpPr>
+        <p:spPr>
+          <a:xfrm>
+            <a:off x="5267454" y="2470223"/>
+            <a:ext cx="91440" cy="91440"/>
+          </a:xfrm>
+          <a:prstGeom prst="ellipse">
+            <a:avLst/>
+          </a:prstGeom>
+          <a:solidFill>
+            <a:schemeClr val="tx1"/>
+          </a:solidFill>
+          <a:ln>
+            <a:solidFill>
+              <a:schemeClr val="tx1"/>
+            </a:solidFill>
+          </a:ln>
+        </p:spPr>
+        <p:style>
+          <a:lnRef idx="2">
+            <a:schemeClr val="accent1">
+              <a:shade val="50000"/>
+            </a:schemeClr>
+          </a:lnRef>
+          <a:fillRef idx="1">
+            <a:schemeClr val="accent1"/>
+          </a:fillRef>
+          <a:effectRef idx="0">
+            <a:schemeClr val="accent1"/>
+          </a:effectRef>
+          <a:fontRef idx="minor">
+            <a:schemeClr val="lt1"/>
+          </a:fontRef>
+        </p:style>
+        <p:txBody>
+          <a:bodyPr rtlCol="0" anchor="ctr"/>
+          <a:lstStyle/>
+          <a:p>
+            <a:pPr algn="ctr"/>
+            <a:endParaRPr lang="en-US"/>
+          </a:p>
+        </p:txBody>
+      </p:sp>
+      <p:cxnSp>
+        <p:nvCxnSpPr>
+          <p:cNvPr id="610" name="Straight Connector 609"/>
+          <p:cNvCxnSpPr/>
+          <p:nvPr/>
+        </p:nvCxnSpPr>
+        <p:spPr>
+          <a:xfrm flipV="1">
+            <a:off x="5313174" y="2561663"/>
+            <a:ext cx="0" cy="399397"/>
+          </a:xfrm>
+          <a:prstGeom prst="line">
+            <a:avLst/>
+          </a:prstGeom>
+          <a:ln>
+            <a:solidFill>
+              <a:schemeClr val="tx1"/>
+            </a:solidFill>
+            <a:prstDash val="dash"/>
+          </a:ln>
+        </p:spPr>
+        <p:style>
+          <a:lnRef idx="1">
+            <a:schemeClr val="accent1"/>
+          </a:lnRef>
+          <a:fillRef idx="0">
+            <a:schemeClr val="accent1"/>
+          </a:fillRef>
+          <a:effectRef idx="0">
+            <a:schemeClr val="accent1"/>
+          </a:effectRef>
+          <a:fontRef idx="minor">
+            <a:schemeClr val="tx1"/>
+          </a:fontRef>
+        </p:style>
+      </p:cxnSp>
+      <p:sp>
+        <p:nvSpPr>
+          <p:cNvPr id="611" name="Oval 610"/>
+          <p:cNvSpPr/>
+          <p:nvPr/>
+        </p:nvSpPr>
+        <p:spPr>
+          <a:xfrm>
+            <a:off x="7050090" y="2470223"/>
+            <a:ext cx="91440" cy="91440"/>
+          </a:xfrm>
+          <a:prstGeom prst="ellipse">
+            <a:avLst/>
+          </a:prstGeom>
+          <a:solidFill>
+            <a:schemeClr val="tx1"/>
+          </a:solidFill>
+          <a:ln>
+            <a:solidFill>
+              <a:schemeClr val="tx1"/>
+            </a:solidFill>
+          </a:ln>
+        </p:spPr>
+        <p:style>
+          <a:lnRef idx="2">
+            <a:schemeClr val="accent1">
+              <a:shade val="50000"/>
+            </a:schemeClr>
+          </a:lnRef>
+          <a:fillRef idx="1">
+            <a:schemeClr val="accent1"/>
+          </a:fillRef>
+          <a:effectRef idx="0">
+            <a:schemeClr val="accent1"/>
+          </a:effectRef>
+          <a:fontRef idx="minor">
+            <a:schemeClr val="lt1"/>
+          </a:fontRef>
+        </p:style>
+        <p:txBody>
+          <a:bodyPr rtlCol="0" anchor="ctr"/>
+          <a:lstStyle/>
+          <a:p>
+            <a:pPr algn="ctr"/>
+            <a:endParaRPr lang="en-US"/>
+          </a:p>
+        </p:txBody>
+      </p:sp>
+      <p:cxnSp>
+        <p:nvCxnSpPr>
+          <p:cNvPr id="612" name="Straight Connector 611"/>
+          <p:cNvCxnSpPr/>
+          <p:nvPr/>
+        </p:nvCxnSpPr>
+        <p:spPr>
+          <a:xfrm flipV="1">
+            <a:off x="7095810" y="2561663"/>
+            <a:ext cx="0" cy="399397"/>
+          </a:xfrm>
+          <a:prstGeom prst="line">
+            <a:avLst/>
+          </a:prstGeom>
+          <a:ln>
+            <a:solidFill>
+              <a:schemeClr val="tx1"/>
+            </a:solidFill>
+            <a:prstDash val="dash"/>
+          </a:ln>
+        </p:spPr>
+        <p:style>
+          <a:lnRef idx="1">
+            <a:schemeClr val="accent1"/>
+          </a:lnRef>
+          <a:fillRef idx="0">
+            <a:schemeClr val="accent1"/>
+          </a:fillRef>
+          <a:effectRef idx="0">
+            <a:schemeClr val="accent1"/>
+          </a:effectRef>
+          <a:fontRef idx="minor">
+            <a:schemeClr val="tx1"/>
+          </a:fontRef>
+        </p:style>
+      </p:cxnSp>
+      <p:sp>
+        <p:nvSpPr>
+          <p:cNvPr id="613" name="Oval 612"/>
+          <p:cNvSpPr/>
+          <p:nvPr/>
+        </p:nvSpPr>
+        <p:spPr>
+          <a:xfrm>
+            <a:off x="4230525" y="4967637"/>
+            <a:ext cx="91440" cy="91440"/>
+          </a:xfrm>
+          <a:prstGeom prst="ellipse">
+            <a:avLst/>
+          </a:prstGeom>
+          <a:solidFill>
+            <a:schemeClr val="tx1"/>
+          </a:solidFill>
+          <a:ln>
+            <a:solidFill>
+              <a:schemeClr val="tx1"/>
+            </a:solidFill>
+          </a:ln>
+        </p:spPr>
+        <p:style>
+          <a:lnRef idx="2">
+            <a:schemeClr val="accent1">
+              <a:shade val="50000"/>
+            </a:schemeClr>
+          </a:lnRef>
+          <a:fillRef idx="1">
+            <a:schemeClr val="accent1"/>
+          </a:fillRef>
+          <a:effectRef idx="0">
+            <a:schemeClr val="accent1"/>
+          </a:effectRef>
+          <a:fontRef idx="minor">
+            <a:schemeClr val="lt1"/>
+          </a:fontRef>
+        </p:style>
+        <p:txBody>
+          <a:bodyPr rtlCol="0" anchor="ctr"/>
+          <a:lstStyle/>
+          <a:p>
+            <a:pPr algn="ctr"/>
+            <a:endParaRPr lang="en-US"/>
+          </a:p>
+        </p:txBody>
+      </p:sp>
+      <p:cxnSp>
+        <p:nvCxnSpPr>
+          <p:cNvPr id="614" name="Straight Connector 613"/>
+          <p:cNvCxnSpPr>
+            <a:stCxn id="613" idx="0"/>
+            <a:endCxn id="5" idx="4"/>
+          </p:cNvCxnSpPr>
+          <p:nvPr/>
+        </p:nvCxnSpPr>
+        <p:spPr>
+          <a:xfrm flipH="1" flipV="1">
+            <a:off x="4273601" y="4477058"/>
+            <a:ext cx="2644" cy="490579"/>
+          </a:xfrm>
+          <a:prstGeom prst="line">
+            <a:avLst/>
+          </a:prstGeom>
+          <a:ln>
+            <a:solidFill>
+              <a:schemeClr val="tx1"/>
+            </a:solidFill>
+            <a:prstDash val="dash"/>
+          </a:ln>
+        </p:spPr>
+        <p:style>
+          <a:lnRef idx="1">
+            <a:schemeClr val="accent1"/>
+          </a:lnRef>
+          <a:fillRef idx="0">
+            <a:schemeClr val="accent1"/>
+          </a:fillRef>
+          <a:effectRef idx="0">
+            <a:schemeClr val="accent1"/>
+          </a:effectRef>
+          <a:fontRef idx="minor">
+            <a:schemeClr val="tx1"/>
+          </a:fontRef>
+        </p:style>
+      </p:cxnSp>
+      <p:sp>
+        <p:nvSpPr>
+          <p:cNvPr id="618" name="Oval 617"/>
+          <p:cNvSpPr/>
+          <p:nvPr/>
+        </p:nvSpPr>
+        <p:spPr>
+          <a:xfrm>
+            <a:off x="6005231" y="4954804"/>
+            <a:ext cx="91440" cy="91440"/>
+          </a:xfrm>
+          <a:prstGeom prst="ellipse">
+            <a:avLst/>
+          </a:prstGeom>
+          <a:solidFill>
+            <a:schemeClr val="tx1"/>
+          </a:solidFill>
+          <a:ln>
+            <a:solidFill>
+              <a:schemeClr val="tx1"/>
+            </a:solidFill>
+          </a:ln>
+        </p:spPr>
+        <p:style>
+          <a:lnRef idx="2">
+            <a:schemeClr val="accent1">
+              <a:shade val="50000"/>
+            </a:schemeClr>
+          </a:lnRef>
+          <a:fillRef idx="1">
+            <a:schemeClr val="accent1"/>
+          </a:fillRef>
+          <a:effectRef idx="0">
+            <a:schemeClr val="accent1"/>
+          </a:effectRef>
+          <a:fontRef idx="minor">
+            <a:schemeClr val="lt1"/>
+          </a:fontRef>
+        </p:style>
+        <p:txBody>
+          <a:bodyPr rtlCol="0" anchor="ctr"/>
+          <a:lstStyle/>
+          <a:p>
+            <a:pPr algn="ctr"/>
+            <a:endParaRPr lang="en-US"/>
+          </a:p>
+        </p:txBody>
+      </p:sp>
+      <p:cxnSp>
+        <p:nvCxnSpPr>
+          <p:cNvPr id="619" name="Straight Connector 618"/>
+          <p:cNvCxnSpPr>
+            <a:stCxn id="618" idx="0"/>
+            <a:endCxn id="7" idx="4"/>
+          </p:cNvCxnSpPr>
+          <p:nvPr/>
+        </p:nvCxnSpPr>
+        <p:spPr>
+          <a:xfrm flipH="1" flipV="1">
+            <a:off x="6044159" y="4477058"/>
+            <a:ext cx="6792" cy="477746"/>
+          </a:xfrm>
+          <a:prstGeom prst="line">
+            <a:avLst/>
+          </a:prstGeom>
+          <a:ln>
+            <a:solidFill>
+              <a:schemeClr val="tx1"/>
+            </a:solidFill>
+            <a:prstDash val="dash"/>
+          </a:ln>
+        </p:spPr>
+        <p:style>
+          <a:lnRef idx="1">
+            <a:schemeClr val="accent1"/>
+          </a:lnRef>
+          <a:fillRef idx="0">
+            <a:schemeClr val="accent1"/>
+          </a:fillRef>
+          <a:effectRef idx="0">
+            <a:schemeClr val="accent1"/>
+          </a:effectRef>
+          <a:fontRef idx="minor">
+            <a:schemeClr val="tx1"/>
+          </a:fontRef>
+        </p:style>
+      </p:cxnSp>
+      <mc:AlternateContent xmlns:mc="http://schemas.openxmlformats.org/markup-compatibility/2006" xmlns:a14="http://schemas.microsoft.com/office/drawing/2010/main">
+        <mc:Choice Requires="a14">
+          <p:sp>
+            <p:nvSpPr>
+              <p:cNvPr id="627" name="Rounded Rectangular Callout 626"/>
+              <p:cNvSpPr/>
+              <p:nvPr/>
+            </p:nvSpPr>
+            <p:spPr>
+              <a:xfrm>
+                <a:off x="3814043" y="2701105"/>
+                <a:ext cx="1348023" cy="281674"/>
+              </a:xfrm>
+              <a:prstGeom prst="wedgeRoundRectCallout">
+                <a:avLst>
+                  <a:gd name="adj1" fmla="val -17140"/>
+                  <a:gd name="adj2" fmla="val 206274"/>
+                  <a:gd name="adj3" fmla="val 16667"/>
+                </a:avLst>
+              </a:prstGeom>
+              <a:solidFill>
+                <a:schemeClr val="bg2"/>
+              </a:solidFill>
+              <a:ln>
+                <a:noFill/>
+              </a:ln>
+            </p:spPr>
+            <p:style>
+              <a:lnRef idx="2">
+                <a:schemeClr val="accent1">
+                  <a:shade val="50000"/>
+                </a:schemeClr>
+              </a:lnRef>
+              <a:fillRef idx="1">
+                <a:schemeClr val="accent1"/>
+              </a:fillRef>
+              <a:effectRef idx="0">
+                <a:schemeClr val="accent1"/>
+              </a:effectRef>
+              <a:fontRef idx="minor">
+                <a:schemeClr val="lt1"/>
+              </a:fontRef>
+            </p:style>
+            <p:txBody>
+              <a:bodyPr rtlCol="0" anchor="ctr"/>
+              <a:lstStyle/>
+              <a:p>
+                <a:pPr algn="ctr"/>
+                <a14:m>
+                  <m:oMathPara xmlns:m="http://schemas.openxmlformats.org/officeDocument/2006/math">
+                    <m:oMathParaPr>
+                      <m:jc m:val="centerGroup"/>
+                    </m:oMathParaPr>
+                    <m:oMath xmlns:m="http://schemas.openxmlformats.org/officeDocument/2006/math">
+                      <m:r>
+                        <a:rPr lang="en-US" sz="1000" b="0" i="1" smtClean="0">
+                          <a:solidFill>
+                            <a:schemeClr val="tx1"/>
+                          </a:solidFill>
+                          <a:latin typeface="Cambria Math" charset="0"/>
+                        </a:rPr>
+                        <m:t>𝐴</m:t>
+                      </m:r>
+                      <m:sSub>
+                        <m:sSubPr>
+                          <m:ctrlPr>
+                            <a:rPr lang="en-US" sz="1000" b="0" i="1" smtClean="0">
+                              <a:solidFill>
+                                <a:schemeClr val="tx1"/>
+                              </a:solidFill>
+                              <a:latin typeface="Cambria Math" panose="02040503050406030204" pitchFamily="18" charset="0"/>
+                            </a:rPr>
+                          </m:ctrlPr>
+                        </m:sSubPr>
+                        <m:e>
+                          <m:r>
+                            <a:rPr lang="en-US" sz="1000" b="0" i="1" smtClean="0">
+                              <a:solidFill>
+                                <a:schemeClr val="tx1"/>
+                              </a:solidFill>
+                              <a:latin typeface="Cambria Math" charset="0"/>
+                            </a:rPr>
+                            <m:t>𝑥</m:t>
+                          </m:r>
+                        </m:e>
+                        <m:sub>
+                          <m:r>
+                            <a:rPr lang="en-US" sz="1000" b="0" i="1" smtClean="0">
+                              <a:solidFill>
+                                <a:schemeClr val="tx1"/>
+                              </a:solidFill>
+                              <a:latin typeface="Cambria Math" charset="0"/>
+                            </a:rPr>
+                            <m:t>0</m:t>
+                          </m:r>
+                        </m:sub>
+                      </m:sSub>
+                      <m:r>
+                        <a:rPr lang="en-US" sz="1000" b="0" i="1" smtClean="0">
+                          <a:solidFill>
+                            <a:schemeClr val="tx1"/>
+                          </a:solidFill>
+                          <a:latin typeface="Cambria Math" charset="0"/>
+                        </a:rPr>
+                        <m:t>+</m:t>
+                      </m:r>
+                      <m:r>
+                        <a:rPr lang="en-US" sz="1000" b="0" i="1" smtClean="0">
+                          <a:solidFill>
+                            <a:schemeClr val="tx1"/>
+                          </a:solidFill>
+                          <a:latin typeface="Cambria Math" charset="0"/>
+                        </a:rPr>
+                        <m:t>𝐵</m:t>
+                      </m:r>
+                      <m:sSub>
+                        <m:sSubPr>
+                          <m:ctrlPr>
+                            <a:rPr lang="en-US" sz="1000" b="0" i="1" smtClean="0">
+                              <a:solidFill>
+                                <a:schemeClr val="tx1"/>
+                              </a:solidFill>
+                              <a:latin typeface="Cambria Math" panose="02040503050406030204" pitchFamily="18" charset="0"/>
+                            </a:rPr>
+                          </m:ctrlPr>
+                        </m:sSubPr>
+                        <m:e>
+                          <m:r>
+                            <a:rPr lang="en-US" sz="1000" b="0" i="1" smtClean="0">
+                              <a:solidFill>
+                                <a:schemeClr val="tx1"/>
+                              </a:solidFill>
+                              <a:latin typeface="Cambria Math" charset="0"/>
+                            </a:rPr>
+                            <m:t>𝑢</m:t>
+                          </m:r>
+                        </m:e>
+                        <m:sub>
+                          <m:r>
+                            <a:rPr lang="en-US" sz="1000" b="0" i="1" smtClean="0">
+                              <a:solidFill>
+                                <a:schemeClr val="tx1"/>
+                              </a:solidFill>
+                              <a:latin typeface="Cambria Math" charset="0"/>
+                            </a:rPr>
+                            <m:t>0</m:t>
+                          </m:r>
+                        </m:sub>
+                      </m:sSub>
+                      <m:r>
+                        <a:rPr lang="en-US" sz="1000" b="0" i="1" smtClean="0">
+                          <a:solidFill>
+                            <a:schemeClr val="tx1"/>
+                          </a:solidFill>
+                          <a:latin typeface="Cambria Math" charset="0"/>
+                        </a:rPr>
+                        <m:t>=</m:t>
+                      </m:r>
+                      <m:sSub>
+                        <m:sSubPr>
+                          <m:ctrlPr>
+                            <a:rPr lang="en-US" sz="1000" b="0" i="1" smtClean="0">
+                              <a:solidFill>
+                                <a:schemeClr val="tx1"/>
+                              </a:solidFill>
+                              <a:latin typeface="Cambria Math" panose="02040503050406030204" pitchFamily="18" charset="0"/>
+                            </a:rPr>
+                          </m:ctrlPr>
+                        </m:sSubPr>
+                        <m:e>
+                          <m:r>
+                            <a:rPr lang="en-US" sz="1000" b="0" i="1" smtClean="0">
+                              <a:solidFill>
+                                <a:schemeClr val="tx1"/>
+                              </a:solidFill>
+                              <a:latin typeface="Cambria Math" charset="0"/>
+                            </a:rPr>
+                            <m:t>𝑥</m:t>
+                          </m:r>
+                        </m:e>
+                        <m:sub>
+                          <m:r>
+                            <a:rPr lang="en-US" sz="1000" b="0" i="1" smtClean="0">
+                              <a:solidFill>
+                                <a:schemeClr val="tx1"/>
+                              </a:solidFill>
+                              <a:latin typeface="Cambria Math" charset="0"/>
+                            </a:rPr>
+                            <m:t>1</m:t>
+                          </m:r>
+                        </m:sub>
+                      </m:sSub>
+                    </m:oMath>
+                  </m:oMathPara>
+                </a14:m>
+                <a:endParaRPr lang="en-US" sz="1000" dirty="0">
+                  <a:solidFill>
+                    <a:schemeClr val="tx1"/>
+                  </a:solidFill>
+                </a:endParaRPr>
+              </a:p>
+            </p:txBody>
+          </p:sp>
+        </mc:Choice>
+        <mc:Fallback xmlns="">
+          <p:sp>
+            <p:nvSpPr>
+              <p:cNvPr id="627" name="Rounded Rectangular Callout 626"/>
+              <p:cNvSpPr>
+                <a:spLocks noRot="1" noChangeAspect="1" noMove="1" noResize="1" noEditPoints="1" noAdjustHandles="1" noChangeArrowheads="1" noChangeShapeType="1" noTextEdit="1"/>
+              </p:cNvSpPr>
+              <p:nvPr/>
+            </p:nvSpPr>
+            <p:spPr>
+              <a:xfrm>
+                <a:off x="3814043" y="2701105"/>
+                <a:ext cx="1348023" cy="281674"/>
+              </a:xfrm>
+              <a:prstGeom prst="wedgeRoundRectCallout">
+                <a:avLst>
+                  <a:gd name="adj1" fmla="val -17140"/>
+                  <a:gd name="adj2" fmla="val 206274"/>
+                  <a:gd name="adj3" fmla="val 16667"/>
+                </a:avLst>
+              </a:prstGeom>
+              <a:blipFill rotWithShape="0">
+                <a:blip r:embed="rId7"/>
+                <a:stretch>
+                  <a:fillRect/>
+                </a:stretch>
+              </a:blipFill>
+              <a:ln>
+                <a:noFill/>
+              </a:ln>
+            </p:spPr>
+            <p:txBody>
+              <a:bodyPr/>
+              <a:lstStyle/>
+              <a:p>
+                <a:r>
+                  <a:rPr lang="en-US">
+                    <a:noFill/>
+                  </a:rPr>
+                  <a:t> </a:t>
+                </a:r>
+              </a:p>
+            </p:txBody>
+          </p:sp>
+        </mc:Fallback>
+      </mc:AlternateContent>
+      <mc:AlternateContent xmlns:mc="http://schemas.openxmlformats.org/markup-compatibility/2006" xmlns:a14="http://schemas.microsoft.com/office/drawing/2010/main">
+        <mc:Choice Requires="a14">
+          <p:sp>
+            <p:nvSpPr>
+              <p:cNvPr id="628" name="Rounded Rectangular Callout 627"/>
+              <p:cNvSpPr/>
+              <p:nvPr/>
+            </p:nvSpPr>
+            <p:spPr>
+              <a:xfrm>
+                <a:off x="3369423" y="2046491"/>
+                <a:ext cx="608060" cy="273042"/>
+              </a:xfrm>
+              <a:prstGeom prst="wedgeRoundRectCallout">
+                <a:avLst>
+                  <a:gd name="adj1" fmla="val -23274"/>
+                  <a:gd name="adj2" fmla="val 104845"/>
+                  <a:gd name="adj3" fmla="val 16667"/>
+                </a:avLst>
+              </a:prstGeom>
+              <a:solidFill>
+                <a:schemeClr val="bg2"/>
+              </a:solidFill>
+              <a:ln>
+                <a:noFill/>
+              </a:ln>
+            </p:spPr>
+            <p:style>
+              <a:lnRef idx="2">
+                <a:schemeClr val="accent1">
+                  <a:shade val="50000"/>
+                </a:schemeClr>
+              </a:lnRef>
+              <a:fillRef idx="1">
+                <a:schemeClr val="accent1"/>
+              </a:fillRef>
+              <a:effectRef idx="0">
+                <a:schemeClr val="accent1"/>
+              </a:effectRef>
+              <a:fontRef idx="minor">
+                <a:schemeClr val="lt1"/>
+              </a:fontRef>
+            </p:style>
+            <p:txBody>
+              <a:bodyPr rtlCol="0" anchor="ctr"/>
+              <a:lstStyle/>
+              <a:p>
+                <a:pPr algn="ctr"/>
+                <a14:m>
+                  <m:oMathPara xmlns:m="http://schemas.openxmlformats.org/officeDocument/2006/math">
+                    <m:oMathParaPr>
+                      <m:jc m:val="centerGroup"/>
+                    </m:oMathParaPr>
+                    <m:oMath xmlns:m="http://schemas.openxmlformats.org/officeDocument/2006/math">
+                      <m:sSubSup>
+                        <m:sSubSupPr>
+                          <m:ctrlPr>
+                            <a:rPr lang="en-US" sz="1000" b="0" i="1" smtClean="0">
+                              <a:solidFill>
+                                <a:schemeClr val="tx1"/>
+                              </a:solidFill>
+                              <a:latin typeface="Cambria Math" panose="02040503050406030204" pitchFamily="18" charset="0"/>
+                            </a:rPr>
+                          </m:ctrlPr>
+                        </m:sSubSupPr>
+                        <m:e>
+                          <m:r>
+                            <a:rPr lang="en-US" sz="1000" b="0" i="1" smtClean="0">
+                              <a:solidFill>
+                                <a:schemeClr val="tx1"/>
+                              </a:solidFill>
+                              <a:latin typeface="Cambria Math" charset="0"/>
+                            </a:rPr>
+                            <m:t>𝑥</m:t>
+                          </m:r>
+                        </m:e>
+                        <m:sub>
+                          <m:r>
+                            <a:rPr lang="en-US" sz="1000" b="0" i="1" smtClean="0">
+                              <a:solidFill>
+                                <a:schemeClr val="tx1"/>
+                              </a:solidFill>
+                              <a:latin typeface="Cambria Math" charset="0"/>
+                            </a:rPr>
+                            <m:t>0</m:t>
+                          </m:r>
+                        </m:sub>
+                        <m:sup>
+                          <m:r>
+                            <a:rPr lang="en-US" sz="1000" b="0" i="1" smtClean="0">
+                              <a:solidFill>
+                                <a:schemeClr val="tx1"/>
+                              </a:solidFill>
+                              <a:latin typeface="Cambria Math" charset="0"/>
+                            </a:rPr>
+                            <m:t>𝑇</m:t>
+                          </m:r>
+                        </m:sup>
+                      </m:sSubSup>
+                      <m:r>
+                        <a:rPr lang="en-US" sz="1000" b="0" i="1" smtClean="0">
+                          <a:solidFill>
+                            <a:schemeClr val="tx1"/>
+                          </a:solidFill>
+                          <a:latin typeface="Cambria Math" charset="0"/>
+                        </a:rPr>
+                        <m:t>𝑄</m:t>
+                      </m:r>
+                      <m:sSub>
+                        <m:sSubPr>
+                          <m:ctrlPr>
+                            <a:rPr lang="en-US" sz="1000" b="0" i="1" smtClean="0">
+                              <a:solidFill>
+                                <a:schemeClr val="tx1"/>
+                              </a:solidFill>
+                              <a:latin typeface="Cambria Math" panose="02040503050406030204" pitchFamily="18" charset="0"/>
+                            </a:rPr>
+                          </m:ctrlPr>
+                        </m:sSubPr>
+                        <m:e>
+                          <m:r>
+                            <a:rPr lang="en-US" sz="1000" b="0" i="1" smtClean="0">
+                              <a:solidFill>
+                                <a:schemeClr val="tx1"/>
+                              </a:solidFill>
+                              <a:latin typeface="Cambria Math" charset="0"/>
+                            </a:rPr>
+                            <m:t>𝑥</m:t>
+                          </m:r>
+                        </m:e>
+                        <m:sub>
+                          <m:r>
+                            <a:rPr lang="en-US" sz="1000" b="0" i="1" smtClean="0">
+                              <a:solidFill>
+                                <a:schemeClr val="tx1"/>
+                              </a:solidFill>
+                              <a:latin typeface="Cambria Math" charset="0"/>
+                            </a:rPr>
+                            <m:t>0</m:t>
+                          </m:r>
+                        </m:sub>
+                      </m:sSub>
+                    </m:oMath>
+                  </m:oMathPara>
+                </a14:m>
+                <a:endParaRPr lang="en-US" sz="1000" dirty="0">
+                  <a:solidFill>
+                    <a:schemeClr val="tx1"/>
+                  </a:solidFill>
+                </a:endParaRPr>
+              </a:p>
+            </p:txBody>
+          </p:sp>
+        </mc:Choice>
+        <mc:Fallback xmlns="">
+          <p:sp>
+            <p:nvSpPr>
+              <p:cNvPr id="628" name="Rounded Rectangular Callout 627"/>
+              <p:cNvSpPr>
+                <a:spLocks noRot="1" noChangeAspect="1" noMove="1" noResize="1" noEditPoints="1" noAdjustHandles="1" noChangeArrowheads="1" noChangeShapeType="1" noTextEdit="1"/>
+              </p:cNvSpPr>
+              <p:nvPr/>
+            </p:nvSpPr>
+            <p:spPr>
+              <a:xfrm>
+                <a:off x="3369423" y="2046491"/>
+                <a:ext cx="608060" cy="273042"/>
+              </a:xfrm>
+              <a:prstGeom prst="wedgeRoundRectCallout">
+                <a:avLst>
+                  <a:gd name="adj1" fmla="val -23274"/>
+                  <a:gd name="adj2" fmla="val 104845"/>
+                  <a:gd name="adj3" fmla="val 16667"/>
+                </a:avLst>
+              </a:prstGeom>
+              <a:blipFill rotWithShape="0">
+                <a:blip r:embed="rId8"/>
+                <a:stretch>
+                  <a:fillRect/>
+                </a:stretch>
+              </a:blipFill>
+              <a:ln>
+                <a:noFill/>
+              </a:ln>
+            </p:spPr>
+            <p:txBody>
+              <a:bodyPr/>
+              <a:lstStyle/>
+              <a:p>
+                <a:r>
+                  <a:rPr lang="en-US">
+                    <a:noFill/>
+                  </a:rPr>
+                  <a:t> </a:t>
+                </a:r>
+              </a:p>
+            </p:txBody>
+          </p:sp>
+        </mc:Fallback>
+      </mc:AlternateContent>
+      <mc:AlternateContent xmlns:mc="http://schemas.openxmlformats.org/markup-compatibility/2006" xmlns:a14="http://schemas.microsoft.com/office/drawing/2010/main">
+        <mc:Choice Requires="a14">
+          <p:sp>
+            <p:nvSpPr>
+              <p:cNvPr id="630" name="Rounded Rectangular Callout 629"/>
+              <p:cNvSpPr/>
+              <p:nvPr/>
+            </p:nvSpPr>
+            <p:spPr>
+              <a:xfrm>
+                <a:off x="3484025" y="4477058"/>
+                <a:ext cx="660035" cy="325136"/>
+              </a:xfrm>
+              <a:prstGeom prst="wedgeRoundRectCallout">
+                <a:avLst>
+                  <a:gd name="adj1" fmla="val 63705"/>
+                  <a:gd name="adj2" fmla="val 122466"/>
+                  <a:gd name="adj3" fmla="val 16667"/>
+                </a:avLst>
+              </a:prstGeom>
+              <a:solidFill>
+                <a:schemeClr val="bg2"/>
+              </a:solidFill>
+              <a:ln>
+                <a:noFill/>
+              </a:ln>
+            </p:spPr>
+            <p:style>
+              <a:lnRef idx="2">
+                <a:schemeClr val="accent1">
+                  <a:shade val="50000"/>
+                </a:schemeClr>
+              </a:lnRef>
+              <a:fillRef idx="1">
+                <a:schemeClr val="accent1"/>
+              </a:fillRef>
+              <a:effectRef idx="0">
+                <a:schemeClr val="accent1"/>
+              </a:effectRef>
+              <a:fontRef idx="minor">
+                <a:schemeClr val="lt1"/>
+              </a:fontRef>
+            </p:style>
+            <p:txBody>
+              <a:bodyPr rtlCol="0" anchor="ctr"/>
+              <a:lstStyle/>
+              <a:p>
+                <a:pPr algn="ctr"/>
+                <a14:m>
+                  <m:oMathPara xmlns:m="http://schemas.openxmlformats.org/officeDocument/2006/math">
+                    <m:oMathParaPr>
+                      <m:jc m:val="centerGroup"/>
+                    </m:oMathParaPr>
+                    <m:oMath xmlns:m="http://schemas.openxmlformats.org/officeDocument/2006/math">
+                      <m:sSubSup>
+                        <m:sSubSupPr>
+                          <m:ctrlPr>
+                            <a:rPr lang="en-US" sz="1000" b="0" i="1" smtClean="0">
+                              <a:solidFill>
+                                <a:schemeClr val="tx1"/>
+                              </a:solidFill>
+                              <a:latin typeface="Cambria Math" panose="02040503050406030204" pitchFamily="18" charset="0"/>
+                            </a:rPr>
+                          </m:ctrlPr>
+                        </m:sSubSupPr>
+                        <m:e>
+                          <m:r>
+                            <a:rPr lang="en-US" sz="1000" b="0" i="1" smtClean="0">
+                              <a:solidFill>
+                                <a:schemeClr val="tx1"/>
+                              </a:solidFill>
+                              <a:latin typeface="Cambria Math" charset="0"/>
+                            </a:rPr>
+                            <m:t>𝑢</m:t>
+                          </m:r>
+                        </m:e>
+                        <m:sub>
+                          <m:r>
+                            <a:rPr lang="en-US" sz="1000" b="0" i="1" smtClean="0">
+                              <a:solidFill>
+                                <a:schemeClr val="tx1"/>
+                              </a:solidFill>
+                              <a:latin typeface="Cambria Math" charset="0"/>
+                            </a:rPr>
+                            <m:t>0</m:t>
+                          </m:r>
+                        </m:sub>
+                        <m:sup>
+                          <m:r>
+                            <a:rPr lang="en-US" sz="1000" b="0" i="1" smtClean="0">
+                              <a:solidFill>
+                                <a:schemeClr val="tx1"/>
+                              </a:solidFill>
+                              <a:latin typeface="Cambria Math" charset="0"/>
+                            </a:rPr>
+                            <m:t>𝑇</m:t>
+                          </m:r>
+                        </m:sup>
+                      </m:sSubSup>
+                      <m:r>
+                        <a:rPr lang="en-US" sz="1000" b="0" i="1" smtClean="0">
+                          <a:solidFill>
+                            <a:schemeClr val="tx1"/>
+                          </a:solidFill>
+                          <a:latin typeface="Cambria Math" charset="0"/>
+                        </a:rPr>
+                        <m:t>𝑅</m:t>
+                      </m:r>
+                      <m:sSub>
+                        <m:sSubPr>
+                          <m:ctrlPr>
+                            <a:rPr lang="en-US" sz="1000" b="0" i="1" smtClean="0">
+                              <a:solidFill>
+                                <a:schemeClr val="tx1"/>
+                              </a:solidFill>
+                              <a:latin typeface="Cambria Math" panose="02040503050406030204" pitchFamily="18" charset="0"/>
+                            </a:rPr>
+                          </m:ctrlPr>
+                        </m:sSubPr>
+                        <m:e>
+                          <m:r>
+                            <a:rPr lang="en-US" sz="1000" b="0" i="1" smtClean="0">
+                              <a:solidFill>
+                                <a:schemeClr val="tx1"/>
+                              </a:solidFill>
+                              <a:latin typeface="Cambria Math" charset="0"/>
+                            </a:rPr>
+                            <m:t>𝑢</m:t>
+                          </m:r>
+                        </m:e>
+                        <m:sub>
+                          <m:r>
+                            <a:rPr lang="en-US" sz="1000" b="0" i="1" smtClean="0">
+                              <a:solidFill>
+                                <a:schemeClr val="tx1"/>
+                              </a:solidFill>
+                              <a:latin typeface="Cambria Math" charset="0"/>
+                            </a:rPr>
+                            <m:t>0</m:t>
+                          </m:r>
+                        </m:sub>
+                      </m:sSub>
+                    </m:oMath>
+                  </m:oMathPara>
+                </a14:m>
+                <a:endParaRPr lang="en-US" sz="1000" dirty="0">
+                  <a:solidFill>
+                    <a:schemeClr val="tx1"/>
+                  </a:solidFill>
+                </a:endParaRPr>
+              </a:p>
+            </p:txBody>
+          </p:sp>
+        </mc:Choice>
+        <mc:Fallback xmlns="">
+          <p:sp>
+            <p:nvSpPr>
+              <p:cNvPr id="630" name="Rounded Rectangular Callout 629"/>
+              <p:cNvSpPr>
+                <a:spLocks noRot="1" noChangeAspect="1" noMove="1" noResize="1" noEditPoints="1" noAdjustHandles="1" noChangeArrowheads="1" noChangeShapeType="1" noTextEdit="1"/>
+              </p:cNvSpPr>
+              <p:nvPr/>
+            </p:nvSpPr>
+            <p:spPr>
+              <a:xfrm>
+                <a:off x="3484025" y="4477058"/>
+                <a:ext cx="660035" cy="325136"/>
+              </a:xfrm>
+              <a:prstGeom prst="wedgeRoundRectCallout">
+                <a:avLst>
+                  <a:gd name="adj1" fmla="val 63705"/>
+                  <a:gd name="adj2" fmla="val 122466"/>
+                  <a:gd name="adj3" fmla="val 16667"/>
+                </a:avLst>
+              </a:prstGeom>
+              <a:blipFill rotWithShape="0">
+                <a:blip r:embed="rId10"/>
+                <a:stretch>
+                  <a:fillRect/>
+                </a:stretch>
+              </a:blipFill>
+              <a:ln>
+                <a:noFill/>
+              </a:ln>
+            </p:spPr>
+            <p:txBody>
+              <a:bodyPr/>
+              <a:lstStyle/>
+              <a:p>
+                <a:r>
+                  <a:rPr lang="en-US">
+                    <a:noFill/>
+                  </a:rPr>
+                  <a:t> </a:t>
+                </a:r>
+              </a:p>
+            </p:txBody>
+          </p:sp>
+        </mc:Fallback>
+      </mc:AlternateContent>
+      <p:cxnSp>
+        <p:nvCxnSpPr>
+          <p:cNvPr id="3477" name="Straight Connector 3476"/>
+          <p:cNvCxnSpPr>
+            <a:stCxn id="24" idx="4"/>
+            <a:endCxn id="7" idx="0"/>
+          </p:cNvCxnSpPr>
+          <p:nvPr/>
+        </p:nvCxnSpPr>
+        <p:spPr>
+          <a:xfrm>
+            <a:off x="6044159" y="3558635"/>
+            <a:ext cx="0" cy="461223"/>
+          </a:xfrm>
+          <a:prstGeom prst="line">
+            <a:avLst/>
+          </a:prstGeom>
+          <a:ln>
+            <a:solidFill>
+              <a:schemeClr val="tx1"/>
+            </a:solidFill>
+          </a:ln>
+        </p:spPr>
+        <p:style>
+          <a:lnRef idx="1">
+            <a:schemeClr val="accent1"/>
+          </a:lnRef>
+          <a:fillRef idx="0">
+            <a:schemeClr val="accent1"/>
+          </a:fillRef>
+          <a:effectRef idx="0">
+            <a:schemeClr val="accent1"/>
+          </a:effectRef>
+          <a:fontRef idx="minor">
+            <a:schemeClr val="tx1"/>
+          </a:fontRef>
+        </p:style>
+      </p:cxnSp>
+      <mc:AlternateContent xmlns:mc="http://schemas.openxmlformats.org/markup-compatibility/2006" xmlns:a14="http://schemas.microsoft.com/office/drawing/2010/main">
+        <mc:Choice Requires="a14">
+          <p:sp>
+            <p:nvSpPr>
+              <p:cNvPr id="33" name="Rounded Rectangular Callout 32"/>
+              <p:cNvSpPr/>
+              <p:nvPr/>
+            </p:nvSpPr>
+            <p:spPr>
+              <a:xfrm>
+                <a:off x="5478610" y="2705028"/>
+                <a:ext cx="1348023" cy="281674"/>
+              </a:xfrm>
+              <a:prstGeom prst="wedgeRoundRectCallout">
+                <a:avLst>
+                  <a:gd name="adj1" fmla="val -7449"/>
+                  <a:gd name="adj2" fmla="val 219525"/>
+                  <a:gd name="adj3" fmla="val 16667"/>
+                </a:avLst>
+              </a:prstGeom>
+              <a:solidFill>
+                <a:schemeClr val="bg2"/>
+              </a:solidFill>
+              <a:ln>
+                <a:noFill/>
+              </a:ln>
+            </p:spPr>
+            <p:style>
+              <a:lnRef idx="2">
+                <a:schemeClr val="accent1">
+                  <a:shade val="50000"/>
+                </a:schemeClr>
+              </a:lnRef>
+              <a:fillRef idx="1">
+                <a:schemeClr val="accent1"/>
+              </a:fillRef>
+              <a:effectRef idx="0">
+                <a:schemeClr val="accent1"/>
+              </a:effectRef>
+              <a:fontRef idx="minor">
+                <a:schemeClr val="lt1"/>
+              </a:fontRef>
+            </p:style>
+            <p:txBody>
+              <a:bodyPr rtlCol="0" anchor="ctr"/>
+              <a:lstStyle/>
+              <a:p>
+                <a:pPr algn="ctr"/>
+                <a14:m>
+                  <m:oMathPara xmlns:m="http://schemas.openxmlformats.org/officeDocument/2006/math">
+                    <m:oMathParaPr>
+                      <m:jc m:val="centerGroup"/>
+                    </m:oMathParaPr>
+                    <m:oMath xmlns:m="http://schemas.openxmlformats.org/officeDocument/2006/math">
+                      <m:r>
+                        <a:rPr lang="en-US" sz="1000" b="0" i="1" smtClean="0">
+                          <a:solidFill>
+                            <a:schemeClr val="tx1"/>
+                          </a:solidFill>
+                          <a:latin typeface="Cambria Math" charset="0"/>
+                        </a:rPr>
+                        <m:t>𝐴</m:t>
+                      </m:r>
+                      <m:sSub>
+                        <m:sSubPr>
+                          <m:ctrlPr>
+                            <a:rPr lang="en-US" sz="1000" b="0" i="1" smtClean="0">
+                              <a:solidFill>
+                                <a:schemeClr val="tx1"/>
+                              </a:solidFill>
+                              <a:latin typeface="Cambria Math" panose="02040503050406030204" pitchFamily="18" charset="0"/>
+                            </a:rPr>
+                          </m:ctrlPr>
+                        </m:sSubPr>
+                        <m:e>
+                          <m:r>
+                            <a:rPr lang="en-US" sz="1000" b="0" i="1" smtClean="0">
+                              <a:solidFill>
+                                <a:schemeClr val="tx1"/>
+                              </a:solidFill>
+                              <a:latin typeface="Cambria Math" charset="0"/>
+                            </a:rPr>
+                            <m:t>𝑥</m:t>
+                          </m:r>
+                        </m:e>
+                        <m:sub>
+                          <m:r>
+                            <a:rPr lang="en-US" sz="1000" b="0" i="1" smtClean="0">
+                              <a:solidFill>
+                                <a:schemeClr val="tx1"/>
+                              </a:solidFill>
+                              <a:latin typeface="Cambria Math" charset="0"/>
+                            </a:rPr>
+                            <m:t>1</m:t>
+                          </m:r>
+                        </m:sub>
+                      </m:sSub>
+                      <m:r>
+                        <a:rPr lang="en-US" sz="1000" b="0" i="1" smtClean="0">
+                          <a:solidFill>
+                            <a:schemeClr val="tx1"/>
+                          </a:solidFill>
+                          <a:latin typeface="Cambria Math" charset="0"/>
+                        </a:rPr>
+                        <m:t>+</m:t>
+                      </m:r>
+                      <m:r>
+                        <a:rPr lang="en-US" sz="1000" b="0" i="1" smtClean="0">
+                          <a:solidFill>
+                            <a:schemeClr val="tx1"/>
+                          </a:solidFill>
+                          <a:latin typeface="Cambria Math" charset="0"/>
+                        </a:rPr>
+                        <m:t>𝐵</m:t>
+                      </m:r>
+                      <m:sSub>
+                        <m:sSubPr>
+                          <m:ctrlPr>
+                            <a:rPr lang="en-US" sz="1000" b="0" i="1" smtClean="0">
+                              <a:solidFill>
+                                <a:schemeClr val="tx1"/>
+                              </a:solidFill>
+                              <a:latin typeface="Cambria Math" panose="02040503050406030204" pitchFamily="18" charset="0"/>
+                            </a:rPr>
+                          </m:ctrlPr>
+                        </m:sSubPr>
+                        <m:e>
+                          <m:r>
+                            <a:rPr lang="en-US" sz="1000" b="0" i="1" smtClean="0">
+                              <a:solidFill>
+                                <a:schemeClr val="tx1"/>
+                              </a:solidFill>
+                              <a:latin typeface="Cambria Math" charset="0"/>
+                            </a:rPr>
+                            <m:t>𝑢</m:t>
+                          </m:r>
+                        </m:e>
+                        <m:sub>
+                          <m:r>
+                            <a:rPr lang="en-US" sz="1000" b="0" i="1" smtClean="0">
+                              <a:solidFill>
+                                <a:schemeClr val="tx1"/>
+                              </a:solidFill>
+                              <a:latin typeface="Cambria Math" charset="0"/>
+                            </a:rPr>
+                            <m:t>1</m:t>
+                          </m:r>
+                        </m:sub>
+                      </m:sSub>
+                      <m:r>
+                        <a:rPr lang="en-US" sz="1000" b="0" i="1" smtClean="0">
+                          <a:solidFill>
+                            <a:schemeClr val="tx1"/>
+                          </a:solidFill>
+                          <a:latin typeface="Cambria Math" charset="0"/>
+                        </a:rPr>
+                        <m:t>=</m:t>
+                      </m:r>
+                      <m:sSub>
+                        <m:sSubPr>
+                          <m:ctrlPr>
+                            <a:rPr lang="en-US" sz="1000" b="0" i="1" smtClean="0">
+                              <a:solidFill>
+                                <a:schemeClr val="tx1"/>
+                              </a:solidFill>
+                              <a:latin typeface="Cambria Math" panose="02040503050406030204" pitchFamily="18" charset="0"/>
+                            </a:rPr>
+                          </m:ctrlPr>
+                        </m:sSubPr>
+                        <m:e>
+                          <m:r>
+                            <a:rPr lang="en-US" sz="1000" b="0" i="1" smtClean="0">
+                              <a:solidFill>
+                                <a:schemeClr val="tx1"/>
+                              </a:solidFill>
+                              <a:latin typeface="Cambria Math" charset="0"/>
+                            </a:rPr>
+                            <m:t>𝑥</m:t>
+                          </m:r>
+                        </m:e>
+                        <m:sub>
+                          <m:r>
+                            <a:rPr lang="en-US" sz="1000" b="0" i="1" smtClean="0">
+                              <a:solidFill>
+                                <a:schemeClr val="tx1"/>
+                              </a:solidFill>
+                              <a:latin typeface="Cambria Math" charset="0"/>
+                            </a:rPr>
+                            <m:t>𝑥</m:t>
+                          </m:r>
+                        </m:sub>
+                      </m:sSub>
+                    </m:oMath>
+                  </m:oMathPara>
+                </a14:m>
+                <a:endParaRPr lang="en-US" sz="1000" dirty="0">
+                  <a:solidFill>
+                    <a:schemeClr val="tx1"/>
+                  </a:solidFill>
+                </a:endParaRPr>
+              </a:p>
+            </p:txBody>
+          </p:sp>
+        </mc:Choice>
+        <mc:Fallback xmlns="">
+          <p:sp>
+            <p:nvSpPr>
+              <p:cNvPr id="33" name="Rounded Rectangular Callout 32"/>
+              <p:cNvSpPr>
+                <a:spLocks noRot="1" noChangeAspect="1" noMove="1" noResize="1" noEditPoints="1" noAdjustHandles="1" noChangeArrowheads="1" noChangeShapeType="1" noTextEdit="1"/>
+              </p:cNvSpPr>
+              <p:nvPr/>
+            </p:nvSpPr>
+            <p:spPr>
+              <a:xfrm>
+                <a:off x="5478610" y="2705028"/>
+                <a:ext cx="1348023" cy="281674"/>
+              </a:xfrm>
+              <a:prstGeom prst="wedgeRoundRectCallout">
+                <a:avLst>
+                  <a:gd name="adj1" fmla="val -7449"/>
+                  <a:gd name="adj2" fmla="val 219525"/>
+                  <a:gd name="adj3" fmla="val 16667"/>
+                </a:avLst>
+              </a:prstGeom>
+              <a:blipFill rotWithShape="0">
+                <a:blip r:embed="rId11"/>
+                <a:stretch>
+                  <a:fillRect/>
+                </a:stretch>
+              </a:blipFill>
+              <a:ln>
+                <a:noFill/>
+              </a:ln>
+            </p:spPr>
+            <p:txBody>
+              <a:bodyPr/>
+              <a:lstStyle/>
+              <a:p>
+                <a:r>
+                  <a:rPr lang="en-US">
+                    <a:noFill/>
+                  </a:rPr>
+                  <a:t> </a:t>
+                </a:r>
+              </a:p>
+            </p:txBody>
+          </p:sp>
+        </mc:Fallback>
+      </mc:AlternateContent>
+      <mc:AlternateContent xmlns:mc="http://schemas.openxmlformats.org/markup-compatibility/2006" xmlns:a14="http://schemas.microsoft.com/office/drawing/2010/main">
+        <mc:Choice Requires="a14">
+          <p:sp>
+            <p:nvSpPr>
+              <p:cNvPr id="34" name="Rounded Rectangular Callout 33"/>
+              <p:cNvSpPr/>
+              <p:nvPr/>
+            </p:nvSpPr>
+            <p:spPr>
+              <a:xfrm>
+                <a:off x="5156427" y="2042933"/>
+                <a:ext cx="608060" cy="273042"/>
+              </a:xfrm>
+              <a:prstGeom prst="wedgeRoundRectCallout">
+                <a:avLst>
+                  <a:gd name="adj1" fmla="val -23274"/>
+                  <a:gd name="adj2" fmla="val 104845"/>
+                  <a:gd name="adj3" fmla="val 16667"/>
+                </a:avLst>
+              </a:prstGeom>
+              <a:solidFill>
+                <a:schemeClr val="bg2"/>
+              </a:solidFill>
+              <a:ln>
+                <a:noFill/>
+              </a:ln>
+            </p:spPr>
+            <p:style>
+              <a:lnRef idx="2">
+                <a:schemeClr val="accent1">
+                  <a:shade val="50000"/>
+                </a:schemeClr>
+              </a:lnRef>
+              <a:fillRef idx="1">
+                <a:schemeClr val="accent1"/>
+              </a:fillRef>
+              <a:effectRef idx="0">
+                <a:schemeClr val="accent1"/>
+              </a:effectRef>
+              <a:fontRef idx="minor">
+                <a:schemeClr val="lt1"/>
+              </a:fontRef>
+            </p:style>
+            <p:txBody>
+              <a:bodyPr rtlCol="0" anchor="ctr"/>
+              <a:lstStyle/>
+              <a:p>
+                <a:pPr algn="ctr"/>
+                <a14:m>
+                  <m:oMathPara xmlns:m="http://schemas.openxmlformats.org/officeDocument/2006/math">
+                    <m:oMathParaPr>
+                      <m:jc m:val="centerGroup"/>
+                    </m:oMathParaPr>
+                    <m:oMath xmlns:m="http://schemas.openxmlformats.org/officeDocument/2006/math">
+                      <m:sSubSup>
+                        <m:sSubSupPr>
+                          <m:ctrlPr>
+                            <a:rPr lang="en-US" sz="1000" b="0" i="1" smtClean="0">
+                              <a:solidFill>
+                                <a:schemeClr val="tx1"/>
+                              </a:solidFill>
+                              <a:latin typeface="Cambria Math" panose="02040503050406030204" pitchFamily="18" charset="0"/>
+                            </a:rPr>
+                          </m:ctrlPr>
+                        </m:sSubSupPr>
+                        <m:e>
+                          <m:r>
+                            <a:rPr lang="en-US" sz="1000" b="0" i="1" smtClean="0">
+                              <a:solidFill>
+                                <a:schemeClr val="tx1"/>
+                              </a:solidFill>
+                              <a:latin typeface="Cambria Math" charset="0"/>
+                            </a:rPr>
+                            <m:t>𝑥</m:t>
+                          </m:r>
+                        </m:e>
+                        <m:sub>
+                          <m:r>
+                            <a:rPr lang="en-US" sz="1000" b="0" i="1" smtClean="0">
+                              <a:solidFill>
+                                <a:schemeClr val="tx1"/>
+                              </a:solidFill>
+                              <a:latin typeface="Cambria Math" charset="0"/>
+                            </a:rPr>
+                            <m:t>1</m:t>
+                          </m:r>
+                        </m:sub>
+                        <m:sup>
+                          <m:r>
+                            <a:rPr lang="en-US" sz="1000" b="0" i="1" smtClean="0">
+                              <a:solidFill>
+                                <a:schemeClr val="tx1"/>
+                              </a:solidFill>
+                              <a:latin typeface="Cambria Math" charset="0"/>
+                            </a:rPr>
+                            <m:t>𝑇</m:t>
+                          </m:r>
+                        </m:sup>
+                      </m:sSubSup>
+                      <m:r>
+                        <a:rPr lang="en-US" sz="1000" b="0" i="1" smtClean="0">
+                          <a:solidFill>
+                            <a:schemeClr val="tx1"/>
+                          </a:solidFill>
+                          <a:latin typeface="Cambria Math" charset="0"/>
+                        </a:rPr>
+                        <m:t>𝑄</m:t>
+                      </m:r>
+                      <m:sSub>
+                        <m:sSubPr>
+                          <m:ctrlPr>
+                            <a:rPr lang="en-US" sz="1000" b="0" i="1" smtClean="0">
+                              <a:solidFill>
+                                <a:schemeClr val="tx1"/>
+                              </a:solidFill>
+                              <a:latin typeface="Cambria Math" panose="02040503050406030204" pitchFamily="18" charset="0"/>
+                            </a:rPr>
+                          </m:ctrlPr>
+                        </m:sSubPr>
+                        <m:e>
+                          <m:r>
+                            <a:rPr lang="en-US" sz="1000" b="0" i="1" smtClean="0">
+                              <a:solidFill>
+                                <a:schemeClr val="tx1"/>
+                              </a:solidFill>
+                              <a:latin typeface="Cambria Math" charset="0"/>
+                            </a:rPr>
+                            <m:t>𝑥</m:t>
+                          </m:r>
+                        </m:e>
+                        <m:sub>
+                          <m:r>
+                            <a:rPr lang="en-US" sz="1000" b="0" i="1" smtClean="0">
+                              <a:solidFill>
+                                <a:schemeClr val="tx1"/>
+                              </a:solidFill>
+                              <a:latin typeface="Cambria Math" charset="0"/>
+                            </a:rPr>
+                            <m:t>1</m:t>
+                          </m:r>
+                        </m:sub>
+                      </m:sSub>
+                    </m:oMath>
+                  </m:oMathPara>
+                </a14:m>
+                <a:endParaRPr lang="en-US" sz="1000" dirty="0">
+                  <a:solidFill>
+                    <a:schemeClr val="tx1"/>
+                  </a:solidFill>
+                </a:endParaRPr>
+              </a:p>
+            </p:txBody>
+          </p:sp>
+        </mc:Choice>
+        <mc:Fallback xmlns="">
+          <p:sp>
+            <p:nvSpPr>
+              <p:cNvPr id="34" name="Rounded Rectangular Callout 33"/>
+              <p:cNvSpPr>
+                <a:spLocks noRot="1" noChangeAspect="1" noMove="1" noResize="1" noEditPoints="1" noAdjustHandles="1" noChangeArrowheads="1" noChangeShapeType="1" noTextEdit="1"/>
+              </p:cNvSpPr>
+              <p:nvPr/>
+            </p:nvSpPr>
+            <p:spPr>
+              <a:xfrm>
+                <a:off x="5156427" y="2042933"/>
+                <a:ext cx="608060" cy="273042"/>
+              </a:xfrm>
+              <a:prstGeom prst="wedgeRoundRectCallout">
+                <a:avLst>
+                  <a:gd name="adj1" fmla="val -23274"/>
+                  <a:gd name="adj2" fmla="val 104845"/>
+                  <a:gd name="adj3" fmla="val 16667"/>
+                </a:avLst>
+              </a:prstGeom>
+              <a:blipFill rotWithShape="0">
+                <a:blip r:embed="rId12"/>
+                <a:stretch>
+                  <a:fillRect/>
+                </a:stretch>
+              </a:blipFill>
+              <a:ln>
+                <a:noFill/>
+              </a:ln>
+            </p:spPr>
+            <p:txBody>
+              <a:bodyPr/>
+              <a:lstStyle/>
+              <a:p>
+                <a:r>
+                  <a:rPr lang="en-US">
+                    <a:noFill/>
+                  </a:rPr>
+                  <a:t> </a:t>
+                </a:r>
+              </a:p>
+            </p:txBody>
+          </p:sp>
+        </mc:Fallback>
+      </mc:AlternateContent>
+      <mc:AlternateContent xmlns:mc="http://schemas.openxmlformats.org/markup-compatibility/2006" xmlns:a14="http://schemas.microsoft.com/office/drawing/2010/main">
+        <mc:Choice Requires="a14">
+          <p:sp>
+            <p:nvSpPr>
+              <p:cNvPr id="35" name="Rounded Rectangular Callout 34"/>
+              <p:cNvSpPr/>
+              <p:nvPr/>
+            </p:nvSpPr>
+            <p:spPr>
+              <a:xfrm>
+                <a:off x="6921276" y="2046491"/>
+                <a:ext cx="608060" cy="273042"/>
+              </a:xfrm>
+              <a:prstGeom prst="wedgeRoundRectCallout">
+                <a:avLst>
+                  <a:gd name="adj1" fmla="val -23274"/>
+                  <a:gd name="adj2" fmla="val 104845"/>
+                  <a:gd name="adj3" fmla="val 16667"/>
+                </a:avLst>
+              </a:prstGeom>
+              <a:solidFill>
+                <a:schemeClr val="bg2"/>
+              </a:solidFill>
+              <a:ln>
+                <a:noFill/>
+              </a:ln>
+            </p:spPr>
+            <p:style>
+              <a:lnRef idx="2">
+                <a:schemeClr val="accent1">
+                  <a:shade val="50000"/>
+                </a:schemeClr>
+              </a:lnRef>
+              <a:fillRef idx="1">
+                <a:schemeClr val="accent1"/>
+              </a:fillRef>
+              <a:effectRef idx="0">
+                <a:schemeClr val="accent1"/>
+              </a:effectRef>
+              <a:fontRef idx="minor">
+                <a:schemeClr val="lt1"/>
+              </a:fontRef>
+            </p:style>
+            <p:txBody>
+              <a:bodyPr rtlCol="0" anchor="ctr"/>
+              <a:lstStyle/>
+              <a:p>
+                <a:pPr algn="ctr"/>
+                <a14:m>
+                  <m:oMathPara xmlns:m="http://schemas.openxmlformats.org/officeDocument/2006/math">
+                    <m:oMathParaPr>
+                      <m:jc m:val="centerGroup"/>
+                    </m:oMathParaPr>
+                    <m:oMath xmlns:m="http://schemas.openxmlformats.org/officeDocument/2006/math">
+                      <m:sSubSup>
+                        <m:sSubSupPr>
+                          <m:ctrlPr>
+                            <a:rPr lang="en-US" sz="1000" b="0" i="1" smtClean="0">
+                              <a:solidFill>
+                                <a:schemeClr val="tx1"/>
+                              </a:solidFill>
+                              <a:latin typeface="Cambria Math" panose="02040503050406030204" pitchFamily="18" charset="0"/>
+                            </a:rPr>
+                          </m:ctrlPr>
+                        </m:sSubSupPr>
+                        <m:e>
+                          <m:r>
+                            <a:rPr lang="en-US" sz="1000" b="0" i="1" smtClean="0">
+                              <a:solidFill>
+                                <a:schemeClr val="tx1"/>
+                              </a:solidFill>
+                              <a:latin typeface="Cambria Math" charset="0"/>
+                            </a:rPr>
+                            <m:t>𝑥</m:t>
+                          </m:r>
+                        </m:e>
+                        <m:sub>
+                          <m:r>
+                            <a:rPr lang="en-US" sz="1000" b="0" i="1" smtClean="0">
+                              <a:solidFill>
+                                <a:schemeClr val="tx1"/>
+                              </a:solidFill>
+                              <a:latin typeface="Cambria Math" charset="0"/>
+                            </a:rPr>
+                            <m:t>2</m:t>
+                          </m:r>
+                        </m:sub>
+                        <m:sup>
+                          <m:r>
+                            <a:rPr lang="en-US" sz="1000" b="0" i="1" smtClean="0">
+                              <a:solidFill>
+                                <a:schemeClr val="tx1"/>
+                              </a:solidFill>
+                              <a:latin typeface="Cambria Math" charset="0"/>
+                            </a:rPr>
+                            <m:t>𝑇</m:t>
+                          </m:r>
+                        </m:sup>
+                      </m:sSubSup>
+                      <m:r>
+                        <a:rPr lang="en-US" sz="1000" b="0" i="1" smtClean="0">
+                          <a:solidFill>
+                            <a:schemeClr val="tx1"/>
+                          </a:solidFill>
+                          <a:latin typeface="Cambria Math" charset="0"/>
+                        </a:rPr>
+                        <m:t>𝑄</m:t>
+                      </m:r>
+                      <m:sSub>
+                        <m:sSubPr>
+                          <m:ctrlPr>
+                            <a:rPr lang="en-US" sz="1000" b="0" i="1" smtClean="0">
+                              <a:solidFill>
+                                <a:schemeClr val="tx1"/>
+                              </a:solidFill>
+                              <a:latin typeface="Cambria Math" panose="02040503050406030204" pitchFamily="18" charset="0"/>
+                            </a:rPr>
+                          </m:ctrlPr>
+                        </m:sSubPr>
+                        <m:e>
+                          <m:r>
+                            <a:rPr lang="en-US" sz="1000" b="0" i="1" smtClean="0">
+                              <a:solidFill>
+                                <a:schemeClr val="tx1"/>
+                              </a:solidFill>
+                              <a:latin typeface="Cambria Math" charset="0"/>
+                            </a:rPr>
+                            <m:t>𝑥</m:t>
+                          </m:r>
+                        </m:e>
+                        <m:sub>
+                          <m:r>
+                            <a:rPr lang="en-US" sz="1000" b="0" i="1" smtClean="0">
+                              <a:solidFill>
+                                <a:schemeClr val="tx1"/>
+                              </a:solidFill>
+                              <a:latin typeface="Cambria Math" charset="0"/>
+                            </a:rPr>
+                            <m:t>2</m:t>
+                          </m:r>
+                        </m:sub>
+                      </m:sSub>
+                    </m:oMath>
+                  </m:oMathPara>
+                </a14:m>
+                <a:endParaRPr lang="en-US" sz="1000" dirty="0">
+                  <a:solidFill>
+                    <a:schemeClr val="tx1"/>
+                  </a:solidFill>
+                </a:endParaRPr>
+              </a:p>
+            </p:txBody>
+          </p:sp>
+        </mc:Choice>
+        <mc:Fallback xmlns="">
+          <p:sp>
+            <p:nvSpPr>
+              <p:cNvPr id="35" name="Rounded Rectangular Callout 34"/>
+              <p:cNvSpPr>
+                <a:spLocks noRot="1" noChangeAspect="1" noMove="1" noResize="1" noEditPoints="1" noAdjustHandles="1" noChangeArrowheads="1" noChangeShapeType="1" noTextEdit="1"/>
+              </p:cNvSpPr>
+              <p:nvPr/>
+            </p:nvSpPr>
+            <p:spPr>
+              <a:xfrm>
+                <a:off x="6921276" y="2046491"/>
+                <a:ext cx="608060" cy="273042"/>
+              </a:xfrm>
+              <a:prstGeom prst="wedgeRoundRectCallout">
+                <a:avLst>
+                  <a:gd name="adj1" fmla="val -23274"/>
+                  <a:gd name="adj2" fmla="val 104845"/>
+                  <a:gd name="adj3" fmla="val 16667"/>
+                </a:avLst>
+              </a:prstGeom>
+              <a:blipFill rotWithShape="0">
+                <a:blip r:embed="rId13"/>
+                <a:stretch>
+                  <a:fillRect/>
+                </a:stretch>
+              </a:blipFill>
+              <a:ln>
+                <a:noFill/>
+              </a:ln>
+            </p:spPr>
+            <p:txBody>
+              <a:bodyPr/>
+              <a:lstStyle/>
+              <a:p>
+                <a:r>
+                  <a:rPr lang="en-US">
+                    <a:noFill/>
+                  </a:rPr>
+                  <a:t> </a:t>
+                </a:r>
+              </a:p>
+            </p:txBody>
+          </p:sp>
+        </mc:Fallback>
+      </mc:AlternateContent>
+      <mc:AlternateContent xmlns:mc="http://schemas.openxmlformats.org/markup-compatibility/2006" xmlns:a14="http://schemas.microsoft.com/office/drawing/2010/main">
+        <mc:Choice Requires="a14">
+          <p:sp>
+            <p:nvSpPr>
+              <p:cNvPr id="36" name="Rounded Rectangular Callout 35"/>
+              <p:cNvSpPr/>
+              <p:nvPr/>
+            </p:nvSpPr>
+            <p:spPr>
+              <a:xfrm>
+                <a:off x="5271367" y="4471479"/>
+                <a:ext cx="660035" cy="325136"/>
+              </a:xfrm>
+              <a:prstGeom prst="wedgeRoundRectCallout">
+                <a:avLst>
+                  <a:gd name="adj1" fmla="val 63705"/>
+                  <a:gd name="adj2" fmla="val 122466"/>
+                  <a:gd name="adj3" fmla="val 16667"/>
+                </a:avLst>
+              </a:prstGeom>
+              <a:solidFill>
+                <a:schemeClr val="bg2"/>
+              </a:solidFill>
+              <a:ln>
+                <a:noFill/>
+              </a:ln>
+            </p:spPr>
+            <p:style>
+              <a:lnRef idx="2">
+                <a:schemeClr val="accent1">
+                  <a:shade val="50000"/>
+                </a:schemeClr>
+              </a:lnRef>
+              <a:fillRef idx="1">
+                <a:schemeClr val="accent1"/>
+              </a:fillRef>
+              <a:effectRef idx="0">
+                <a:schemeClr val="accent1"/>
+              </a:effectRef>
+              <a:fontRef idx="minor">
+                <a:schemeClr val="lt1"/>
+              </a:fontRef>
+            </p:style>
+            <p:txBody>
+              <a:bodyPr rtlCol="0" anchor="ctr"/>
+              <a:lstStyle/>
+              <a:p>
+                <a:pPr algn="ctr"/>
+                <a14:m>
+                  <m:oMathPara xmlns:m="http://schemas.openxmlformats.org/officeDocument/2006/math">
+                    <m:oMathParaPr>
+                      <m:jc m:val="centerGroup"/>
+                    </m:oMathParaPr>
+                    <m:oMath xmlns:m="http://schemas.openxmlformats.org/officeDocument/2006/math">
+                      <m:sSubSup>
+                        <m:sSubSupPr>
+                          <m:ctrlPr>
+                            <a:rPr lang="en-US" sz="1000" b="0" i="1" smtClean="0">
+                              <a:solidFill>
+                                <a:schemeClr val="tx1"/>
+                              </a:solidFill>
+                              <a:latin typeface="Cambria Math" panose="02040503050406030204" pitchFamily="18" charset="0"/>
+                            </a:rPr>
+                          </m:ctrlPr>
+                        </m:sSubSupPr>
+                        <m:e>
+                          <m:r>
+                            <a:rPr lang="en-US" sz="1000" b="0" i="1" smtClean="0">
+                              <a:solidFill>
+                                <a:schemeClr val="tx1"/>
+                              </a:solidFill>
+                              <a:latin typeface="Cambria Math" charset="0"/>
+                            </a:rPr>
+                            <m:t>𝑢</m:t>
+                          </m:r>
+                        </m:e>
+                        <m:sub>
+                          <m:r>
+                            <a:rPr lang="en-US" sz="1000" b="0" i="1" smtClean="0">
+                              <a:solidFill>
+                                <a:schemeClr val="tx1"/>
+                              </a:solidFill>
+                              <a:latin typeface="Cambria Math" charset="0"/>
+                            </a:rPr>
+                            <m:t>1</m:t>
+                          </m:r>
+                        </m:sub>
+                        <m:sup>
+                          <m:r>
+                            <a:rPr lang="en-US" sz="1000" b="0" i="1" smtClean="0">
+                              <a:solidFill>
+                                <a:schemeClr val="tx1"/>
+                              </a:solidFill>
+                              <a:latin typeface="Cambria Math" charset="0"/>
+                            </a:rPr>
+                            <m:t>𝑇</m:t>
+                          </m:r>
+                        </m:sup>
+                      </m:sSubSup>
+                      <m:r>
+                        <a:rPr lang="en-US" sz="1000" b="0" i="1" smtClean="0">
+                          <a:solidFill>
+                            <a:schemeClr val="tx1"/>
+                          </a:solidFill>
+                          <a:latin typeface="Cambria Math" charset="0"/>
+                        </a:rPr>
+                        <m:t>𝑅</m:t>
+                      </m:r>
+                      <m:sSub>
+                        <m:sSubPr>
+                          <m:ctrlPr>
+                            <a:rPr lang="en-US" sz="1000" b="0" i="1" smtClean="0">
+                              <a:solidFill>
+                                <a:schemeClr val="tx1"/>
+                              </a:solidFill>
+                              <a:latin typeface="Cambria Math" panose="02040503050406030204" pitchFamily="18" charset="0"/>
+                            </a:rPr>
+                          </m:ctrlPr>
+                        </m:sSubPr>
+                        <m:e>
+                          <m:r>
+                            <a:rPr lang="en-US" sz="1000" b="0" i="1" smtClean="0">
+                              <a:solidFill>
+                                <a:schemeClr val="tx1"/>
+                              </a:solidFill>
+                              <a:latin typeface="Cambria Math" charset="0"/>
+                            </a:rPr>
+                            <m:t>𝑢</m:t>
+                          </m:r>
+                        </m:e>
+                        <m:sub>
+                          <m:r>
+                            <a:rPr lang="en-US" sz="1000" b="0" i="1" smtClean="0">
+                              <a:solidFill>
+                                <a:schemeClr val="tx1"/>
+                              </a:solidFill>
+                              <a:latin typeface="Cambria Math" charset="0"/>
+                            </a:rPr>
+                            <m:t>1</m:t>
+                          </m:r>
+                        </m:sub>
+                      </m:sSub>
+                    </m:oMath>
+                  </m:oMathPara>
+                </a14:m>
+                <a:endParaRPr lang="en-US" sz="1000" dirty="0">
+                  <a:solidFill>
+                    <a:schemeClr val="tx1"/>
+                  </a:solidFill>
+                </a:endParaRPr>
+              </a:p>
+            </p:txBody>
+          </p:sp>
+        </mc:Choice>
+        <mc:Fallback xmlns="">
+          <p:sp>
+            <p:nvSpPr>
+              <p:cNvPr id="36" name="Rounded Rectangular Callout 35"/>
+              <p:cNvSpPr>
+                <a:spLocks noRot="1" noChangeAspect="1" noMove="1" noResize="1" noEditPoints="1" noAdjustHandles="1" noChangeArrowheads="1" noChangeShapeType="1" noTextEdit="1"/>
+              </p:cNvSpPr>
+              <p:nvPr/>
+            </p:nvSpPr>
+            <p:spPr>
+              <a:xfrm>
+                <a:off x="5271367" y="4471479"/>
+                <a:ext cx="660035" cy="325136"/>
+              </a:xfrm>
+              <a:prstGeom prst="wedgeRoundRectCallout">
+                <a:avLst>
+                  <a:gd name="adj1" fmla="val 63705"/>
+                  <a:gd name="adj2" fmla="val 122466"/>
+                  <a:gd name="adj3" fmla="val 16667"/>
+                </a:avLst>
+              </a:prstGeom>
+              <a:blipFill rotWithShape="0">
+                <a:blip r:embed="rId14"/>
+                <a:stretch>
+                  <a:fillRect/>
+                </a:stretch>
+              </a:blipFill>
+              <a:ln>
+                <a:noFill/>
+              </a:ln>
+            </p:spPr>
+            <p:txBody>
+              <a:bodyPr/>
+              <a:lstStyle/>
+              <a:p>
+                <a:r>
+                  <a:rPr lang="en-US">
+                    <a:noFill/>
+                  </a:rPr>
+                  <a:t> </a:t>
+                </a:r>
+              </a:p>
+            </p:txBody>
+          </p:sp>
+        </mc:Fallback>
+      </mc:AlternateContent>
+    </p:spTree>
+    <p:extLst>
+      <p:ext uri="{BB962C8B-B14F-4D97-AF65-F5344CB8AC3E}">
+        <p14:creationId xmlns:p14="http://schemas.microsoft.com/office/powerpoint/2010/main" val="1411461014"/>
+      </p:ext>
+    </p:extLst>
+  </p:cSld>
+  <p:clrMapOvr>
+    <a:masterClrMapping/>
+  </p:clrMapOvr>
+</p:sld>
+</file>
+
 <file path=ppt/slides/slide2.xml><?xml version="1.0" encoding="utf-8"?>
 <p:sld xmlns:a="http://schemas.openxmlformats.org/drawingml/2006/main" xmlns:r="http://schemas.openxmlformats.org/officeDocument/2006/relationships" xmlns:p="http://schemas.openxmlformats.org/presentationml/2006/main">
   <p:cSld>
@@ -11539,7 +14517,7 @@
           </a:prstGeom>
           <a:ln>
             <a:solidFill>
-              <a:schemeClr val="accent1"/>
+              <a:srgbClr val="0000FF"/>
             </a:solidFill>
             <a:prstDash val="dash"/>
           </a:ln>
@@ -11574,11 +14552,11 @@
             <a:avLst/>
           </a:prstGeom>
           <a:solidFill>
-            <a:schemeClr val="accent1"/>
+            <a:srgbClr val="0000FF"/>
           </a:solidFill>
           <a:ln>
             <a:solidFill>
-              <a:schemeClr val="accent1"/>
+              <a:srgbClr val="0000FF"/>
             </a:solidFill>
           </a:ln>
         </p:spPr>
@@ -11626,7 +14604,7 @@
           </a:prstGeom>
           <a:ln>
             <a:solidFill>
-              <a:schemeClr val="accent1"/>
+              <a:srgbClr val="0000FF"/>
             </a:solidFill>
             <a:prstDash val="dash"/>
           </a:ln>
@@ -17474,8 +20452,8 @@
           </p:sp>
         </mc:Fallback>
       </mc:AlternateContent>
-      <mc:AlternateContent xmlns:mc="http://schemas.openxmlformats.org/markup-compatibility/2006">
-        <mc:Choice xmlns:a14="http://schemas.microsoft.com/office/drawing/2010/main" Requires="a14">
+      <mc:AlternateContent xmlns:mc="http://schemas.openxmlformats.org/markup-compatibility/2006" xmlns:a14="http://schemas.microsoft.com/office/drawing/2010/main">
+        <mc:Choice Requires="a14">
           <p:sp>
             <p:nvSpPr>
               <p:cNvPr id="44" name="Rounded Rectangular Callout 43"/>
@@ -17791,7 +20769,7 @@
             </p:txBody>
           </p:sp>
         </mc:Choice>
-        <mc:Fallback>
+        <mc:Fallback xmlns="">
           <p:sp>
             <p:nvSpPr>
               <p:cNvPr id="44" name="Rounded Rectangular Callout 43"/>
@@ -17858,11 +20836,11 @@
             <a:avLst/>
           </a:prstGeom>
           <a:solidFill>
-            <a:schemeClr val="accent1"/>
+            <a:srgbClr val="0000FF"/>
           </a:solidFill>
           <a:ln>
             <a:solidFill>
-              <a:schemeClr val="accent1"/>
+              <a:srgbClr val="0000FF"/>
             </a:solidFill>
           </a:ln>
         </p:spPr>
@@ -17902,7 +20880,6 @@
           </p:cNvPr>
           <p:cNvCxnSpPr>
             <a:cxnSpLocks/>
-            <a:stCxn id="6" idx="7"/>
             <a:endCxn id="26" idx="3"/>
           </p:cNvCxnSpPr>
           <p:nvPr/>
@@ -17917,7 +20894,7 @@
           </a:prstGeom>
           <a:ln>
             <a:solidFill>
-              <a:schemeClr val="accent1"/>
+              <a:srgbClr val="0000FF"/>
             </a:solidFill>
             <a:prstDash val="dash"/>
           </a:ln>
@@ -26050,7 +29027,7 @@
           </a:prstGeom>
           <a:ln>
             <a:solidFill>
-              <a:schemeClr val="accent1"/>
+              <a:srgbClr val="0000FF"/>
             </a:solidFill>
             <a:prstDash val="dash"/>
           </a:ln>
@@ -26091,11 +29068,11 @@
             <a:avLst/>
           </a:prstGeom>
           <a:solidFill>
-            <a:schemeClr val="accent1"/>
+            <a:srgbClr val="0000FF"/>
           </a:solidFill>
           <a:ln>
             <a:solidFill>
-              <a:schemeClr val="accent1"/>
+              <a:srgbClr val="0000FF"/>
             </a:solidFill>
           </a:ln>
         </p:spPr>
@@ -26150,7 +29127,7 @@
           </a:prstGeom>
           <a:ln>
             <a:solidFill>
-              <a:schemeClr val="accent1"/>
+              <a:srgbClr val="0000FF"/>
             </a:solidFill>
             <a:prstDash val="dash"/>
           </a:ln>
@@ -31878,11 +34855,11 @@
             <a:avLst/>
           </a:prstGeom>
           <a:solidFill>
-            <a:schemeClr val="accent1"/>
+            <a:srgbClr val="0000FF"/>
           </a:solidFill>
           <a:ln>
             <a:solidFill>
-              <a:schemeClr val="accent1"/>
+              <a:srgbClr val="0000FF"/>
             </a:solidFill>
           </a:ln>
         </p:spPr>
@@ -31937,7 +34914,7 @@
           </a:prstGeom>
           <a:ln>
             <a:solidFill>
-              <a:schemeClr val="accent1"/>
+              <a:srgbClr val="0000FF"/>
             </a:solidFill>
             <a:prstDash val="dash"/>
           </a:ln>
@@ -31957,8 +34934,8 @@
           </a:fontRef>
         </p:style>
       </p:cxnSp>
-      <mc:AlternateContent xmlns:mc="http://schemas.openxmlformats.org/markup-compatibility/2006">
-        <mc:Choice xmlns:a14="http://schemas.microsoft.com/office/drawing/2010/main" Requires="a14">
+      <mc:AlternateContent xmlns:mc="http://schemas.openxmlformats.org/markup-compatibility/2006" xmlns:a14="http://schemas.microsoft.com/office/drawing/2010/main">
+        <mc:Choice Requires="a14">
           <p:sp>
             <p:nvSpPr>
               <p:cNvPr id="29" name="Rounded Rectangular Callout 28">
@@ -32069,7 +35046,7 @@
                               <a:solidFill>
                                 <a:schemeClr val="tx1"/>
                               </a:solidFill>
-                              <a:latin typeface="Cambria Math" charset="0"/>
+                              <a:latin typeface="Cambria Math" panose="02040503050406030204" pitchFamily="18" charset="0"/>
                             </a:rPr>
                           </m:ctrlPr>
                         </m:dPr>
@@ -32344,7 +35321,7 @@
             </p:txBody>
           </p:sp>
         </mc:Choice>
-        <mc:Fallback>
+        <mc:Fallback xmlns="">
           <p:sp>
             <p:nvSpPr>
               <p:cNvPr id="29" name="Rounded Rectangular Callout 28">

</xml_diff>

<commit_message>
fix elimination algorithm at last step
</commit_message>
<xml_diff>
--- a/assets/images/lqr_control/Elimination.pptx
+++ b/assets/images/lqr_control/Elimination.pptx
@@ -7921,220 +7921,8 @@
           </p:sp>
         </mc:Fallback>
       </mc:AlternateContent>
-      <mc:AlternateContent xmlns:mc="http://schemas.openxmlformats.org/markup-compatibility/2006">
-        <mc:Choice xmlns:a14="http://schemas.microsoft.com/office/drawing/2010/main" Requires="a14">
-          <p:sp>
-            <p:nvSpPr>
-              <p:cNvPr id="25" name="Rounded Rectangular Callout 24">
-                <a:extLst>
-                  <a:ext uri="{FF2B5EF4-FFF2-40B4-BE49-F238E27FC236}">
-                    <a16:creationId xmlns:a16="http://schemas.microsoft.com/office/drawing/2014/main" id="{9522F6CE-2C2E-3840-8391-A7C6820E4E7B}"/>
-                  </a:ext>
-                </a:extLst>
-              </p:cNvPr>
-              <p:cNvSpPr/>
-              <p:nvPr/>
-            </p:nvSpPr>
-            <p:spPr>
-              <a:xfrm>
-                <a:off x="3484025" y="4477058"/>
-                <a:ext cx="660035" cy="325136"/>
-              </a:xfrm>
-              <a:prstGeom prst="wedgeRoundRectCallout">
-                <a:avLst>
-                  <a:gd name="adj1" fmla="val 63705"/>
-                  <a:gd name="adj2" fmla="val 122466"/>
-                  <a:gd name="adj3" fmla="val 16667"/>
-                </a:avLst>
-              </a:prstGeom>
-              <a:solidFill>
-                <a:schemeClr val="bg2"/>
-              </a:solidFill>
-              <a:ln>
-                <a:noFill/>
-              </a:ln>
-            </p:spPr>
-            <p:style>
-              <a:lnRef idx="2">
-                <a:schemeClr val="accent1">
-                  <a:shade val="50000"/>
-                </a:schemeClr>
-              </a:lnRef>
-              <a:fillRef idx="1">
-                <a:schemeClr val="accent1"/>
-              </a:fillRef>
-              <a:effectRef idx="0">
-                <a:schemeClr val="accent1"/>
-              </a:effectRef>
-              <a:fontRef idx="minor">
-                <a:schemeClr val="lt1"/>
-              </a:fontRef>
-            </p:style>
-            <p:txBody>
-              <a:bodyPr rtlCol="0" anchor="ctr"/>
-              <a:lstStyle/>
-              <a:p>
-                <a:pPr algn="ctr"/>
-                <a14:m>
-                  <m:oMathPara xmlns:m="http://schemas.openxmlformats.org/officeDocument/2006/math">
-                    <m:oMathParaPr>
-                      <m:jc m:val="centerGroup"/>
-                    </m:oMathParaPr>
-                    <m:oMath xmlns:m="http://schemas.openxmlformats.org/officeDocument/2006/math">
-                      <m:sSubSup>
-                        <m:sSubSupPr>
-                          <m:ctrlPr>
-                            <a:rPr lang="en-US" sz="1000" b="0" i="1" smtClean="0">
-                              <a:solidFill>
-                                <a:schemeClr val="tx1"/>
-                              </a:solidFill>
-                              <a:latin typeface="Cambria Math" panose="02040503050406030204" pitchFamily="18" charset="0"/>
-                            </a:rPr>
-                          </m:ctrlPr>
-                        </m:sSubSupPr>
-                        <m:e>
-                          <m:r>
-                            <a:rPr lang="en-US" sz="1000" b="0" i="1" smtClean="0">
-                              <a:solidFill>
-                                <a:schemeClr val="tx1"/>
-                              </a:solidFill>
-                              <a:latin typeface="Cambria Math" charset="0"/>
-                            </a:rPr>
-                            <m:t>𝑢</m:t>
-                          </m:r>
-                        </m:e>
-                        <m:sub>
-                          <m:r>
-                            <a:rPr lang="en-US" sz="1000" b="0" i="1" smtClean="0">
-                              <a:solidFill>
-                                <a:schemeClr val="tx1"/>
-                              </a:solidFill>
-                              <a:latin typeface="Cambria Math" charset="0"/>
-                            </a:rPr>
-                            <m:t>0</m:t>
-                          </m:r>
-                        </m:sub>
-                        <m:sup>
-                          <m:r>
-                            <a:rPr lang="en-US" sz="1000" b="0" i="1" smtClean="0">
-                              <a:solidFill>
-                                <a:schemeClr val="tx1"/>
-                              </a:solidFill>
-                              <a:latin typeface="Cambria Math" charset="0"/>
-                            </a:rPr>
-                            <m:t>𝑇</m:t>
-                          </m:r>
-                        </m:sup>
-                      </m:sSubSup>
-                      <m:r>
-                        <a:rPr lang="en-US" sz="1000" b="0" i="1" smtClean="0">
-                          <a:solidFill>
-                            <a:schemeClr val="tx1"/>
-                          </a:solidFill>
-                          <a:latin typeface="Cambria Math" charset="0"/>
-                        </a:rPr>
-                        <m:t>𝑅</m:t>
-                      </m:r>
-                      <m:sSub>
-                        <m:sSubPr>
-                          <m:ctrlPr>
-                            <a:rPr lang="en-US" sz="1000" b="0" i="1" smtClean="0">
-                              <a:solidFill>
-                                <a:schemeClr val="tx1"/>
-                              </a:solidFill>
-                              <a:latin typeface="Cambria Math" panose="02040503050406030204" pitchFamily="18" charset="0"/>
-                            </a:rPr>
-                          </m:ctrlPr>
-                        </m:sSubPr>
-                        <m:e>
-                          <m:r>
-                            <a:rPr lang="en-US" sz="1000" b="0" i="1" smtClean="0">
-                              <a:solidFill>
-                                <a:schemeClr val="tx1"/>
-                              </a:solidFill>
-                              <a:latin typeface="Cambria Math" charset="0"/>
-                            </a:rPr>
-                            <m:t>𝑢</m:t>
-                          </m:r>
-                        </m:e>
-                        <m:sub>
-                          <m:r>
-                            <a:rPr lang="en-US" sz="1000" b="0" i="1" smtClean="0">
-                              <a:solidFill>
-                                <a:schemeClr val="tx1"/>
-                              </a:solidFill>
-                              <a:latin typeface="Cambria Math" charset="0"/>
-                            </a:rPr>
-                            <m:t>0</m:t>
-                          </m:r>
-                        </m:sub>
-                      </m:sSub>
-                    </m:oMath>
-                  </m:oMathPara>
-                </a14:m>
-                <a:endParaRPr lang="en-US" sz="1000" dirty="0">
-                  <a:solidFill>
-                    <a:schemeClr val="tx1"/>
-                  </a:solidFill>
-                </a:endParaRPr>
-              </a:p>
-            </p:txBody>
-          </p:sp>
-        </mc:Choice>
-        <mc:Fallback>
-          <p:sp>
-            <p:nvSpPr>
-              <p:cNvPr id="25" name="Rounded Rectangular Callout 24">
-                <a:extLst>
-                  <a:ext uri="{FF2B5EF4-FFF2-40B4-BE49-F238E27FC236}">
-                    <a16:creationId xmlns:a16="http://schemas.microsoft.com/office/drawing/2014/main" id="{9522F6CE-2C2E-3840-8391-A7C6820E4E7B}"/>
-                  </a:ext>
-                </a:extLst>
-              </p:cNvPr>
-              <p:cNvSpPr>
-                <a:spLocks noRot="1" noChangeAspect="1" noMove="1" noResize="1" noEditPoints="1" noAdjustHandles="1" noChangeArrowheads="1" noChangeShapeType="1" noTextEdit="1"/>
-              </p:cNvSpPr>
-              <p:nvPr/>
-            </p:nvSpPr>
-            <p:spPr>
-              <a:xfrm>
-                <a:off x="3484025" y="4477058"/>
-                <a:ext cx="660035" cy="325136"/>
-              </a:xfrm>
-              <a:prstGeom prst="wedgeRoundRectCallout">
-                <a:avLst>
-                  <a:gd name="adj1" fmla="val 63705"/>
-                  <a:gd name="adj2" fmla="val 122466"/>
-                  <a:gd name="adj3" fmla="val 16667"/>
-                </a:avLst>
-              </a:prstGeom>
-              <a:blipFill>
-                <a:blip r:embed="rId14"/>
-                <a:stretch>
-                  <a:fillRect/>
-                </a:stretch>
-              </a:blipFill>
-              <a:ln>
-                <a:noFill/>
-              </a:ln>
-            </p:spPr>
-            <p:txBody>
-              <a:bodyPr/>
-              <a:lstStyle/>
-              <a:p>
-                <a:r>
-                  <a:rPr lang="en-US">
-                    <a:noFill/>
-                  </a:rPr>
-                  <a:t> </a:t>
-                </a:r>
-              </a:p>
-            </p:txBody>
-          </p:sp>
-        </mc:Fallback>
-      </mc:AlternateContent>
-      <mc:AlternateContent xmlns:mc="http://schemas.openxmlformats.org/markup-compatibility/2006">
-        <mc:Choice xmlns:a14="http://schemas.microsoft.com/office/drawing/2010/main" Requires="a14">
+      <mc:AlternateContent xmlns:mc="http://schemas.openxmlformats.org/markup-compatibility/2006" xmlns:a14="http://schemas.microsoft.com/office/drawing/2010/main">
+        <mc:Choice Requires="a14">
           <p:sp>
             <p:nvSpPr>
               <p:cNvPr id="26" name="Rounded Rectangular Callout 25">
@@ -8343,7 +8131,7 @@
             </p:txBody>
           </p:sp>
         </mc:Choice>
-        <mc:Fallback>
+        <mc:Fallback xmlns="">
           <p:sp>
             <p:nvSpPr>
               <p:cNvPr id="26" name="Rounded Rectangular Callout 25">
@@ -8395,8 +8183,8 @@
           </p:sp>
         </mc:Fallback>
       </mc:AlternateContent>
-      <mc:AlternateContent xmlns:mc="http://schemas.openxmlformats.org/markup-compatibility/2006">
-        <mc:Choice xmlns:a14="http://schemas.microsoft.com/office/drawing/2010/main" Requires="a14">
+      <mc:AlternateContent xmlns:mc="http://schemas.openxmlformats.org/markup-compatibility/2006" xmlns:a14="http://schemas.microsoft.com/office/drawing/2010/main">
+        <mc:Choice Requires="a14">
           <p:sp>
             <p:nvSpPr>
               <p:cNvPr id="27" name="Rounded Rectangular Callout 26">
@@ -8578,7 +8366,7 @@
             </p:txBody>
           </p:sp>
         </mc:Choice>
-        <mc:Fallback>
+        <mc:Fallback xmlns="">
           <p:sp>
             <p:nvSpPr>
               <p:cNvPr id="27" name="Rounded Rectangular Callout 26">
@@ -8630,8 +8418,8 @@
           </p:sp>
         </mc:Fallback>
       </mc:AlternateContent>
-      <mc:AlternateContent xmlns:mc="http://schemas.openxmlformats.org/markup-compatibility/2006">
-        <mc:Choice xmlns:a14="http://schemas.microsoft.com/office/drawing/2010/main" Requires="a14">
+      <mc:AlternateContent xmlns:mc="http://schemas.openxmlformats.org/markup-compatibility/2006" xmlns:a14="http://schemas.microsoft.com/office/drawing/2010/main">
+        <mc:Choice Requires="a14">
           <p:sp>
             <p:nvSpPr>
               <p:cNvPr id="29" name="Rounded Rectangular Callout 28">
@@ -8840,7 +8628,7 @@
             </p:txBody>
           </p:sp>
         </mc:Choice>
-        <mc:Fallback>
+        <mc:Fallback xmlns="">
           <p:sp>
             <p:nvSpPr>
               <p:cNvPr id="29" name="Rounded Rectangular Callout 28">
@@ -8869,6 +8657,241 @@
               </a:prstGeom>
               <a:blipFill>
                 <a:blip r:embed="rId16"/>
+                <a:stretch>
+                  <a:fillRect/>
+                </a:stretch>
+              </a:blipFill>
+              <a:ln>
+                <a:noFill/>
+              </a:ln>
+            </p:spPr>
+            <p:txBody>
+              <a:bodyPr/>
+              <a:lstStyle/>
+              <a:p>
+                <a:r>
+                  <a:rPr lang="en-US">
+                    <a:noFill/>
+                  </a:rPr>
+                  <a:t> </a:t>
+                </a:r>
+              </a:p>
+            </p:txBody>
+          </p:sp>
+        </mc:Fallback>
+      </mc:AlternateContent>
+      <mc:AlternateContent xmlns:mc="http://schemas.openxmlformats.org/markup-compatibility/2006">
+        <mc:Choice xmlns:a14="http://schemas.microsoft.com/office/drawing/2010/main" Requires="a14">
+          <p:sp>
+            <p:nvSpPr>
+              <p:cNvPr id="31" name="Rounded Rectangular Callout 30">
+                <a:extLst>
+                  <a:ext uri="{FF2B5EF4-FFF2-40B4-BE49-F238E27FC236}">
+                    <a16:creationId xmlns:a16="http://schemas.microsoft.com/office/drawing/2014/main" id="{2E4530D1-FE90-7C47-AE61-D474662D7943}"/>
+                  </a:ext>
+                </a:extLst>
+              </p:cNvPr>
+              <p:cNvSpPr/>
+              <p:nvPr/>
+            </p:nvSpPr>
+            <p:spPr>
+              <a:xfrm>
+                <a:off x="4511631" y="4731683"/>
+                <a:ext cx="872238" cy="235954"/>
+              </a:xfrm>
+              <a:prstGeom prst="wedgeRoundRectCallout">
+                <a:avLst>
+                  <a:gd name="adj1" fmla="val -64579"/>
+                  <a:gd name="adj2" fmla="val -173771"/>
+                  <a:gd name="adj3" fmla="val 16667"/>
+                </a:avLst>
+              </a:prstGeom>
+              <a:solidFill>
+                <a:schemeClr val="bg2"/>
+              </a:solidFill>
+              <a:ln>
+                <a:noFill/>
+              </a:ln>
+            </p:spPr>
+            <p:style>
+              <a:lnRef idx="2">
+                <a:schemeClr val="accent1">
+                  <a:shade val="50000"/>
+                </a:schemeClr>
+              </a:lnRef>
+              <a:fillRef idx="1">
+                <a:schemeClr val="accent1"/>
+              </a:fillRef>
+              <a:effectRef idx="0">
+                <a:schemeClr val="accent1"/>
+              </a:effectRef>
+              <a:fontRef idx="minor">
+                <a:schemeClr val="lt1"/>
+              </a:fontRef>
+            </p:style>
+            <p:txBody>
+              <a:bodyPr rtlCol="0" anchor="ctr"/>
+              <a:lstStyle/>
+              <a:p>
+                <a:pPr algn="ctr"/>
+                <a14:m>
+                  <m:oMathPara xmlns:m="http://schemas.openxmlformats.org/officeDocument/2006/math">
+                    <m:oMathParaPr>
+                      <m:jc m:val="centerGroup"/>
+                    </m:oMathParaPr>
+                    <m:oMath xmlns:m="http://schemas.openxmlformats.org/officeDocument/2006/math">
+                      <m:sSub>
+                        <m:sSubPr>
+                          <m:ctrlPr>
+                            <a:rPr lang="en-US" sz="1000" b="0" i="1" smtClean="0">
+                              <a:solidFill>
+                                <a:schemeClr val="tx1"/>
+                              </a:solidFill>
+                              <a:latin typeface="Cambria Math" panose="02040503050406030204" pitchFamily="18" charset="0"/>
+                            </a:rPr>
+                          </m:ctrlPr>
+                        </m:sSubPr>
+                        <m:e>
+                          <m:r>
+                            <a:rPr lang="en-US" sz="1000" b="0" i="1" smtClean="0">
+                              <a:solidFill>
+                                <a:schemeClr val="tx1"/>
+                              </a:solidFill>
+                              <a:latin typeface="Cambria Math" charset="0"/>
+                            </a:rPr>
+                            <m:t>𝑢</m:t>
+                          </m:r>
+                        </m:e>
+                        <m:sub>
+                          <m:r>
+                            <a:rPr lang="en-US" sz="1000" b="0" i="1" smtClean="0">
+                              <a:solidFill>
+                                <a:schemeClr val="tx1"/>
+                              </a:solidFill>
+                              <a:latin typeface="Cambria Math" charset="0"/>
+                            </a:rPr>
+                            <m:t>0</m:t>
+                          </m:r>
+                        </m:sub>
+                      </m:sSub>
+                      <m:r>
+                        <a:rPr lang="en-US" sz="1000" b="0" i="1" smtClean="0">
+                          <a:solidFill>
+                            <a:schemeClr val="tx1"/>
+                          </a:solidFill>
+                          <a:latin typeface="Cambria Math" charset="0"/>
+                        </a:rPr>
+                        <m:t>=</m:t>
+                      </m:r>
+                      <m:sSub>
+                        <m:sSubPr>
+                          <m:ctrlPr>
+                            <a:rPr lang="en-US" sz="1000" b="0" i="1" smtClean="0">
+                              <a:solidFill>
+                                <a:schemeClr val="tx1"/>
+                              </a:solidFill>
+                              <a:latin typeface="Cambria Math" panose="02040503050406030204" pitchFamily="18" charset="0"/>
+                            </a:rPr>
+                          </m:ctrlPr>
+                        </m:sSubPr>
+                        <m:e>
+                          <m:r>
+                            <a:rPr lang="en-US" sz="1000" b="0" i="1" smtClean="0">
+                              <a:solidFill>
+                                <a:schemeClr val="tx1"/>
+                              </a:solidFill>
+                              <a:latin typeface="Cambria Math" charset="0"/>
+                            </a:rPr>
+                            <m:t>𝐾</m:t>
+                          </m:r>
+                        </m:e>
+                        <m:sub>
+                          <m:r>
+                            <a:rPr lang="en-US" sz="1000" b="0" i="1" smtClean="0">
+                              <a:solidFill>
+                                <a:schemeClr val="tx1"/>
+                              </a:solidFill>
+                              <a:latin typeface="Cambria Math" charset="0"/>
+                            </a:rPr>
+                            <m:t>0</m:t>
+                          </m:r>
+                        </m:sub>
+                      </m:sSub>
+                      <m:sSub>
+                        <m:sSubPr>
+                          <m:ctrlPr>
+                            <a:rPr lang="en-US" sz="1000" b="0" i="1" smtClean="0">
+                              <a:solidFill>
+                                <a:schemeClr val="tx1"/>
+                              </a:solidFill>
+                              <a:latin typeface="Cambria Math" panose="02040503050406030204" pitchFamily="18" charset="0"/>
+                            </a:rPr>
+                          </m:ctrlPr>
+                        </m:sSubPr>
+                        <m:e>
+                          <m:r>
+                            <a:rPr lang="en-US" sz="1000" b="0" i="1" smtClean="0">
+                              <a:solidFill>
+                                <a:schemeClr val="tx1"/>
+                              </a:solidFill>
+                              <a:latin typeface="Cambria Math" charset="0"/>
+                            </a:rPr>
+                            <m:t>𝑥</m:t>
+                          </m:r>
+                        </m:e>
+                        <m:sub>
+                          <m:r>
+                            <a:rPr lang="en-US" sz="1000" b="0" i="1" smtClean="0">
+                              <a:solidFill>
+                                <a:schemeClr val="tx1"/>
+                              </a:solidFill>
+                              <a:latin typeface="Cambria Math" charset="0"/>
+                            </a:rPr>
+                            <m:t>0</m:t>
+                          </m:r>
+                        </m:sub>
+                      </m:sSub>
+                    </m:oMath>
+                  </m:oMathPara>
+                </a14:m>
+                <a:endParaRPr lang="en-US" sz="1000" dirty="0">
+                  <a:solidFill>
+                    <a:schemeClr val="tx1"/>
+                  </a:solidFill>
+                </a:endParaRPr>
+              </a:p>
+            </p:txBody>
+          </p:sp>
+        </mc:Choice>
+        <mc:Fallback>
+          <p:sp>
+            <p:nvSpPr>
+              <p:cNvPr id="31" name="Rounded Rectangular Callout 30">
+                <a:extLst>
+                  <a:ext uri="{FF2B5EF4-FFF2-40B4-BE49-F238E27FC236}">
+                    <a16:creationId xmlns:a16="http://schemas.microsoft.com/office/drawing/2014/main" id="{2E4530D1-FE90-7C47-AE61-D474662D7943}"/>
+                  </a:ext>
+                </a:extLst>
+              </p:cNvPr>
+              <p:cNvSpPr>
+                <a:spLocks noRot="1" noChangeAspect="1" noMove="1" noResize="1" noEditPoints="1" noAdjustHandles="1" noChangeArrowheads="1" noChangeShapeType="1" noTextEdit="1"/>
+              </p:cNvSpPr>
+              <p:nvPr/>
+            </p:nvSpPr>
+            <p:spPr>
+              <a:xfrm>
+                <a:off x="4511631" y="4731683"/>
+                <a:ext cx="872238" cy="235954"/>
+              </a:xfrm>
+              <a:prstGeom prst="wedgeRoundRectCallout">
+                <a:avLst>
+                  <a:gd name="adj1" fmla="val -64579"/>
+                  <a:gd name="adj2" fmla="val -173771"/>
+                  <a:gd name="adj3" fmla="val 16667"/>
+                </a:avLst>
+              </a:prstGeom>
+              <a:blipFill>
+                <a:blip r:embed="rId17"/>
                 <a:stretch>
                   <a:fillRect/>
                 </a:stretch>
@@ -10579,8 +10602,8 @@
           </a:fontRef>
         </p:style>
       </p:cxnSp>
-      <mc:AlternateContent xmlns:mc="http://schemas.openxmlformats.org/markup-compatibility/2006" xmlns:a14="http://schemas.microsoft.com/office/drawing/2010/main">
-        <mc:Choice Requires="a14">
+      <mc:AlternateContent xmlns:mc="http://schemas.openxmlformats.org/markup-compatibility/2006">
+        <mc:Choice xmlns:a14="http://schemas.microsoft.com/office/drawing/2010/main" Requires="a14">
           <p:sp>
             <p:nvSpPr>
               <p:cNvPr id="33" name="Rounded Rectangular Callout 32"/>
@@ -10589,13 +10612,13 @@
             </p:nvSpPr>
             <p:spPr>
               <a:xfrm>
-                <a:off x="4652207" y="4731683"/>
+                <a:off x="4511631" y="4731683"/>
                 <a:ext cx="872238" cy="235954"/>
               </a:xfrm>
               <a:prstGeom prst="wedgeRoundRectCallout">
                 <a:avLst>
-                  <a:gd name="adj1" fmla="val -75974"/>
-                  <a:gd name="adj2" fmla="val -177983"/>
+                  <a:gd name="adj1" fmla="val -64579"/>
+                  <a:gd name="adj2" fmla="val -173771"/>
                   <a:gd name="adj3" fmla="val 16667"/>
                 </a:avLst>
               </a:prstGeom>
@@ -10756,7 +10779,7 @@
             </p:txBody>
           </p:sp>
         </mc:Choice>
-        <mc:Fallback xmlns="">
+        <mc:Fallback>
           <p:sp>
             <p:nvSpPr>
               <p:cNvPr id="33" name="Rounded Rectangular Callout 32"/>
@@ -10767,17 +10790,17 @@
             </p:nvSpPr>
             <p:spPr>
               <a:xfrm>
-                <a:off x="4652207" y="4731683"/>
+                <a:off x="4511631" y="4731683"/>
                 <a:ext cx="872238" cy="235954"/>
               </a:xfrm>
               <a:prstGeom prst="wedgeRoundRectCallout">
                 <a:avLst>
-                  <a:gd name="adj1" fmla="val -75974"/>
-                  <a:gd name="adj2" fmla="val -177983"/>
+                  <a:gd name="adj1" fmla="val -64579"/>
+                  <a:gd name="adj2" fmla="val -173771"/>
                   <a:gd name="adj3" fmla="val 16667"/>
                 </a:avLst>
               </a:prstGeom>
-              <a:blipFill rotWithShape="0">
+              <a:blipFill>
                 <a:blip r:embed="rId11"/>
                 <a:stretch>
                   <a:fillRect/>
@@ -10802,107 +10825,8 @@
           </p:sp>
         </mc:Fallback>
       </mc:AlternateContent>
-      <p:sp>
-        <p:nvSpPr>
-          <p:cNvPr id="19" name="Oval 18">
-            <a:extLst>
-              <a:ext uri="{FF2B5EF4-FFF2-40B4-BE49-F238E27FC236}">
-                <a16:creationId xmlns:a16="http://schemas.microsoft.com/office/drawing/2014/main" id="{F907B8A9-27B8-954B-930F-0A0DA9DA8325}"/>
-              </a:ext>
-            </a:extLst>
-          </p:cNvPr>
-          <p:cNvSpPr/>
-          <p:nvPr/>
-        </p:nvSpPr>
-        <p:spPr>
-          <a:xfrm>
-            <a:off x="3504319" y="2473473"/>
-            <a:ext cx="91440" cy="91440"/>
-          </a:xfrm>
-          <a:prstGeom prst="ellipse">
-            <a:avLst/>
-          </a:prstGeom>
-          <a:solidFill>
-            <a:srgbClr val="0000FF"/>
-          </a:solidFill>
-          <a:ln>
-            <a:solidFill>
-              <a:srgbClr val="0000FF"/>
-            </a:solidFill>
-          </a:ln>
-        </p:spPr>
-        <p:style>
-          <a:lnRef idx="2">
-            <a:schemeClr val="accent1">
-              <a:shade val="50000"/>
-            </a:schemeClr>
-          </a:lnRef>
-          <a:fillRef idx="1">
-            <a:schemeClr val="accent1"/>
-          </a:fillRef>
-          <a:effectRef idx="0">
-            <a:schemeClr val="accent1"/>
-          </a:effectRef>
-          <a:fontRef idx="minor">
-            <a:schemeClr val="lt1"/>
-          </a:fontRef>
-        </p:style>
-        <p:txBody>
-          <a:bodyPr rtlCol="0" anchor="ctr"/>
-          <a:lstStyle/>
-          <a:p>
-            <a:pPr algn="ctr"/>
-            <a:endParaRPr lang="en-US"/>
-          </a:p>
-        </p:txBody>
-      </p:sp>
-      <p:cxnSp>
-        <p:nvCxnSpPr>
-          <p:cNvPr id="3" name="Straight Connector 2">
-            <a:extLst>
-              <a:ext uri="{FF2B5EF4-FFF2-40B4-BE49-F238E27FC236}">
-                <a16:creationId xmlns:a16="http://schemas.microsoft.com/office/drawing/2014/main" id="{5AF5E74F-4F08-F94B-87A4-0D52459D30EE}"/>
-              </a:ext>
-            </a:extLst>
-          </p:cNvPr>
-          <p:cNvCxnSpPr>
-            <a:stCxn id="19" idx="4"/>
-            <a:endCxn id="4" idx="0"/>
-          </p:cNvCxnSpPr>
-          <p:nvPr/>
-        </p:nvCxnSpPr>
-        <p:spPr>
-          <a:xfrm>
-            <a:off x="3550039" y="2564913"/>
-            <a:ext cx="0" cy="399362"/>
-          </a:xfrm>
-          <a:prstGeom prst="line">
-            <a:avLst/>
-          </a:prstGeom>
-          <a:ln>
-            <a:solidFill>
-              <a:srgbClr val="0000FF"/>
-            </a:solidFill>
-            <a:prstDash val="dash"/>
-          </a:ln>
-        </p:spPr>
-        <p:style>
-          <a:lnRef idx="1">
-            <a:schemeClr val="accent1"/>
-          </a:lnRef>
-          <a:fillRef idx="0">
-            <a:schemeClr val="accent1"/>
-          </a:fillRef>
-          <a:effectRef idx="0">
-            <a:schemeClr val="accent1"/>
-          </a:effectRef>
-          <a:fontRef idx="minor">
-            <a:schemeClr val="tx1"/>
-          </a:fontRef>
-        </p:style>
-      </p:cxnSp>
-      <mc:AlternateContent xmlns:mc="http://schemas.openxmlformats.org/markup-compatibility/2006" xmlns:a14="http://schemas.microsoft.com/office/drawing/2010/main">
-        <mc:Choice Requires="a14">
+      <mc:AlternateContent xmlns:mc="http://schemas.openxmlformats.org/markup-compatibility/2006">
+        <mc:Choice xmlns:a14="http://schemas.microsoft.com/office/drawing/2010/main" Requires="a14">
           <p:sp>
             <p:nvSpPr>
               <p:cNvPr id="20" name="Rounded Rectangular Callout 19">
@@ -10917,13 +10841,13 @@
             </p:nvSpPr>
             <p:spPr>
               <a:xfrm>
-                <a:off x="3503896" y="2058143"/>
+                <a:off x="3607790" y="2365893"/>
                 <a:ext cx="608060" cy="273042"/>
               </a:xfrm>
               <a:prstGeom prst="wedgeRoundRectCallout">
                 <a:avLst>
-                  <a:gd name="adj1" fmla="val -40234"/>
-                  <a:gd name="adj2" fmla="val 102327"/>
+                  <a:gd name="adj1" fmla="val -63118"/>
+                  <a:gd name="adj2" fmla="val 167850"/>
                   <a:gd name="adj3" fmla="val 16667"/>
                 </a:avLst>
               </a:prstGeom>
@@ -10961,51 +10885,6 @@
                       <m:jc m:val="centerGroup"/>
                     </m:oMathParaPr>
                     <m:oMath xmlns:m="http://schemas.openxmlformats.org/officeDocument/2006/math">
-                      <m:sSubSup>
-                        <m:sSubSupPr>
-                          <m:ctrlPr>
-                            <a:rPr lang="en-US" sz="1000" b="0" i="1" smtClean="0">
-                              <a:solidFill>
-                                <a:schemeClr val="tx1"/>
-                              </a:solidFill>
-                              <a:latin typeface="Cambria Math" panose="02040503050406030204" pitchFamily="18" charset="0"/>
-                            </a:rPr>
-                          </m:ctrlPr>
-                        </m:sSubSupPr>
-                        <m:e>
-                          <m:r>
-                            <a:rPr lang="en-US" sz="1000" b="0" i="1" smtClean="0">
-                              <a:solidFill>
-                                <a:schemeClr val="tx1"/>
-                              </a:solidFill>
-                              <a:latin typeface="Cambria Math" charset="0"/>
-                            </a:rPr>
-                            <m:t>𝑥</m:t>
-                          </m:r>
-                        </m:e>
-                        <m:sub>
-                          <m:r>
-                            <a:rPr lang="en-US" sz="1000" b="0" i="1" smtClean="0">
-                              <a:solidFill>
-                                <a:schemeClr val="tx1"/>
-                              </a:solidFill>
-                              <a:latin typeface="Cambria Math" charset="0"/>
-                            </a:rPr>
-                            <m:t>0</m:t>
-                          </m:r>
-                        </m:sub>
-                        <m:sup>
-                          <m:r>
-                            <a:rPr lang="en-US" sz="1000" b="0" i="1" smtClean="0">
-                              <a:solidFill>
-                                <a:schemeClr val="tx1"/>
-                              </a:solidFill>
-                              <a:latin typeface="Cambria Math" charset="0"/>
-                            </a:rPr>
-                            <m:t>𝑇</m:t>
-                          </m:r>
-                        </m:sup>
-                      </m:sSubSup>
                       <m:sSub>
                         <m:sSubPr>
                           <m:ctrlPr>
@@ -11025,7 +10904,7 @@
                               </a:solidFill>
                               <a:latin typeface="Cambria Math" panose="02040503050406030204" pitchFamily="18" charset="0"/>
                             </a:rPr>
-                            <m:t>𝑃</m:t>
+                            <m:t>𝑥</m:t>
                           </m:r>
                         </m:e>
                         <m:sub>
@@ -11040,40 +10919,15 @@
                           </m:r>
                         </m:sub>
                       </m:sSub>
-                      <m:sSub>
-                        <m:sSubPr>
-                          <m:ctrlPr>
-                            <a:rPr lang="en-US" sz="1000" b="0" i="1" smtClean="0">
-                              <a:solidFill>
-                                <a:schemeClr val="tx1"/>
-                              </a:solidFill>
-                              <a:latin typeface="Cambria Math" panose="02040503050406030204" pitchFamily="18" charset="0"/>
-                            </a:rPr>
-                          </m:ctrlPr>
-                        </m:sSubPr>
-                        <m:e>
-                          <m:r>
-                            <a:rPr lang="en-US" sz="1000" b="0" i="1" smtClean="0">
-                              <a:solidFill>
-                                <a:schemeClr val="tx1"/>
-                              </a:solidFill>
-                              <a:latin typeface="Cambria Math" charset="0"/>
-                            </a:rPr>
-                            <m:t>𝑥</m:t>
-                          </m:r>
-                        </m:e>
-                        <m:sub>
-                          <m:r>
-                            <a:rPr lang="en-US" sz="1000" b="0" i="1" smtClean="0">
-                              <a:solidFill>
-                                <a:schemeClr val="tx1"/>
-                              </a:solidFill>
-                              <a:latin typeface="Cambria Math" charset="0"/>
-                            </a:rPr>
-                            <m:t>0</m:t>
-                          </m:r>
-                        </m:sub>
-                      </m:sSub>
+                      <m:r>
+                        <a:rPr lang="en-US" sz="1000" b="0" i="1" smtClean="0">
+                          <a:solidFill>
+                            <a:schemeClr val="tx1"/>
+                          </a:solidFill>
+                          <a:latin typeface="Cambria Math" panose="02040503050406030204" pitchFamily="18" charset="0"/>
+                        </a:rPr>
+                        <m:t>=0</m:t>
+                      </m:r>
                     </m:oMath>
                   </m:oMathPara>
                 </a14:m>
@@ -11086,7 +10940,7 @@
             </p:txBody>
           </p:sp>
         </mc:Choice>
-        <mc:Fallback xmlns="">
+        <mc:Fallback>
           <p:sp>
             <p:nvSpPr>
               <p:cNvPr id="20" name="Rounded Rectangular Callout 19">
@@ -11103,13 +10957,13 @@
             </p:nvSpPr>
             <p:spPr>
               <a:xfrm>
-                <a:off x="3503896" y="2058143"/>
+                <a:off x="3607790" y="2365893"/>
                 <a:ext cx="608060" cy="273042"/>
               </a:xfrm>
               <a:prstGeom prst="wedgeRoundRectCallout">
                 <a:avLst>
-                  <a:gd name="adj1" fmla="val -40234"/>
-                  <a:gd name="adj2" fmla="val 102327"/>
+                  <a:gd name="adj1" fmla="val -63118"/>
+                  <a:gd name="adj2" fmla="val 167850"/>
                   <a:gd name="adj3" fmla="val 16667"/>
                 </a:avLst>
               </a:prstGeom>
@@ -33190,8 +33044,8 @@
           </p:sp>
         </mc:Fallback>
       </mc:AlternateContent>
-      <mc:AlternateContent xmlns:mc="http://schemas.openxmlformats.org/markup-compatibility/2006">
-        <mc:Choice xmlns:a14="http://schemas.microsoft.com/office/drawing/2010/main" Requires="a14">
+      <mc:AlternateContent xmlns:mc="http://schemas.openxmlformats.org/markup-compatibility/2006" xmlns:a14="http://schemas.microsoft.com/office/drawing/2010/main">
+        <mc:Choice Requires="a14">
           <p:sp>
             <p:nvSpPr>
               <p:cNvPr id="630" name="Rounded Rectangular Callout 629"/>
@@ -33344,7 +33198,7 @@
             </p:txBody>
           </p:sp>
         </mc:Choice>
-        <mc:Fallback>
+        <mc:Fallback xmlns="">
           <p:sp>
             <p:nvSpPr>
               <p:cNvPr id="630" name="Rounded Rectangular Callout 629"/>
@@ -33468,8 +33322,8 @@
           </a:fontRef>
         </p:style>
       </p:cxnSp>
-      <mc:AlternateContent xmlns:mc="http://schemas.openxmlformats.org/markup-compatibility/2006">
-        <mc:Choice xmlns:a14="http://schemas.microsoft.com/office/drawing/2010/main" Requires="a14">
+      <mc:AlternateContent xmlns:mc="http://schemas.openxmlformats.org/markup-compatibility/2006" xmlns:a14="http://schemas.microsoft.com/office/drawing/2010/main">
+        <mc:Choice Requires="a14">
           <p:sp>
             <p:nvSpPr>
               <p:cNvPr id="49" name="Rounded Rectangular Callout 48"/>
@@ -33672,7 +33526,7 @@
             </p:txBody>
           </p:sp>
         </mc:Choice>
-        <mc:Fallback>
+        <mc:Fallback xmlns="">
           <p:sp>
             <p:nvSpPr>
               <p:cNvPr id="49" name="Rounded Rectangular Callout 48"/>
@@ -33757,8 +33611,8 @@
           </a:fontRef>
         </p:style>
       </p:cxnSp>
-      <mc:AlternateContent xmlns:mc="http://schemas.openxmlformats.org/markup-compatibility/2006">
-        <mc:Choice xmlns:a14="http://schemas.microsoft.com/office/drawing/2010/main" Requires="a14">
+      <mc:AlternateContent xmlns:mc="http://schemas.openxmlformats.org/markup-compatibility/2006" xmlns:a14="http://schemas.microsoft.com/office/drawing/2010/main">
+        <mc:Choice Requires="a14">
           <p:sp>
             <p:nvSpPr>
               <p:cNvPr id="39" name="Rounded Rectangular Callout 38"/>
@@ -33934,7 +33788,7 @@
             </p:txBody>
           </p:sp>
         </mc:Choice>
-        <mc:Fallback>
+        <mc:Fallback xmlns="">
           <p:sp>
             <p:nvSpPr>
               <p:cNvPr id="39" name="Rounded Rectangular Callout 38"/>
@@ -34623,8 +34477,8 @@
           </p:sp>
         </mc:Fallback>
       </mc:AlternateContent>
-      <mc:AlternateContent xmlns:mc="http://schemas.openxmlformats.org/markup-compatibility/2006">
-        <mc:Choice xmlns:a14="http://schemas.microsoft.com/office/drawing/2010/main" Requires="a14">
+      <mc:AlternateContent xmlns:mc="http://schemas.openxmlformats.org/markup-compatibility/2006" xmlns:a14="http://schemas.microsoft.com/office/drawing/2010/main">
+        <mc:Choice Requires="a14">
           <p:sp>
             <p:nvSpPr>
               <p:cNvPr id="51" name="Rounded Rectangular Callout 50">
@@ -34833,7 +34687,7 @@
             </p:txBody>
           </p:sp>
         </mc:Choice>
-        <mc:Fallback>
+        <mc:Fallback xmlns="">
           <p:sp>
             <p:nvSpPr>
               <p:cNvPr id="51" name="Rounded Rectangular Callout 50">
@@ -36699,220 +36553,8 @@
           </p:sp>
         </mc:Fallback>
       </mc:AlternateContent>
-      <mc:AlternateContent xmlns:mc="http://schemas.openxmlformats.org/markup-compatibility/2006">
-        <mc:Choice xmlns:a14="http://schemas.microsoft.com/office/drawing/2010/main" Requires="a14">
-          <p:sp>
-            <p:nvSpPr>
-              <p:cNvPr id="30" name="Rounded Rectangular Callout 29">
-                <a:extLst>
-                  <a:ext uri="{FF2B5EF4-FFF2-40B4-BE49-F238E27FC236}">
-                    <a16:creationId xmlns:a16="http://schemas.microsoft.com/office/drawing/2014/main" id="{A51A67C3-716F-0A46-B477-287F3E057D15}"/>
-                  </a:ext>
-                </a:extLst>
-              </p:cNvPr>
-              <p:cNvSpPr/>
-              <p:nvPr/>
-            </p:nvSpPr>
-            <p:spPr>
-              <a:xfrm>
-                <a:off x="3484025" y="4477058"/>
-                <a:ext cx="660035" cy="325136"/>
-              </a:xfrm>
-              <a:prstGeom prst="wedgeRoundRectCallout">
-                <a:avLst>
-                  <a:gd name="adj1" fmla="val 63705"/>
-                  <a:gd name="adj2" fmla="val 122466"/>
-                  <a:gd name="adj3" fmla="val 16667"/>
-                </a:avLst>
-              </a:prstGeom>
-              <a:solidFill>
-                <a:schemeClr val="bg2"/>
-              </a:solidFill>
-              <a:ln>
-                <a:noFill/>
-              </a:ln>
-            </p:spPr>
-            <p:style>
-              <a:lnRef idx="2">
-                <a:schemeClr val="accent1">
-                  <a:shade val="50000"/>
-                </a:schemeClr>
-              </a:lnRef>
-              <a:fillRef idx="1">
-                <a:schemeClr val="accent1"/>
-              </a:fillRef>
-              <a:effectRef idx="0">
-                <a:schemeClr val="accent1"/>
-              </a:effectRef>
-              <a:fontRef idx="minor">
-                <a:schemeClr val="lt1"/>
-              </a:fontRef>
-            </p:style>
-            <p:txBody>
-              <a:bodyPr rtlCol="0" anchor="ctr"/>
-              <a:lstStyle/>
-              <a:p>
-                <a:pPr algn="ctr"/>
-                <a14:m>
-                  <m:oMathPara xmlns:m="http://schemas.openxmlformats.org/officeDocument/2006/math">
-                    <m:oMathParaPr>
-                      <m:jc m:val="centerGroup"/>
-                    </m:oMathParaPr>
-                    <m:oMath xmlns:m="http://schemas.openxmlformats.org/officeDocument/2006/math">
-                      <m:sSubSup>
-                        <m:sSubSupPr>
-                          <m:ctrlPr>
-                            <a:rPr lang="en-US" sz="1000" b="0" i="1" smtClean="0">
-                              <a:solidFill>
-                                <a:schemeClr val="tx1"/>
-                              </a:solidFill>
-                              <a:latin typeface="Cambria Math" panose="02040503050406030204" pitchFamily="18" charset="0"/>
-                            </a:rPr>
-                          </m:ctrlPr>
-                        </m:sSubSupPr>
-                        <m:e>
-                          <m:r>
-                            <a:rPr lang="en-US" sz="1000" b="0" i="1" smtClean="0">
-                              <a:solidFill>
-                                <a:schemeClr val="tx1"/>
-                              </a:solidFill>
-                              <a:latin typeface="Cambria Math" charset="0"/>
-                            </a:rPr>
-                            <m:t>𝑢</m:t>
-                          </m:r>
-                        </m:e>
-                        <m:sub>
-                          <m:r>
-                            <a:rPr lang="en-US" sz="1000" b="0" i="1" smtClean="0">
-                              <a:solidFill>
-                                <a:schemeClr val="tx1"/>
-                              </a:solidFill>
-                              <a:latin typeface="Cambria Math" charset="0"/>
-                            </a:rPr>
-                            <m:t>0</m:t>
-                          </m:r>
-                        </m:sub>
-                        <m:sup>
-                          <m:r>
-                            <a:rPr lang="en-US" sz="1000" b="0" i="1" smtClean="0">
-                              <a:solidFill>
-                                <a:schemeClr val="tx1"/>
-                              </a:solidFill>
-                              <a:latin typeface="Cambria Math" charset="0"/>
-                            </a:rPr>
-                            <m:t>𝑇</m:t>
-                          </m:r>
-                        </m:sup>
-                      </m:sSubSup>
-                      <m:r>
-                        <a:rPr lang="en-US" sz="1000" b="0" i="1" smtClean="0">
-                          <a:solidFill>
-                            <a:schemeClr val="tx1"/>
-                          </a:solidFill>
-                          <a:latin typeface="Cambria Math" charset="0"/>
-                        </a:rPr>
-                        <m:t>𝑅</m:t>
-                      </m:r>
-                      <m:sSub>
-                        <m:sSubPr>
-                          <m:ctrlPr>
-                            <a:rPr lang="en-US" sz="1000" b="0" i="1" smtClean="0">
-                              <a:solidFill>
-                                <a:schemeClr val="tx1"/>
-                              </a:solidFill>
-                              <a:latin typeface="Cambria Math" panose="02040503050406030204" pitchFamily="18" charset="0"/>
-                            </a:rPr>
-                          </m:ctrlPr>
-                        </m:sSubPr>
-                        <m:e>
-                          <m:r>
-                            <a:rPr lang="en-US" sz="1000" b="0" i="1" smtClean="0">
-                              <a:solidFill>
-                                <a:schemeClr val="tx1"/>
-                              </a:solidFill>
-                              <a:latin typeface="Cambria Math" charset="0"/>
-                            </a:rPr>
-                            <m:t>𝑢</m:t>
-                          </m:r>
-                        </m:e>
-                        <m:sub>
-                          <m:r>
-                            <a:rPr lang="en-US" sz="1000" b="0" i="1" smtClean="0">
-                              <a:solidFill>
-                                <a:schemeClr val="tx1"/>
-                              </a:solidFill>
-                              <a:latin typeface="Cambria Math" charset="0"/>
-                            </a:rPr>
-                            <m:t>0</m:t>
-                          </m:r>
-                        </m:sub>
-                      </m:sSub>
-                    </m:oMath>
-                  </m:oMathPara>
-                </a14:m>
-                <a:endParaRPr lang="en-US" sz="1000" dirty="0">
-                  <a:solidFill>
-                    <a:schemeClr val="tx1"/>
-                  </a:solidFill>
-                </a:endParaRPr>
-              </a:p>
-            </p:txBody>
-          </p:sp>
-        </mc:Choice>
-        <mc:Fallback>
-          <p:sp>
-            <p:nvSpPr>
-              <p:cNvPr id="30" name="Rounded Rectangular Callout 29">
-                <a:extLst>
-                  <a:ext uri="{FF2B5EF4-FFF2-40B4-BE49-F238E27FC236}">
-                    <a16:creationId xmlns:a16="http://schemas.microsoft.com/office/drawing/2014/main" id="{A51A67C3-716F-0A46-B477-287F3E057D15}"/>
-                  </a:ext>
-                </a:extLst>
-              </p:cNvPr>
-              <p:cNvSpPr>
-                <a:spLocks noRot="1" noChangeAspect="1" noMove="1" noResize="1" noEditPoints="1" noAdjustHandles="1" noChangeArrowheads="1" noChangeShapeType="1" noTextEdit="1"/>
-              </p:cNvSpPr>
-              <p:nvPr/>
-            </p:nvSpPr>
-            <p:spPr>
-              <a:xfrm>
-                <a:off x="3484025" y="4477058"/>
-                <a:ext cx="660035" cy="325136"/>
-              </a:xfrm>
-              <a:prstGeom prst="wedgeRoundRectCallout">
-                <a:avLst>
-                  <a:gd name="adj1" fmla="val 63705"/>
-                  <a:gd name="adj2" fmla="val 122466"/>
-                  <a:gd name="adj3" fmla="val 16667"/>
-                </a:avLst>
-              </a:prstGeom>
-              <a:blipFill>
-                <a:blip r:embed="rId13"/>
-                <a:stretch>
-                  <a:fillRect/>
-                </a:stretch>
-              </a:blipFill>
-              <a:ln>
-                <a:noFill/>
-              </a:ln>
-            </p:spPr>
-            <p:txBody>
-              <a:bodyPr/>
-              <a:lstStyle/>
-              <a:p>
-                <a:r>
-                  <a:rPr lang="en-US">
-                    <a:noFill/>
-                  </a:rPr>
-                  <a:t> </a:t>
-                </a:r>
-              </a:p>
-            </p:txBody>
-          </p:sp>
-        </mc:Fallback>
-      </mc:AlternateContent>
-      <mc:AlternateContent xmlns:mc="http://schemas.openxmlformats.org/markup-compatibility/2006">
-        <mc:Choice xmlns:a14="http://schemas.microsoft.com/office/drawing/2010/main" Requires="a14">
+      <mc:AlternateContent xmlns:mc="http://schemas.openxmlformats.org/markup-compatibility/2006" xmlns:a14="http://schemas.microsoft.com/office/drawing/2010/main">
+        <mc:Choice Requires="a14">
           <p:sp>
             <p:nvSpPr>
               <p:cNvPr id="31" name="Rounded Rectangular Callout 30">
@@ -37121,7 +36763,7 @@
             </p:txBody>
           </p:sp>
         </mc:Choice>
-        <mc:Fallback>
+        <mc:Fallback xmlns="">
           <p:sp>
             <p:nvSpPr>
               <p:cNvPr id="31" name="Rounded Rectangular Callout 30">
@@ -37173,8 +36815,8 @@
           </p:sp>
         </mc:Fallback>
       </mc:AlternateContent>
-      <mc:AlternateContent xmlns:mc="http://schemas.openxmlformats.org/markup-compatibility/2006">
-        <mc:Choice xmlns:a14="http://schemas.microsoft.com/office/drawing/2010/main" Requires="a14">
+      <mc:AlternateContent xmlns:mc="http://schemas.openxmlformats.org/markup-compatibility/2006" xmlns:a14="http://schemas.microsoft.com/office/drawing/2010/main">
+        <mc:Choice Requires="a14">
           <p:sp>
             <p:nvSpPr>
               <p:cNvPr id="34" name="Rounded Rectangular Callout 33">
@@ -37356,7 +36998,7 @@
             </p:txBody>
           </p:sp>
         </mc:Choice>
-        <mc:Fallback>
+        <mc:Fallback xmlns="">
           <p:sp>
             <p:nvSpPr>
               <p:cNvPr id="34" name="Rounded Rectangular Callout 33">
@@ -37408,8 +37050,8 @@
           </p:sp>
         </mc:Fallback>
       </mc:AlternateContent>
-      <mc:AlternateContent xmlns:mc="http://schemas.openxmlformats.org/markup-compatibility/2006">
-        <mc:Choice xmlns:a14="http://schemas.microsoft.com/office/drawing/2010/main" Requires="a14">
+      <mc:AlternateContent xmlns:mc="http://schemas.openxmlformats.org/markup-compatibility/2006" xmlns:a14="http://schemas.microsoft.com/office/drawing/2010/main">
+        <mc:Choice Requires="a14">
           <p:sp>
             <p:nvSpPr>
               <p:cNvPr id="37" name="Rounded Rectangular Callout 36">
@@ -37618,7 +37260,7 @@
             </p:txBody>
           </p:sp>
         </mc:Choice>
-        <mc:Fallback>
+        <mc:Fallback xmlns="">
           <p:sp>
             <p:nvSpPr>
               <p:cNvPr id="37" name="Rounded Rectangular Callout 36">
@@ -37647,6 +37289,241 @@
               </a:prstGeom>
               <a:blipFill>
                 <a:blip r:embed="rId16"/>
+                <a:stretch>
+                  <a:fillRect/>
+                </a:stretch>
+              </a:blipFill>
+              <a:ln>
+                <a:noFill/>
+              </a:ln>
+            </p:spPr>
+            <p:txBody>
+              <a:bodyPr/>
+              <a:lstStyle/>
+              <a:p>
+                <a:r>
+                  <a:rPr lang="en-US">
+                    <a:noFill/>
+                  </a:rPr>
+                  <a:t> </a:t>
+                </a:r>
+              </a:p>
+            </p:txBody>
+          </p:sp>
+        </mc:Fallback>
+      </mc:AlternateContent>
+      <mc:AlternateContent xmlns:mc="http://schemas.openxmlformats.org/markup-compatibility/2006">
+        <mc:Choice xmlns:a14="http://schemas.microsoft.com/office/drawing/2010/main" Requires="a14">
+          <p:sp>
+            <p:nvSpPr>
+              <p:cNvPr id="25" name="Rounded Rectangular Callout 24">
+                <a:extLst>
+                  <a:ext uri="{FF2B5EF4-FFF2-40B4-BE49-F238E27FC236}">
+                    <a16:creationId xmlns:a16="http://schemas.microsoft.com/office/drawing/2014/main" id="{E2A8D4D9-39D2-DD40-866B-ADC257940041}"/>
+                  </a:ext>
+                </a:extLst>
+              </p:cNvPr>
+              <p:cNvSpPr/>
+              <p:nvPr/>
+            </p:nvSpPr>
+            <p:spPr>
+              <a:xfrm>
+                <a:off x="4511631" y="4731683"/>
+                <a:ext cx="872238" cy="235954"/>
+              </a:xfrm>
+              <a:prstGeom prst="wedgeRoundRectCallout">
+                <a:avLst>
+                  <a:gd name="adj1" fmla="val -64579"/>
+                  <a:gd name="adj2" fmla="val -173771"/>
+                  <a:gd name="adj3" fmla="val 16667"/>
+                </a:avLst>
+              </a:prstGeom>
+              <a:solidFill>
+                <a:schemeClr val="bg2"/>
+              </a:solidFill>
+              <a:ln>
+                <a:noFill/>
+              </a:ln>
+            </p:spPr>
+            <p:style>
+              <a:lnRef idx="2">
+                <a:schemeClr val="accent1">
+                  <a:shade val="50000"/>
+                </a:schemeClr>
+              </a:lnRef>
+              <a:fillRef idx="1">
+                <a:schemeClr val="accent1"/>
+              </a:fillRef>
+              <a:effectRef idx="0">
+                <a:schemeClr val="accent1"/>
+              </a:effectRef>
+              <a:fontRef idx="minor">
+                <a:schemeClr val="lt1"/>
+              </a:fontRef>
+            </p:style>
+            <p:txBody>
+              <a:bodyPr rtlCol="0" anchor="ctr"/>
+              <a:lstStyle/>
+              <a:p>
+                <a:pPr algn="ctr"/>
+                <a14:m>
+                  <m:oMathPara xmlns:m="http://schemas.openxmlformats.org/officeDocument/2006/math">
+                    <m:oMathParaPr>
+                      <m:jc m:val="centerGroup"/>
+                    </m:oMathParaPr>
+                    <m:oMath xmlns:m="http://schemas.openxmlformats.org/officeDocument/2006/math">
+                      <m:sSub>
+                        <m:sSubPr>
+                          <m:ctrlPr>
+                            <a:rPr lang="en-US" sz="1000" b="0" i="1" smtClean="0">
+                              <a:solidFill>
+                                <a:schemeClr val="tx1"/>
+                              </a:solidFill>
+                              <a:latin typeface="Cambria Math" panose="02040503050406030204" pitchFamily="18" charset="0"/>
+                            </a:rPr>
+                          </m:ctrlPr>
+                        </m:sSubPr>
+                        <m:e>
+                          <m:r>
+                            <a:rPr lang="en-US" sz="1000" b="0" i="1" smtClean="0">
+                              <a:solidFill>
+                                <a:schemeClr val="tx1"/>
+                              </a:solidFill>
+                              <a:latin typeface="Cambria Math" charset="0"/>
+                            </a:rPr>
+                            <m:t>𝑢</m:t>
+                          </m:r>
+                        </m:e>
+                        <m:sub>
+                          <m:r>
+                            <a:rPr lang="en-US" sz="1000" b="0" i="1" smtClean="0">
+                              <a:solidFill>
+                                <a:schemeClr val="tx1"/>
+                              </a:solidFill>
+                              <a:latin typeface="Cambria Math" charset="0"/>
+                            </a:rPr>
+                            <m:t>0</m:t>
+                          </m:r>
+                        </m:sub>
+                      </m:sSub>
+                      <m:r>
+                        <a:rPr lang="en-US" sz="1000" b="0" i="1" smtClean="0">
+                          <a:solidFill>
+                            <a:schemeClr val="tx1"/>
+                          </a:solidFill>
+                          <a:latin typeface="Cambria Math" charset="0"/>
+                        </a:rPr>
+                        <m:t>=</m:t>
+                      </m:r>
+                      <m:sSub>
+                        <m:sSubPr>
+                          <m:ctrlPr>
+                            <a:rPr lang="en-US" sz="1000" b="0" i="1" smtClean="0">
+                              <a:solidFill>
+                                <a:schemeClr val="tx1"/>
+                              </a:solidFill>
+                              <a:latin typeface="Cambria Math" panose="02040503050406030204" pitchFamily="18" charset="0"/>
+                            </a:rPr>
+                          </m:ctrlPr>
+                        </m:sSubPr>
+                        <m:e>
+                          <m:r>
+                            <a:rPr lang="en-US" sz="1000" b="0" i="1" smtClean="0">
+                              <a:solidFill>
+                                <a:schemeClr val="tx1"/>
+                              </a:solidFill>
+                              <a:latin typeface="Cambria Math" charset="0"/>
+                            </a:rPr>
+                            <m:t>𝐾</m:t>
+                          </m:r>
+                        </m:e>
+                        <m:sub>
+                          <m:r>
+                            <a:rPr lang="en-US" sz="1000" b="0" i="1" smtClean="0">
+                              <a:solidFill>
+                                <a:schemeClr val="tx1"/>
+                              </a:solidFill>
+                              <a:latin typeface="Cambria Math" charset="0"/>
+                            </a:rPr>
+                            <m:t>0</m:t>
+                          </m:r>
+                        </m:sub>
+                      </m:sSub>
+                      <m:sSub>
+                        <m:sSubPr>
+                          <m:ctrlPr>
+                            <a:rPr lang="en-US" sz="1000" b="0" i="1" smtClean="0">
+                              <a:solidFill>
+                                <a:schemeClr val="tx1"/>
+                              </a:solidFill>
+                              <a:latin typeface="Cambria Math" panose="02040503050406030204" pitchFamily="18" charset="0"/>
+                            </a:rPr>
+                          </m:ctrlPr>
+                        </m:sSubPr>
+                        <m:e>
+                          <m:r>
+                            <a:rPr lang="en-US" sz="1000" b="0" i="1" smtClean="0">
+                              <a:solidFill>
+                                <a:schemeClr val="tx1"/>
+                              </a:solidFill>
+                              <a:latin typeface="Cambria Math" charset="0"/>
+                            </a:rPr>
+                            <m:t>𝑥</m:t>
+                          </m:r>
+                        </m:e>
+                        <m:sub>
+                          <m:r>
+                            <a:rPr lang="en-US" sz="1000" b="0" i="1" smtClean="0">
+                              <a:solidFill>
+                                <a:schemeClr val="tx1"/>
+                              </a:solidFill>
+                              <a:latin typeface="Cambria Math" charset="0"/>
+                            </a:rPr>
+                            <m:t>0</m:t>
+                          </m:r>
+                        </m:sub>
+                      </m:sSub>
+                    </m:oMath>
+                  </m:oMathPara>
+                </a14:m>
+                <a:endParaRPr lang="en-US" sz="1000" dirty="0">
+                  <a:solidFill>
+                    <a:schemeClr val="tx1"/>
+                  </a:solidFill>
+                </a:endParaRPr>
+              </a:p>
+            </p:txBody>
+          </p:sp>
+        </mc:Choice>
+        <mc:Fallback>
+          <p:sp>
+            <p:nvSpPr>
+              <p:cNvPr id="25" name="Rounded Rectangular Callout 24">
+                <a:extLst>
+                  <a:ext uri="{FF2B5EF4-FFF2-40B4-BE49-F238E27FC236}">
+                    <a16:creationId xmlns:a16="http://schemas.microsoft.com/office/drawing/2014/main" id="{E2A8D4D9-39D2-DD40-866B-ADC257940041}"/>
+                  </a:ext>
+                </a:extLst>
+              </p:cNvPr>
+              <p:cNvSpPr>
+                <a:spLocks noRot="1" noChangeAspect="1" noMove="1" noResize="1" noEditPoints="1" noAdjustHandles="1" noChangeArrowheads="1" noChangeShapeType="1" noTextEdit="1"/>
+              </p:cNvSpPr>
+              <p:nvPr/>
+            </p:nvSpPr>
+            <p:spPr>
+              <a:xfrm>
+                <a:off x="4511631" y="4731683"/>
+                <a:ext cx="872238" cy="235954"/>
+              </a:xfrm>
+              <a:prstGeom prst="wedgeRoundRectCallout">
+                <a:avLst>
+                  <a:gd name="adj1" fmla="val -64579"/>
+                  <a:gd name="adj2" fmla="val -173771"/>
+                  <a:gd name="adj3" fmla="val 16667"/>
+                </a:avLst>
+              </a:prstGeom>
+              <a:blipFill>
+                <a:blip r:embed="rId17"/>
                 <a:stretch>
                   <a:fillRect/>
                 </a:stretch>

</xml_diff>